<commit_message>
first version of pp done
</commit_message>
<xml_diff>
--- a/static/dachfenster-pitch.pptx
+++ b/static/dachfenster-pitch.pptx
@@ -6,7 +6,11 @@
   </p:sldMasterIdLst>
   <p:sldIdLst>
     <p:sldId id="256" r:id="rId2"/>
-    <p:sldId id="257" r:id="rId3"/>
+    <p:sldId id="259" r:id="rId3"/>
+    <p:sldId id="258" r:id="rId4"/>
+    <p:sldId id="260" r:id="rId5"/>
+    <p:sldId id="257" r:id="rId6"/>
+    <p:sldId id="261" r:id="rId7"/>
   </p:sldIdLst>
   <p:sldSz cx="12192000" cy="6858000"/>
   <p:notesSz cx="6858000" cy="9144000"/>
@@ -3621,7 +3625,7 @@
               <a:rPr lang="en-CH" b="1" dirty="0">
                 <a:latin typeface="Trebuchet MS" panose="020B0703020202090204" pitchFamily="34" charset="0"/>
               </a:rPr>
-              <a:t>Template</a:t>
+              <a:t>Reaching Climate Goals Together</a:t>
             </a:r>
           </a:p>
         </p:txBody>
@@ -3651,8 +3655,555 @@
               <a:rPr lang="en-CH" dirty="0">
                 <a:latin typeface="Trebuchet MS" panose="020B0703020202090204" pitchFamily="34" charset="0"/>
               </a:rPr>
-              <a:t>template</a:t>
-            </a:r>
+              <a:t>1.9 million commutes by car per day</a:t>
+            </a:r>
+          </a:p>
+          <a:p>
+            <a:r>
+              <a:rPr lang="en-GB" dirty="0">
+                <a:latin typeface="Trebuchet MS" panose="020B0703020202090204" pitchFamily="34" charset="0"/>
+              </a:rPr>
+              <a:t>m</a:t>
+            </a:r>
+            <a:r>
+              <a:rPr lang="en-CH" dirty="0">
+                <a:latin typeface="Trebuchet MS" panose="020B0703020202090204" pitchFamily="34" charset="0"/>
+              </a:rPr>
+              <a:t>atching people with similar routes</a:t>
+            </a:r>
+          </a:p>
+          <a:p>
+            <a:r>
+              <a:rPr lang="en-GB" dirty="0">
+                <a:latin typeface="Trebuchet MS" panose="020B0703020202090204" pitchFamily="34" charset="0"/>
+              </a:rPr>
+              <a:t>easy choice between possible driver with reliability score</a:t>
+            </a:r>
+          </a:p>
+          <a:p>
+            <a:r>
+              <a:rPr lang="en-GB" dirty="0">
+                <a:latin typeface="Trebuchet MS" panose="020B0703020202090204" pitchFamily="34" charset="0"/>
+              </a:rPr>
+              <a:t>c</a:t>
+            </a:r>
+            <a:r>
+              <a:rPr lang="en-CH" dirty="0">
+                <a:latin typeface="Trebuchet MS" panose="020B0703020202090204" pitchFamily="34" charset="0"/>
+              </a:rPr>
+              <a:t>ustom needs/requirements</a:t>
+            </a:r>
+          </a:p>
+          <a:p>
+            <a:pPr lvl="1"/>
+            <a:r>
+              <a:rPr lang="en-GB" dirty="0">
+                <a:latin typeface="Trebuchet MS" panose="020B0703020202090204" pitchFamily="34" charset="0"/>
+              </a:rPr>
+              <a:t>b</a:t>
+            </a:r>
+            <a:r>
+              <a:rPr lang="en-CH" dirty="0">
+                <a:latin typeface="Trebuchet MS" panose="020B0703020202090204" pitchFamily="34" charset="0"/>
+              </a:rPr>
+              <a:t>aggage</a:t>
+            </a:r>
+          </a:p>
+          <a:p>
+            <a:pPr lvl="1"/>
+            <a:r>
+              <a:rPr lang="de-CH" dirty="0" err="1">
+                <a:latin typeface="Trebuchet MS" panose="020B0703020202090204" pitchFamily="34" charset="0"/>
+              </a:rPr>
+              <a:t>similar</a:t>
+            </a:r>
+            <a:r>
+              <a:rPr lang="de-CH" dirty="0">
+                <a:latin typeface="Trebuchet MS" panose="020B0703020202090204" pitchFamily="34" charset="0"/>
+              </a:rPr>
+              <a:t> </a:t>
+            </a:r>
+            <a:r>
+              <a:rPr lang="en-CH" dirty="0">
+                <a:latin typeface="Trebuchet MS" panose="020B0703020202090204" pitchFamily="34" charset="0"/>
+              </a:rPr>
+              <a:t>music taste</a:t>
+            </a:r>
+          </a:p>
+          <a:p>
+            <a:pPr marL="457200" lvl="1" indent="0">
+              <a:buNone/>
+            </a:pPr>
+            <a:endParaRPr lang="en-CH" dirty="0">
+              <a:latin typeface="Trebuchet MS" panose="020B0703020202090204" pitchFamily="34" charset="0"/>
+            </a:endParaRPr>
+          </a:p>
+        </p:txBody>
+      </p:sp>
+    </p:spTree>
+    <p:extLst>
+      <p:ext uri="{BB962C8B-B14F-4D97-AF65-F5344CB8AC3E}">
+        <p14:creationId xmlns:p14="http://schemas.microsoft.com/office/powerpoint/2010/main" val="1803151028"/>
+      </p:ext>
+    </p:extLst>
+  </p:cSld>
+  <p:clrMapOvr>
+    <a:masterClrMapping/>
+  </p:clrMapOvr>
+</p:sld>
+</file>
+
+<file path=ppt/slides/slide3.xml><?xml version="1.0" encoding="utf-8"?>
+<p:sld xmlns:a="http://schemas.openxmlformats.org/drawingml/2006/main" xmlns:r="http://schemas.openxmlformats.org/officeDocument/2006/relationships" xmlns:p="http://schemas.openxmlformats.org/presentationml/2006/main">
+  <p:cSld>
+    <p:bg>
+      <p:bgPr>
+        <a:solidFill>
+          <a:schemeClr val="accent6">
+            <a:lumMod val="20000"/>
+            <a:lumOff val="80000"/>
+          </a:schemeClr>
+        </a:solidFill>
+        <a:effectLst/>
+      </p:bgPr>
+    </p:bg>
+    <p:spTree>
+      <p:nvGrpSpPr>
+        <p:cNvPr id="1" name=""/>
+        <p:cNvGrpSpPr/>
+        <p:nvPr/>
+      </p:nvGrpSpPr>
+      <p:grpSpPr>
+        <a:xfrm>
+          <a:off x="0" y="0"/>
+          <a:ext cx="0" cy="0"/>
+          <a:chOff x="0" y="0"/>
+          <a:chExt cx="0" cy="0"/>
+        </a:xfrm>
+      </p:grpSpPr>
+      <p:sp>
+        <p:nvSpPr>
+          <p:cNvPr id="2" name="Title 1">
+            <a:extLst>
+              <a:ext uri="{FF2B5EF4-FFF2-40B4-BE49-F238E27FC236}">
+                <a16:creationId xmlns:a16="http://schemas.microsoft.com/office/drawing/2014/main" id="{A5186B16-9D62-5146-B2AA-4EEE35AFAD22}"/>
+              </a:ext>
+            </a:extLst>
+          </p:cNvPr>
+          <p:cNvSpPr>
+            <a:spLocks noGrp="1"/>
+          </p:cNvSpPr>
+          <p:nvPr>
+            <p:ph type="title"/>
+          </p:nvPr>
+        </p:nvSpPr>
+        <p:spPr/>
+        <p:txBody>
+          <a:bodyPr/>
+          <a:lstStyle/>
+          <a:p>
+            <a:r>
+              <a:rPr lang="en-CH" b="1" dirty="0">
+                <a:latin typeface="Trebuchet MS" panose="020B0703020202090204" pitchFamily="34" charset="0"/>
+              </a:rPr>
+              <a:t>Project Architecture</a:t>
+            </a:r>
+          </a:p>
+        </p:txBody>
+      </p:sp>
+      <p:pic>
+        <p:nvPicPr>
+          <p:cNvPr id="5" name="Content Placeholder 4">
+            <a:extLst>
+              <a:ext uri="{FF2B5EF4-FFF2-40B4-BE49-F238E27FC236}">
+                <a16:creationId xmlns:a16="http://schemas.microsoft.com/office/drawing/2014/main" id="{5AD53865-210C-0D4B-B610-8033B7BBF09F}"/>
+              </a:ext>
+            </a:extLst>
+          </p:cNvPr>
+          <p:cNvPicPr>
+            <a:picLocks noGrp="1" noChangeAspect="1"/>
+          </p:cNvPicPr>
+          <p:nvPr>
+            <p:ph idx="1"/>
+          </p:nvPr>
+        </p:nvPicPr>
+        <p:blipFill>
+          <a:blip r:embed="rId2"/>
+          <a:stretch>
+            <a:fillRect/>
+          </a:stretch>
+        </p:blipFill>
+        <p:spPr>
+          <a:xfrm>
+            <a:off x="1890582" y="1513800"/>
+            <a:ext cx="8441628" cy="4993200"/>
+          </a:xfrm>
+        </p:spPr>
+      </p:pic>
+    </p:spTree>
+    <p:extLst>
+      <p:ext uri="{BB962C8B-B14F-4D97-AF65-F5344CB8AC3E}">
+        <p14:creationId xmlns:p14="http://schemas.microsoft.com/office/powerpoint/2010/main" val="1183501346"/>
+      </p:ext>
+    </p:extLst>
+  </p:cSld>
+  <p:clrMapOvr>
+    <a:masterClrMapping/>
+  </p:clrMapOvr>
+</p:sld>
+</file>
+
+<file path=ppt/slides/slide4.xml><?xml version="1.0" encoding="utf-8"?>
+<p:sld xmlns:a="http://schemas.openxmlformats.org/drawingml/2006/main" xmlns:r="http://schemas.openxmlformats.org/officeDocument/2006/relationships" xmlns:p="http://schemas.openxmlformats.org/presentationml/2006/main">
+  <p:cSld>
+    <p:bg>
+      <p:bgPr>
+        <a:solidFill>
+          <a:schemeClr val="accent6">
+            <a:lumMod val="20000"/>
+            <a:lumOff val="80000"/>
+          </a:schemeClr>
+        </a:solidFill>
+        <a:effectLst/>
+      </p:bgPr>
+    </p:bg>
+    <p:spTree>
+      <p:nvGrpSpPr>
+        <p:cNvPr id="1" name=""/>
+        <p:cNvGrpSpPr/>
+        <p:nvPr/>
+      </p:nvGrpSpPr>
+      <p:grpSpPr>
+        <a:xfrm>
+          <a:off x="0" y="0"/>
+          <a:ext cx="0" cy="0"/>
+          <a:chOff x="0" y="0"/>
+          <a:chExt cx="0" cy="0"/>
+        </a:xfrm>
+      </p:grpSpPr>
+      <p:sp>
+        <p:nvSpPr>
+          <p:cNvPr id="2" name="Title 1">
+            <a:extLst>
+              <a:ext uri="{FF2B5EF4-FFF2-40B4-BE49-F238E27FC236}">
+                <a16:creationId xmlns:a16="http://schemas.microsoft.com/office/drawing/2014/main" id="{A5186B16-9D62-5146-B2AA-4EEE35AFAD22}"/>
+              </a:ext>
+            </a:extLst>
+          </p:cNvPr>
+          <p:cNvSpPr>
+            <a:spLocks noGrp="1"/>
+          </p:cNvSpPr>
+          <p:nvPr>
+            <p:ph type="title"/>
+          </p:nvPr>
+        </p:nvSpPr>
+        <p:spPr/>
+        <p:txBody>
+          <a:bodyPr/>
+          <a:lstStyle/>
+          <a:p>
+            <a:r>
+              <a:rPr lang="de-CH" b="1" dirty="0">
+                <a:latin typeface="Trebuchet MS" panose="020B0703020202090204" pitchFamily="34" charset="0"/>
+              </a:rPr>
+              <a:t>This </a:t>
+            </a:r>
+            <a:r>
+              <a:rPr lang="de-CH" b="1" dirty="0" err="1">
+                <a:latin typeface="Trebuchet MS" panose="020B0703020202090204" pitchFamily="34" charset="0"/>
+              </a:rPr>
+              <a:t>is</a:t>
+            </a:r>
+            <a:r>
+              <a:rPr lang="de-CH" b="1" dirty="0">
+                <a:latin typeface="Trebuchet MS" panose="020B0703020202090204" pitchFamily="34" charset="0"/>
+              </a:rPr>
+              <a:t> </a:t>
+            </a:r>
+            <a:r>
+              <a:rPr lang="de-CH" b="1" dirty="0" err="1">
+                <a:latin typeface="Trebuchet MS" panose="020B0703020202090204" pitchFamily="34" charset="0"/>
+              </a:rPr>
+              <a:t>what</a:t>
+            </a:r>
+            <a:r>
+              <a:rPr lang="de-CH" b="1" dirty="0">
+                <a:latin typeface="Trebuchet MS" panose="020B0703020202090204" pitchFamily="34" charset="0"/>
+              </a:rPr>
+              <a:t> </a:t>
+            </a:r>
+            <a:r>
+              <a:rPr lang="de-CH" b="1" dirty="0" err="1">
+                <a:latin typeface="Trebuchet MS" panose="020B0703020202090204" pitchFamily="34" charset="0"/>
+              </a:rPr>
+              <a:t>makes</a:t>
+            </a:r>
+            <a:r>
+              <a:rPr lang="de-CH" b="1" dirty="0">
+                <a:latin typeface="Trebuchet MS" panose="020B0703020202090204" pitchFamily="34" charset="0"/>
+              </a:rPr>
+              <a:t> </a:t>
+            </a:r>
+            <a:r>
+              <a:rPr lang="de-CH" b="1" dirty="0" err="1">
+                <a:latin typeface="Trebuchet MS" panose="020B0703020202090204" pitchFamily="34" charset="0"/>
+              </a:rPr>
+              <a:t>our</a:t>
+            </a:r>
+            <a:r>
+              <a:rPr lang="de-CH" b="1" dirty="0">
+                <a:latin typeface="Trebuchet MS" panose="020B0703020202090204" pitchFamily="34" charset="0"/>
+              </a:rPr>
+              <a:t> </a:t>
+            </a:r>
+            <a:r>
+              <a:rPr lang="de-CH" b="1" dirty="0" err="1">
+                <a:latin typeface="Trebuchet MS" panose="020B0703020202090204" pitchFamily="34" charset="0"/>
+              </a:rPr>
+              <a:t>solution</a:t>
+            </a:r>
+            <a:r>
+              <a:rPr lang="de-CH" b="1" dirty="0">
+                <a:latin typeface="Trebuchet MS" panose="020B0703020202090204" pitchFamily="34" charset="0"/>
+              </a:rPr>
+              <a:t> stand out</a:t>
+            </a:r>
+            <a:endParaRPr lang="en-CH" b="1" dirty="0">
+              <a:latin typeface="Trebuchet MS" panose="020B0703020202090204" pitchFamily="34" charset="0"/>
+            </a:endParaRPr>
+          </a:p>
+        </p:txBody>
+      </p:sp>
+      <p:sp>
+        <p:nvSpPr>
+          <p:cNvPr id="3" name="Content Placeholder 2">
+            <a:extLst>
+              <a:ext uri="{FF2B5EF4-FFF2-40B4-BE49-F238E27FC236}">
+                <a16:creationId xmlns:a16="http://schemas.microsoft.com/office/drawing/2014/main" id="{4C6BE1A8-DF59-264C-802F-A0231680D18B}"/>
+              </a:ext>
+            </a:extLst>
+          </p:cNvPr>
+          <p:cNvSpPr>
+            <a:spLocks noGrp="1"/>
+          </p:cNvSpPr>
+          <p:nvPr>
+            <p:ph idx="1"/>
+          </p:nvPr>
+        </p:nvSpPr>
+        <p:spPr/>
+        <p:txBody>
+          <a:bodyPr/>
+          <a:lstStyle/>
+          <a:p>
+            <a:r>
+              <a:rPr lang="en-GB" dirty="0">
+                <a:latin typeface="Trebuchet MS" panose="020B0703020202090204" pitchFamily="34" charset="0"/>
+              </a:rPr>
+              <a:t>m</a:t>
+            </a:r>
+            <a:r>
+              <a:rPr lang="en-CH" dirty="0">
+                <a:latin typeface="Trebuchet MS" panose="020B0703020202090204" pitchFamily="34" charset="0"/>
+              </a:rPr>
+              <a:t>inimize</a:t>
+            </a:r>
+          </a:p>
+          <a:p>
+            <a:pPr lvl="1"/>
+            <a:r>
+              <a:rPr lang="en-GB" dirty="0">
+                <a:latin typeface="Trebuchet MS" panose="020B0703020202090204" pitchFamily="34" charset="0"/>
+              </a:rPr>
+              <a:t>detour time for driver</a:t>
+            </a:r>
+          </a:p>
+          <a:p>
+            <a:pPr lvl="1"/>
+            <a:r>
+              <a:rPr lang="en-GB" dirty="0">
+                <a:latin typeface="Trebuchet MS" panose="020B0703020202090204" pitchFamily="34" charset="0"/>
+              </a:rPr>
+              <a:t>difference between ideal departure times</a:t>
+            </a:r>
+          </a:p>
+          <a:p>
+            <a:r>
+              <a:rPr lang="en-GB" dirty="0">
+                <a:latin typeface="Trebuchet MS" panose="020B0703020202090204" pitchFamily="34" charset="0"/>
+              </a:rPr>
+              <a:t>maximize</a:t>
+            </a:r>
+          </a:p>
+          <a:p>
+            <a:pPr lvl="1"/>
+            <a:r>
+              <a:rPr lang="en-GB" dirty="0">
+                <a:latin typeface="Trebuchet MS" panose="020B0703020202090204" pitchFamily="34" charset="0"/>
+              </a:rPr>
+              <a:t>the social aspect of ridesharing</a:t>
+            </a:r>
+          </a:p>
+          <a:p>
+            <a:pPr lvl="1"/>
+            <a:r>
+              <a:rPr lang="en-GB" dirty="0">
+                <a:latin typeface="Trebuchet MS" panose="020B0703020202090204" pitchFamily="34" charset="0"/>
+              </a:rPr>
+              <a:t>comfort </a:t>
+            </a:r>
+          </a:p>
+          <a:p>
+            <a:pPr lvl="1"/>
+            <a:r>
+              <a:rPr lang="en-GB" dirty="0">
+                <a:latin typeface="Trebuchet MS" panose="020B0703020202090204" pitchFamily="34" charset="0"/>
+              </a:rPr>
+              <a:t>freedom of choice for driver/passenger</a:t>
+            </a:r>
+          </a:p>
+          <a:p>
+            <a:pPr lvl="1"/>
+            <a:r>
+              <a:rPr lang="en-GB" dirty="0">
+                <a:latin typeface="Trebuchet MS" panose="020B0703020202090204" pitchFamily="34" charset="0"/>
+              </a:rPr>
+              <a:t>reliability</a:t>
+            </a:r>
+          </a:p>
+          <a:p>
+            <a:pPr lvl="1"/>
+            <a:r>
+              <a:rPr lang="en-GB" dirty="0">
+                <a:latin typeface="Trebuchet MS" panose="020B0703020202090204" pitchFamily="34" charset="0"/>
+              </a:rPr>
+              <a:t>safety of the user</a:t>
+            </a:r>
+          </a:p>
+        </p:txBody>
+      </p:sp>
+    </p:spTree>
+    <p:extLst>
+      <p:ext uri="{BB962C8B-B14F-4D97-AF65-F5344CB8AC3E}">
+        <p14:creationId xmlns:p14="http://schemas.microsoft.com/office/powerpoint/2010/main" val="3069095141"/>
+      </p:ext>
+    </p:extLst>
+  </p:cSld>
+  <p:clrMapOvr>
+    <a:masterClrMapping/>
+  </p:clrMapOvr>
+</p:sld>
+</file>
+
+<file path=ppt/slides/slide5.xml><?xml version="1.0" encoding="utf-8"?>
+<p:sld xmlns:a="http://schemas.openxmlformats.org/drawingml/2006/main" xmlns:r="http://schemas.openxmlformats.org/officeDocument/2006/relationships" xmlns:p="http://schemas.openxmlformats.org/presentationml/2006/main">
+  <p:cSld>
+    <p:bg>
+      <p:bgPr>
+        <a:solidFill>
+          <a:schemeClr val="accent6">
+            <a:lumMod val="20000"/>
+            <a:lumOff val="80000"/>
+          </a:schemeClr>
+        </a:solidFill>
+        <a:effectLst/>
+      </p:bgPr>
+    </p:bg>
+    <p:spTree>
+      <p:nvGrpSpPr>
+        <p:cNvPr id="1" name=""/>
+        <p:cNvGrpSpPr/>
+        <p:nvPr/>
+      </p:nvGrpSpPr>
+      <p:grpSpPr>
+        <a:xfrm>
+          <a:off x="0" y="0"/>
+          <a:ext cx="0" cy="0"/>
+          <a:chOff x="0" y="0"/>
+          <a:chExt cx="0" cy="0"/>
+        </a:xfrm>
+      </p:grpSpPr>
+      <p:sp>
+        <p:nvSpPr>
+          <p:cNvPr id="2" name="Title 1">
+            <a:extLst>
+              <a:ext uri="{FF2B5EF4-FFF2-40B4-BE49-F238E27FC236}">
+                <a16:creationId xmlns:a16="http://schemas.microsoft.com/office/drawing/2014/main" id="{A5186B16-9D62-5146-B2AA-4EEE35AFAD22}"/>
+              </a:ext>
+            </a:extLst>
+          </p:cNvPr>
+          <p:cNvSpPr>
+            <a:spLocks noGrp="1"/>
+          </p:cNvSpPr>
+          <p:nvPr>
+            <p:ph type="title"/>
+          </p:nvPr>
+        </p:nvSpPr>
+        <p:spPr/>
+        <p:txBody>
+          <a:bodyPr/>
+          <a:lstStyle/>
+          <a:p>
+            <a:r>
+              <a:rPr lang="en-CH" b="1" dirty="0">
+                <a:latin typeface="Trebuchet MS" panose="020B0703020202090204" pitchFamily="34" charset="0"/>
+              </a:rPr>
+              <a:t>And how we achieve this</a:t>
+            </a:r>
+          </a:p>
+        </p:txBody>
+      </p:sp>
+      <p:sp>
+        <p:nvSpPr>
+          <p:cNvPr id="3" name="Content Placeholder 2">
+            <a:extLst>
+              <a:ext uri="{FF2B5EF4-FFF2-40B4-BE49-F238E27FC236}">
+                <a16:creationId xmlns:a16="http://schemas.microsoft.com/office/drawing/2014/main" id="{4C6BE1A8-DF59-264C-802F-A0231680D18B}"/>
+              </a:ext>
+            </a:extLst>
+          </p:cNvPr>
+          <p:cNvSpPr>
+            <a:spLocks noGrp="1"/>
+          </p:cNvSpPr>
+          <p:nvPr>
+            <p:ph idx="1"/>
+          </p:nvPr>
+        </p:nvSpPr>
+        <p:spPr/>
+        <p:txBody>
+          <a:bodyPr/>
+          <a:lstStyle/>
+          <a:p>
+            <a:r>
+              <a:rPr lang="en-GB" dirty="0">
+                <a:latin typeface="Trebuchet MS" panose="020B0703020202090204" pitchFamily="34" charset="0"/>
+              </a:rPr>
+              <a:t>t</a:t>
+            </a:r>
+            <a:r>
+              <a:rPr lang="en-CH" dirty="0">
+                <a:latin typeface="Trebuchet MS" panose="020B0703020202090204" pitchFamily="34" charset="0"/>
+              </a:rPr>
+              <a:t>he final decision lies in the hand of the driver</a:t>
+            </a:r>
+          </a:p>
+          <a:p>
+            <a:r>
+              <a:rPr lang="en-GB" dirty="0">
+                <a:latin typeface="Trebuchet MS" panose="020B0703020202090204" pitchFamily="34" charset="0"/>
+              </a:rPr>
+              <a:t>no sensitive data is shared before the both parties agreed</a:t>
+            </a:r>
+          </a:p>
+          <a:p>
+            <a:r>
+              <a:rPr lang="en-GB" dirty="0">
+                <a:latin typeface="Trebuchet MS" panose="020B0703020202090204" pitchFamily="34" charset="0"/>
+              </a:rPr>
+              <a:t>we provide the option to search for drivers with individual requirements</a:t>
+            </a:r>
+            <a:endParaRPr lang="en-CH" dirty="0">
+              <a:latin typeface="Trebuchet MS" panose="020B0703020202090204" pitchFamily="34" charset="0"/>
+            </a:endParaRPr>
           </a:p>
         </p:txBody>
       </p:sp>
@@ -3660,6 +4211,107 @@
     <p:extLst>
       <p:ext uri="{BB962C8B-B14F-4D97-AF65-F5344CB8AC3E}">
         <p14:creationId xmlns:p14="http://schemas.microsoft.com/office/powerpoint/2010/main" val="1787380573"/>
+      </p:ext>
+    </p:extLst>
+  </p:cSld>
+  <p:clrMapOvr>
+    <a:masterClrMapping/>
+  </p:clrMapOvr>
+</p:sld>
+</file>
+
+<file path=ppt/slides/slide6.xml><?xml version="1.0" encoding="utf-8"?>
+<p:sld xmlns:a="http://schemas.openxmlformats.org/drawingml/2006/main" xmlns:r="http://schemas.openxmlformats.org/officeDocument/2006/relationships" xmlns:p="http://schemas.openxmlformats.org/presentationml/2006/main">
+  <p:cSld>
+    <p:bg>
+      <p:bgPr>
+        <a:solidFill>
+          <a:schemeClr val="accent6">
+            <a:lumMod val="20000"/>
+            <a:lumOff val="80000"/>
+          </a:schemeClr>
+        </a:solidFill>
+        <a:effectLst/>
+      </p:bgPr>
+    </p:bg>
+    <p:spTree>
+      <p:nvGrpSpPr>
+        <p:cNvPr id="1" name=""/>
+        <p:cNvGrpSpPr/>
+        <p:nvPr/>
+      </p:nvGrpSpPr>
+      <p:grpSpPr>
+        <a:xfrm>
+          <a:off x="0" y="0"/>
+          <a:ext cx="0" cy="0"/>
+          <a:chOff x="0" y="0"/>
+          <a:chExt cx="0" cy="0"/>
+        </a:xfrm>
+      </p:grpSpPr>
+      <p:sp>
+        <p:nvSpPr>
+          <p:cNvPr id="2" name="Title 1">
+            <a:extLst>
+              <a:ext uri="{FF2B5EF4-FFF2-40B4-BE49-F238E27FC236}">
+                <a16:creationId xmlns:a16="http://schemas.microsoft.com/office/drawing/2014/main" id="{A5186B16-9D62-5146-B2AA-4EEE35AFAD22}"/>
+              </a:ext>
+            </a:extLst>
+          </p:cNvPr>
+          <p:cNvSpPr>
+            <a:spLocks noGrp="1"/>
+          </p:cNvSpPr>
+          <p:nvPr>
+            <p:ph type="title"/>
+          </p:nvPr>
+        </p:nvSpPr>
+        <p:spPr/>
+        <p:txBody>
+          <a:bodyPr/>
+          <a:lstStyle/>
+          <a:p>
+            <a:r>
+              <a:rPr lang="en-CH" b="1" dirty="0">
+                <a:latin typeface="Trebuchet MS" panose="020B0703020202090204" pitchFamily="34" charset="0"/>
+              </a:rPr>
+              <a:t>Template</a:t>
+            </a:r>
+          </a:p>
+        </p:txBody>
+      </p:sp>
+      <p:sp>
+        <p:nvSpPr>
+          <p:cNvPr id="3" name="Content Placeholder 2">
+            <a:extLst>
+              <a:ext uri="{FF2B5EF4-FFF2-40B4-BE49-F238E27FC236}">
+                <a16:creationId xmlns:a16="http://schemas.microsoft.com/office/drawing/2014/main" id="{4C6BE1A8-DF59-264C-802F-A0231680D18B}"/>
+              </a:ext>
+            </a:extLst>
+          </p:cNvPr>
+          <p:cNvSpPr>
+            <a:spLocks noGrp="1"/>
+          </p:cNvSpPr>
+          <p:nvPr>
+            <p:ph idx="1"/>
+          </p:nvPr>
+        </p:nvSpPr>
+        <p:spPr/>
+        <p:txBody>
+          <a:bodyPr/>
+          <a:lstStyle/>
+          <a:p>
+            <a:r>
+              <a:rPr lang="en-CH" dirty="0">
+                <a:latin typeface="Trebuchet MS" panose="020B0703020202090204" pitchFamily="34" charset="0"/>
+              </a:rPr>
+              <a:t>template</a:t>
+            </a:r>
+          </a:p>
+        </p:txBody>
+      </p:sp>
+    </p:spTree>
+    <p:extLst>
+      <p:ext uri="{BB962C8B-B14F-4D97-AF65-F5344CB8AC3E}">
+        <p14:creationId xmlns:p14="http://schemas.microsoft.com/office/powerpoint/2010/main" val="765622729"/>
       </p:ext>
     </p:extLst>
   </p:cSld>

</xml_diff>

<commit_message>
added final slide to pp
</commit_message>
<xml_diff>
--- a/static/dachfenster-pitch.pptx
+++ b/static/dachfenster-pitch.pptx
@@ -11,6 +11,8 @@
     <p:sldId id="260" r:id="rId5"/>
     <p:sldId id="257" r:id="rId6"/>
     <p:sldId id="261" r:id="rId7"/>
+    <p:sldId id="262" r:id="rId8"/>
+    <p:sldId id="263" r:id="rId9"/>
   </p:sldIdLst>
   <p:sldSz cx="12192000" cy="6858000"/>
   <p:notesSz cx="6858000" cy="9144000"/>
@@ -4049,7 +4051,7 @@
               <a:rPr lang="en-GB" dirty="0">
                 <a:latin typeface="Trebuchet MS" panose="020B0703020202090204" pitchFamily="34" charset="0"/>
               </a:rPr>
-              <a:t>comfort </a:t>
+              <a:t>comfort</a:t>
             </a:r>
           </a:p>
           <a:p>
@@ -4270,10 +4272,16 @@
           <a:lstStyle/>
           <a:p>
             <a:r>
+              <a:rPr lang="en-GB" b="1" dirty="0">
+                <a:latin typeface="Trebuchet MS" panose="020B0703020202090204" pitchFamily="34" charset="0"/>
+              </a:rPr>
+              <a:t>S</a:t>
+            </a:r>
+            <a:r>
               <a:rPr lang="en-CH" b="1" dirty="0">
                 <a:latin typeface="Trebuchet MS" panose="020B0703020202090204" pitchFamily="34" charset="0"/>
               </a:rPr>
-              <a:t>Template</a:t>
+              <a:t>hort Demo</a:t>
             </a:r>
           </a:p>
         </p:txBody>
@@ -4300,11 +4308,40 @@
           <a:lstStyle/>
           <a:p>
             <a:r>
-              <a:rPr lang="en-CH" dirty="0">
-                <a:latin typeface="Trebuchet MS" panose="020B0703020202090204" pitchFamily="34" charset="0"/>
-              </a:rPr>
-              <a:t>template</a:t>
-            </a:r>
+              <a:rPr lang="en-GB" dirty="0">
+                <a:latin typeface="Trebuchet MS" panose="020B0703020202090204" pitchFamily="34" charset="0"/>
+              </a:rPr>
+              <a:t>both perspectives</a:t>
+            </a:r>
+          </a:p>
+          <a:p>
+            <a:pPr lvl="1"/>
+            <a:r>
+              <a:rPr lang="en-GB" dirty="0">
+                <a:latin typeface="Trebuchet MS" panose="020B0703020202090204" pitchFamily="34" charset="0"/>
+              </a:rPr>
+              <a:t>driver</a:t>
+            </a:r>
+          </a:p>
+          <a:p>
+            <a:pPr lvl="1"/>
+            <a:r>
+              <a:rPr lang="en-GB" dirty="0">
+                <a:latin typeface="Trebuchet MS" panose="020B0703020202090204" pitchFamily="34" charset="0"/>
+              </a:rPr>
+              <a:t>passenger</a:t>
+            </a:r>
+          </a:p>
+          <a:p>
+            <a:endParaRPr lang="en-GB" dirty="0">
+              <a:latin typeface="Trebuchet MS" panose="020B0703020202090204" pitchFamily="34" charset="0"/>
+            </a:endParaRPr>
+          </a:p>
+          <a:p>
+            <a:pPr lvl="1"/>
+            <a:endParaRPr lang="en-CH" dirty="0">
+              <a:latin typeface="Trebuchet MS" panose="020B0703020202090204" pitchFamily="34" charset="0"/>
+            </a:endParaRPr>
           </a:p>
         </p:txBody>
       </p:sp>
@@ -4312,6 +4349,231 @@
     <p:extLst>
       <p:ext uri="{BB962C8B-B14F-4D97-AF65-F5344CB8AC3E}">
         <p14:creationId xmlns:p14="http://schemas.microsoft.com/office/powerpoint/2010/main" val="765622729"/>
+      </p:ext>
+    </p:extLst>
+  </p:cSld>
+  <p:clrMapOvr>
+    <a:masterClrMapping/>
+  </p:clrMapOvr>
+</p:sld>
+</file>
+
+<file path=ppt/slides/slide7.xml><?xml version="1.0" encoding="utf-8"?>
+<p:sld xmlns:a="http://schemas.openxmlformats.org/drawingml/2006/main" xmlns:r="http://schemas.openxmlformats.org/officeDocument/2006/relationships" xmlns:p="http://schemas.openxmlformats.org/presentationml/2006/main">
+  <p:cSld>
+    <p:bg>
+      <p:bgPr>
+        <a:solidFill>
+          <a:schemeClr val="accent6">
+            <a:lumMod val="20000"/>
+            <a:lumOff val="80000"/>
+          </a:schemeClr>
+        </a:solidFill>
+        <a:effectLst/>
+      </p:bgPr>
+    </p:bg>
+    <p:spTree>
+      <p:nvGrpSpPr>
+        <p:cNvPr id="1" name=""/>
+        <p:cNvGrpSpPr/>
+        <p:nvPr/>
+      </p:nvGrpSpPr>
+      <p:grpSpPr>
+        <a:xfrm>
+          <a:off x="0" y="0"/>
+          <a:ext cx="0" cy="0"/>
+          <a:chOff x="0" y="0"/>
+          <a:chExt cx="0" cy="0"/>
+        </a:xfrm>
+      </p:grpSpPr>
+      <p:sp>
+        <p:nvSpPr>
+          <p:cNvPr id="2" name="Title 1">
+            <a:extLst>
+              <a:ext uri="{FF2B5EF4-FFF2-40B4-BE49-F238E27FC236}">
+                <a16:creationId xmlns:a16="http://schemas.microsoft.com/office/drawing/2014/main" id="{A5186B16-9D62-5146-B2AA-4EEE35AFAD22}"/>
+              </a:ext>
+            </a:extLst>
+          </p:cNvPr>
+          <p:cNvSpPr>
+            <a:spLocks noGrp="1"/>
+          </p:cNvSpPr>
+          <p:nvPr>
+            <p:ph type="title"/>
+          </p:nvPr>
+        </p:nvSpPr>
+        <p:spPr>
+          <a:xfrm>
+            <a:off x="838200" y="1558307"/>
+            <a:ext cx="10515600" cy="1325563"/>
+          </a:xfrm>
+        </p:spPr>
+        <p:txBody>
+          <a:bodyPr/>
+          <a:lstStyle/>
+          <a:p>
+            <a:pPr algn="ctr"/>
+            <a:r>
+              <a:rPr lang="en-CH" b="1" dirty="0">
+                <a:latin typeface="Trebuchet MS" panose="020B0703020202090204" pitchFamily="34" charset="0"/>
+              </a:rPr>
+              <a:t>Thank you all for these great 24h!!</a:t>
+            </a:r>
+          </a:p>
+        </p:txBody>
+      </p:sp>
+      <p:pic>
+        <p:nvPicPr>
+          <p:cNvPr id="1026" name="Picture 2">
+            <a:extLst>
+              <a:ext uri="{FF2B5EF4-FFF2-40B4-BE49-F238E27FC236}">
+                <a16:creationId xmlns:a16="http://schemas.microsoft.com/office/drawing/2014/main" id="{4FFBB905-2827-0445-AECA-D03989983137}"/>
+              </a:ext>
+            </a:extLst>
+          </p:cNvPr>
+          <p:cNvPicPr>
+            <a:picLocks noChangeAspect="1" noChangeArrowheads="1"/>
+          </p:cNvPicPr>
+          <p:nvPr/>
+        </p:nvPicPr>
+        <p:blipFill>
+          <a:blip r:embed="rId2">
+            <a:extLst>
+              <a:ext uri="{28A0092B-C50C-407E-A947-70E740481C1C}">
+                <a14:useLocalDpi xmlns:a14="http://schemas.microsoft.com/office/drawing/2010/main" val="0"/>
+              </a:ext>
+            </a:extLst>
+          </a:blip>
+          <a:srcRect/>
+          <a:stretch>
+            <a:fillRect/>
+          </a:stretch>
+        </p:blipFill>
+        <p:spPr bwMode="auto">
+          <a:xfrm>
+            <a:off x="2115255" y="2587299"/>
+            <a:ext cx="7961489" cy="3503055"/>
+          </a:xfrm>
+          <a:prstGeom prst="rect">
+            <a:avLst/>
+          </a:prstGeom>
+          <a:noFill/>
+          <a:extLst>
+            <a:ext uri="{909E8E84-426E-40DD-AFC4-6F175D3DCCD1}">
+              <a14:hiddenFill xmlns:a14="http://schemas.microsoft.com/office/drawing/2010/main">
+                <a:solidFill>
+                  <a:srgbClr val="FFFFFF"/>
+                </a:solidFill>
+              </a14:hiddenFill>
+            </a:ext>
+          </a:extLst>
+        </p:spPr>
+      </p:pic>
+    </p:spTree>
+    <p:extLst>
+      <p:ext uri="{BB962C8B-B14F-4D97-AF65-F5344CB8AC3E}">
+        <p14:creationId xmlns:p14="http://schemas.microsoft.com/office/powerpoint/2010/main" val="2175441236"/>
+      </p:ext>
+    </p:extLst>
+  </p:cSld>
+  <p:clrMapOvr>
+    <a:masterClrMapping/>
+  </p:clrMapOvr>
+</p:sld>
+</file>
+
+<file path=ppt/slides/slide8.xml><?xml version="1.0" encoding="utf-8"?>
+<p:sld xmlns:a="http://schemas.openxmlformats.org/drawingml/2006/main" xmlns:r="http://schemas.openxmlformats.org/officeDocument/2006/relationships" xmlns:p="http://schemas.openxmlformats.org/presentationml/2006/main">
+  <p:cSld>
+    <p:bg>
+      <p:bgPr>
+        <a:solidFill>
+          <a:schemeClr val="accent6">
+            <a:lumMod val="20000"/>
+            <a:lumOff val="80000"/>
+          </a:schemeClr>
+        </a:solidFill>
+        <a:effectLst/>
+      </p:bgPr>
+    </p:bg>
+    <p:spTree>
+      <p:nvGrpSpPr>
+        <p:cNvPr id="1" name=""/>
+        <p:cNvGrpSpPr/>
+        <p:nvPr/>
+      </p:nvGrpSpPr>
+      <p:grpSpPr>
+        <a:xfrm>
+          <a:off x="0" y="0"/>
+          <a:ext cx="0" cy="0"/>
+          <a:chOff x="0" y="0"/>
+          <a:chExt cx="0" cy="0"/>
+        </a:xfrm>
+      </p:grpSpPr>
+      <p:sp>
+        <p:nvSpPr>
+          <p:cNvPr id="2" name="Title 1">
+            <a:extLst>
+              <a:ext uri="{FF2B5EF4-FFF2-40B4-BE49-F238E27FC236}">
+                <a16:creationId xmlns:a16="http://schemas.microsoft.com/office/drawing/2014/main" id="{A5186B16-9D62-5146-B2AA-4EEE35AFAD22}"/>
+              </a:ext>
+            </a:extLst>
+          </p:cNvPr>
+          <p:cNvSpPr>
+            <a:spLocks noGrp="1"/>
+          </p:cNvSpPr>
+          <p:nvPr>
+            <p:ph type="title"/>
+          </p:nvPr>
+        </p:nvSpPr>
+        <p:spPr/>
+        <p:txBody>
+          <a:bodyPr/>
+          <a:lstStyle/>
+          <a:p>
+            <a:r>
+              <a:rPr lang="en-CH" b="1" dirty="0">
+                <a:latin typeface="Trebuchet MS" panose="020B0703020202090204" pitchFamily="34" charset="0"/>
+              </a:rPr>
+              <a:t>Template</a:t>
+            </a:r>
+          </a:p>
+        </p:txBody>
+      </p:sp>
+      <p:sp>
+        <p:nvSpPr>
+          <p:cNvPr id="3" name="Content Placeholder 2">
+            <a:extLst>
+              <a:ext uri="{FF2B5EF4-FFF2-40B4-BE49-F238E27FC236}">
+                <a16:creationId xmlns:a16="http://schemas.microsoft.com/office/drawing/2014/main" id="{4C6BE1A8-DF59-264C-802F-A0231680D18B}"/>
+              </a:ext>
+            </a:extLst>
+          </p:cNvPr>
+          <p:cNvSpPr>
+            <a:spLocks noGrp="1"/>
+          </p:cNvSpPr>
+          <p:nvPr>
+            <p:ph idx="1"/>
+          </p:nvPr>
+        </p:nvSpPr>
+        <p:spPr/>
+        <p:txBody>
+          <a:bodyPr/>
+          <a:lstStyle/>
+          <a:p>
+            <a:r>
+              <a:rPr lang="en-CH" dirty="0">
+                <a:latin typeface="Trebuchet MS" panose="020B0703020202090204" pitchFamily="34" charset="0"/>
+              </a:rPr>
+              <a:t>template</a:t>
+            </a:r>
+          </a:p>
+        </p:txBody>
+      </p:sp>
+    </p:spTree>
+    <p:extLst>
+      <p:ext uri="{BB962C8B-B14F-4D97-AF65-F5344CB8AC3E}">
+        <p14:creationId xmlns:p14="http://schemas.microsoft.com/office/powerpoint/2010/main" val="2054443711"/>
       </p:ext>
     </p:extLst>
   </p:cSld>

</xml_diff>

<commit_message>
ppp introduction notes done
</commit_message>
<xml_diff>
--- a/static/dachfenster-pitch.pptx
+++ b/static/dachfenster-pitch.pptx
@@ -4,15 +4,19 @@
   <p:sldMasterIdLst>
     <p:sldMasterId id="2147483648" r:id="rId1"/>
   </p:sldMasterIdLst>
+  <p:notesMasterIdLst>
+    <p:notesMasterId r:id="rId11"/>
+  </p:notesMasterIdLst>
   <p:sldIdLst>
     <p:sldId id="256" r:id="rId2"/>
-    <p:sldId id="259" r:id="rId3"/>
-    <p:sldId id="258" r:id="rId4"/>
-    <p:sldId id="260" r:id="rId5"/>
-    <p:sldId id="257" r:id="rId6"/>
-    <p:sldId id="261" r:id="rId7"/>
-    <p:sldId id="262" r:id="rId8"/>
-    <p:sldId id="263" r:id="rId9"/>
+    <p:sldId id="264" r:id="rId3"/>
+    <p:sldId id="259" r:id="rId4"/>
+    <p:sldId id="258" r:id="rId5"/>
+    <p:sldId id="260" r:id="rId6"/>
+    <p:sldId id="257" r:id="rId7"/>
+    <p:sldId id="261" r:id="rId8"/>
+    <p:sldId id="262" r:id="rId9"/>
+    <p:sldId id="263" r:id="rId10"/>
   </p:sldIdLst>
   <p:sldSz cx="12192000" cy="6858000"/>
   <p:notesSz cx="6858000" cy="9144000"/>
@@ -111,7 +115,647 @@
       </a:defRPr>
     </a:lvl9pPr>
   </p:defaultTextStyle>
+  <p:extLst>
+    <p:ext uri="{EFAFB233-063F-42B5-8137-9DF3F51BA10A}">
+      <p15:sldGuideLst xmlns:p15="http://schemas.microsoft.com/office/powerpoint/2012/main"/>
+    </p:ext>
+  </p:extLst>
 </p:presentation>
+</file>
+
+<file path=ppt/notesMasters/notesMaster1.xml><?xml version="1.0" encoding="utf-8"?>
+<p:notesMaster xmlns:a="http://schemas.openxmlformats.org/drawingml/2006/main" xmlns:r="http://schemas.openxmlformats.org/officeDocument/2006/relationships" xmlns:p="http://schemas.openxmlformats.org/presentationml/2006/main">
+  <p:cSld>
+    <p:bg>
+      <p:bgRef idx="1001">
+        <a:schemeClr val="bg1"/>
+      </p:bgRef>
+    </p:bg>
+    <p:spTree>
+      <p:nvGrpSpPr>
+        <p:cNvPr id="1" name=""/>
+        <p:cNvGrpSpPr/>
+        <p:nvPr/>
+      </p:nvGrpSpPr>
+      <p:grpSpPr>
+        <a:xfrm>
+          <a:off x="0" y="0"/>
+          <a:ext cx="0" cy="0"/>
+          <a:chOff x="0" y="0"/>
+          <a:chExt cx="0" cy="0"/>
+        </a:xfrm>
+      </p:grpSpPr>
+      <p:sp>
+        <p:nvSpPr>
+          <p:cNvPr id="2" name="Header Placeholder 1"/>
+          <p:cNvSpPr>
+            <a:spLocks noGrp="1"/>
+          </p:cNvSpPr>
+          <p:nvPr>
+            <p:ph type="hdr" sz="quarter"/>
+          </p:nvPr>
+        </p:nvSpPr>
+        <p:spPr>
+          <a:xfrm>
+            <a:off x="0" y="0"/>
+            <a:ext cx="2971800" cy="458788"/>
+          </a:xfrm>
+          <a:prstGeom prst="rect">
+            <a:avLst/>
+          </a:prstGeom>
+        </p:spPr>
+        <p:txBody>
+          <a:bodyPr vert="horz" lIns="91440" tIns="45720" rIns="91440" bIns="45720" rtlCol="0"/>
+          <a:lstStyle>
+            <a:lvl1pPr algn="l">
+              <a:defRPr sz="1200"/>
+            </a:lvl1pPr>
+          </a:lstStyle>
+          <a:p>
+            <a:endParaRPr lang="en-CH"/>
+          </a:p>
+        </p:txBody>
+      </p:sp>
+      <p:sp>
+        <p:nvSpPr>
+          <p:cNvPr id="3" name="Date Placeholder 2"/>
+          <p:cNvSpPr>
+            <a:spLocks noGrp="1"/>
+          </p:cNvSpPr>
+          <p:nvPr>
+            <p:ph type="dt" idx="1"/>
+          </p:nvPr>
+        </p:nvSpPr>
+        <p:spPr>
+          <a:xfrm>
+            <a:off x="3884613" y="0"/>
+            <a:ext cx="2971800" cy="458788"/>
+          </a:xfrm>
+          <a:prstGeom prst="rect">
+            <a:avLst/>
+          </a:prstGeom>
+        </p:spPr>
+        <p:txBody>
+          <a:bodyPr vert="horz" lIns="91440" tIns="45720" rIns="91440" bIns="45720" rtlCol="0"/>
+          <a:lstStyle>
+            <a:lvl1pPr algn="r">
+              <a:defRPr sz="1200"/>
+            </a:lvl1pPr>
+          </a:lstStyle>
+          <a:p>
+            <a:fld id="{73218D51-C95A-FF41-B210-41C70A265100}" type="datetimeFigureOut">
+              <a:rPr lang="en-CH" smtClean="0"/>
+              <a:t>09.10.21</a:t>
+            </a:fld>
+            <a:endParaRPr lang="en-CH"/>
+          </a:p>
+        </p:txBody>
+      </p:sp>
+      <p:sp>
+        <p:nvSpPr>
+          <p:cNvPr id="4" name="Slide Image Placeholder 3"/>
+          <p:cNvSpPr>
+            <a:spLocks noGrp="1" noRot="1" noChangeAspect="1"/>
+          </p:cNvSpPr>
+          <p:nvPr>
+            <p:ph type="sldImg" idx="2"/>
+          </p:nvPr>
+        </p:nvSpPr>
+        <p:spPr>
+          <a:xfrm>
+            <a:off x="685800" y="1143000"/>
+            <a:ext cx="5486400" cy="3086100"/>
+          </a:xfrm>
+          <a:prstGeom prst="rect">
+            <a:avLst/>
+          </a:prstGeom>
+          <a:noFill/>
+          <a:ln w="12700">
+            <a:solidFill>
+              <a:prstClr val="black"/>
+            </a:solidFill>
+          </a:ln>
+        </p:spPr>
+        <p:txBody>
+          <a:bodyPr vert="horz" lIns="91440" tIns="45720" rIns="91440" bIns="45720" rtlCol="0" anchor="ctr"/>
+          <a:lstStyle/>
+          <a:p>
+            <a:endParaRPr lang="en-CH"/>
+          </a:p>
+        </p:txBody>
+      </p:sp>
+      <p:sp>
+        <p:nvSpPr>
+          <p:cNvPr id="5" name="Notes Placeholder 4"/>
+          <p:cNvSpPr>
+            <a:spLocks noGrp="1"/>
+          </p:cNvSpPr>
+          <p:nvPr>
+            <p:ph type="body" sz="quarter" idx="3"/>
+          </p:nvPr>
+        </p:nvSpPr>
+        <p:spPr>
+          <a:xfrm>
+            <a:off x="685800" y="4400550"/>
+            <a:ext cx="5486400" cy="3600450"/>
+          </a:xfrm>
+          <a:prstGeom prst="rect">
+            <a:avLst/>
+          </a:prstGeom>
+        </p:spPr>
+        <p:txBody>
+          <a:bodyPr vert="horz" lIns="91440" tIns="45720" rIns="91440" bIns="45720" rtlCol="0"/>
+          <a:lstStyle/>
+          <a:p>
+            <a:pPr lvl="0"/>
+            <a:r>
+              <a:rPr lang="en-GB"/>
+              <a:t>Click to edit Master text styles</a:t>
+            </a:r>
+          </a:p>
+          <a:p>
+            <a:pPr lvl="1"/>
+            <a:r>
+              <a:rPr lang="en-GB"/>
+              <a:t>Second level</a:t>
+            </a:r>
+          </a:p>
+          <a:p>
+            <a:pPr lvl="2"/>
+            <a:r>
+              <a:rPr lang="en-GB"/>
+              <a:t>Third level</a:t>
+            </a:r>
+          </a:p>
+          <a:p>
+            <a:pPr lvl="3"/>
+            <a:r>
+              <a:rPr lang="en-GB"/>
+              <a:t>Fourth level</a:t>
+            </a:r>
+          </a:p>
+          <a:p>
+            <a:pPr lvl="4"/>
+            <a:r>
+              <a:rPr lang="en-GB"/>
+              <a:t>Fifth level</a:t>
+            </a:r>
+            <a:endParaRPr lang="en-CH"/>
+          </a:p>
+        </p:txBody>
+      </p:sp>
+      <p:sp>
+        <p:nvSpPr>
+          <p:cNvPr id="6" name="Footer Placeholder 5"/>
+          <p:cNvSpPr>
+            <a:spLocks noGrp="1"/>
+          </p:cNvSpPr>
+          <p:nvPr>
+            <p:ph type="ftr" sz="quarter" idx="4"/>
+          </p:nvPr>
+        </p:nvSpPr>
+        <p:spPr>
+          <a:xfrm>
+            <a:off x="0" y="8685213"/>
+            <a:ext cx="2971800" cy="458787"/>
+          </a:xfrm>
+          <a:prstGeom prst="rect">
+            <a:avLst/>
+          </a:prstGeom>
+        </p:spPr>
+        <p:txBody>
+          <a:bodyPr vert="horz" lIns="91440" tIns="45720" rIns="91440" bIns="45720" rtlCol="0" anchor="b"/>
+          <a:lstStyle>
+            <a:lvl1pPr algn="l">
+              <a:defRPr sz="1200"/>
+            </a:lvl1pPr>
+          </a:lstStyle>
+          <a:p>
+            <a:endParaRPr lang="en-CH"/>
+          </a:p>
+        </p:txBody>
+      </p:sp>
+      <p:sp>
+        <p:nvSpPr>
+          <p:cNvPr id="7" name="Slide Number Placeholder 6"/>
+          <p:cNvSpPr>
+            <a:spLocks noGrp="1"/>
+          </p:cNvSpPr>
+          <p:nvPr>
+            <p:ph type="sldNum" sz="quarter" idx="5"/>
+          </p:nvPr>
+        </p:nvSpPr>
+        <p:spPr>
+          <a:xfrm>
+            <a:off x="3884613" y="8685213"/>
+            <a:ext cx="2971800" cy="458787"/>
+          </a:xfrm>
+          <a:prstGeom prst="rect">
+            <a:avLst/>
+          </a:prstGeom>
+        </p:spPr>
+        <p:txBody>
+          <a:bodyPr vert="horz" lIns="91440" tIns="45720" rIns="91440" bIns="45720" rtlCol="0" anchor="b"/>
+          <a:lstStyle>
+            <a:lvl1pPr algn="r">
+              <a:defRPr sz="1200"/>
+            </a:lvl1pPr>
+          </a:lstStyle>
+          <a:p>
+            <a:fld id="{4F9EB7BC-E3FE-644B-A8BB-DE59933EA7C3}" type="slidenum">
+              <a:rPr lang="en-CH" smtClean="0"/>
+              <a:t>‹#›</a:t>
+            </a:fld>
+            <a:endParaRPr lang="en-CH"/>
+          </a:p>
+        </p:txBody>
+      </p:sp>
+    </p:spTree>
+    <p:extLst>
+      <p:ext uri="{BB962C8B-B14F-4D97-AF65-F5344CB8AC3E}">
+        <p14:creationId xmlns:p14="http://schemas.microsoft.com/office/powerpoint/2010/main" val="1138449336"/>
+      </p:ext>
+    </p:extLst>
+  </p:cSld>
+  <p:clrMap bg1="lt1" tx1="dk1" bg2="lt2" tx2="dk2" accent1="accent1" accent2="accent2" accent3="accent3" accent4="accent4" accent5="accent5" accent6="accent6" hlink="hlink" folHlink="folHlink"/>
+  <p:notesStyle>
+    <a:lvl1pPr marL="0" algn="l" defTabSz="914400" rtl="0" eaLnBrk="1" latinLnBrk="0" hangingPunct="1">
+      <a:defRPr sz="1200" kern="1200">
+        <a:solidFill>
+          <a:schemeClr val="tx1"/>
+        </a:solidFill>
+        <a:latin typeface="+mn-lt"/>
+        <a:ea typeface="+mn-ea"/>
+        <a:cs typeface="+mn-cs"/>
+      </a:defRPr>
+    </a:lvl1pPr>
+    <a:lvl2pPr marL="457200" algn="l" defTabSz="914400" rtl="0" eaLnBrk="1" latinLnBrk="0" hangingPunct="1">
+      <a:defRPr sz="1200" kern="1200">
+        <a:solidFill>
+          <a:schemeClr val="tx1"/>
+        </a:solidFill>
+        <a:latin typeface="+mn-lt"/>
+        <a:ea typeface="+mn-ea"/>
+        <a:cs typeface="+mn-cs"/>
+      </a:defRPr>
+    </a:lvl2pPr>
+    <a:lvl3pPr marL="914400" algn="l" defTabSz="914400" rtl="0" eaLnBrk="1" latinLnBrk="0" hangingPunct="1">
+      <a:defRPr sz="1200" kern="1200">
+        <a:solidFill>
+          <a:schemeClr val="tx1"/>
+        </a:solidFill>
+        <a:latin typeface="+mn-lt"/>
+        <a:ea typeface="+mn-ea"/>
+        <a:cs typeface="+mn-cs"/>
+      </a:defRPr>
+    </a:lvl3pPr>
+    <a:lvl4pPr marL="1371600" algn="l" defTabSz="914400" rtl="0" eaLnBrk="1" latinLnBrk="0" hangingPunct="1">
+      <a:defRPr sz="1200" kern="1200">
+        <a:solidFill>
+          <a:schemeClr val="tx1"/>
+        </a:solidFill>
+        <a:latin typeface="+mn-lt"/>
+        <a:ea typeface="+mn-ea"/>
+        <a:cs typeface="+mn-cs"/>
+      </a:defRPr>
+    </a:lvl4pPr>
+    <a:lvl5pPr marL="1828800" algn="l" defTabSz="914400" rtl="0" eaLnBrk="1" latinLnBrk="0" hangingPunct="1">
+      <a:defRPr sz="1200" kern="1200">
+        <a:solidFill>
+          <a:schemeClr val="tx1"/>
+        </a:solidFill>
+        <a:latin typeface="+mn-lt"/>
+        <a:ea typeface="+mn-ea"/>
+        <a:cs typeface="+mn-cs"/>
+      </a:defRPr>
+    </a:lvl5pPr>
+    <a:lvl6pPr marL="2286000" algn="l" defTabSz="914400" rtl="0" eaLnBrk="1" latinLnBrk="0" hangingPunct="1">
+      <a:defRPr sz="1200" kern="1200">
+        <a:solidFill>
+          <a:schemeClr val="tx1"/>
+        </a:solidFill>
+        <a:latin typeface="+mn-lt"/>
+        <a:ea typeface="+mn-ea"/>
+        <a:cs typeface="+mn-cs"/>
+      </a:defRPr>
+    </a:lvl6pPr>
+    <a:lvl7pPr marL="2743200" algn="l" defTabSz="914400" rtl="0" eaLnBrk="1" latinLnBrk="0" hangingPunct="1">
+      <a:defRPr sz="1200" kern="1200">
+        <a:solidFill>
+          <a:schemeClr val="tx1"/>
+        </a:solidFill>
+        <a:latin typeface="+mn-lt"/>
+        <a:ea typeface="+mn-ea"/>
+        <a:cs typeface="+mn-cs"/>
+      </a:defRPr>
+    </a:lvl7pPr>
+    <a:lvl8pPr marL="3200400" algn="l" defTabSz="914400" rtl="0" eaLnBrk="1" latinLnBrk="0" hangingPunct="1">
+      <a:defRPr sz="1200" kern="1200">
+        <a:solidFill>
+          <a:schemeClr val="tx1"/>
+        </a:solidFill>
+        <a:latin typeface="+mn-lt"/>
+        <a:ea typeface="+mn-ea"/>
+        <a:cs typeface="+mn-cs"/>
+      </a:defRPr>
+    </a:lvl8pPr>
+    <a:lvl9pPr marL="3657600" algn="l" defTabSz="914400" rtl="0" eaLnBrk="1" latinLnBrk="0" hangingPunct="1">
+      <a:defRPr sz="1200" kern="1200">
+        <a:solidFill>
+          <a:schemeClr val="tx1"/>
+        </a:solidFill>
+        <a:latin typeface="+mn-lt"/>
+        <a:ea typeface="+mn-ea"/>
+        <a:cs typeface="+mn-cs"/>
+      </a:defRPr>
+    </a:lvl9pPr>
+  </p:notesStyle>
+</p:notesMaster>
+</file>
+
+<file path=ppt/notesSlides/notesSlide1.xml><?xml version="1.0" encoding="utf-8"?>
+<p:notes xmlns:a="http://schemas.openxmlformats.org/drawingml/2006/main" xmlns:r="http://schemas.openxmlformats.org/officeDocument/2006/relationships" xmlns:p="http://schemas.openxmlformats.org/presentationml/2006/main">
+  <p:cSld>
+    <p:spTree>
+      <p:nvGrpSpPr>
+        <p:cNvPr id="1" name=""/>
+        <p:cNvGrpSpPr/>
+        <p:nvPr/>
+      </p:nvGrpSpPr>
+      <p:grpSpPr>
+        <a:xfrm>
+          <a:off x="0" y="0"/>
+          <a:ext cx="0" cy="0"/>
+          <a:chOff x="0" y="0"/>
+          <a:chExt cx="0" cy="0"/>
+        </a:xfrm>
+      </p:grpSpPr>
+      <p:sp>
+        <p:nvSpPr>
+          <p:cNvPr id="2" name="Slide Image Placeholder 1"/>
+          <p:cNvSpPr>
+            <a:spLocks noGrp="1" noRot="1" noChangeAspect="1"/>
+          </p:cNvSpPr>
+          <p:nvPr>
+            <p:ph type="sldImg"/>
+          </p:nvPr>
+        </p:nvSpPr>
+        <p:spPr/>
+      </p:sp>
+      <p:sp>
+        <p:nvSpPr>
+          <p:cNvPr id="3" name="Notes Placeholder 2"/>
+          <p:cNvSpPr>
+            <a:spLocks noGrp="1"/>
+          </p:cNvSpPr>
+          <p:nvPr>
+            <p:ph type="body" idx="1"/>
+          </p:nvPr>
+        </p:nvSpPr>
+        <p:spPr/>
+        <p:txBody>
+          <a:bodyPr/>
+          <a:lstStyle/>
+          <a:p>
+            <a:r>
+              <a:rPr lang="en-CH" dirty="0"/>
+              <a:t>Hello Guys</a:t>
+            </a:r>
+          </a:p>
+          <a:p>
+            <a:endParaRPr lang="en-CH" dirty="0"/>
+          </a:p>
+          <a:p>
+            <a:r>
+              <a:rPr lang="en-CH" dirty="0"/>
+              <a:t>The Team “La Girafe” welcomes you at the our pitch.</a:t>
+            </a:r>
+          </a:p>
+        </p:txBody>
+      </p:sp>
+      <p:sp>
+        <p:nvSpPr>
+          <p:cNvPr id="4" name="Slide Number Placeholder 3"/>
+          <p:cNvSpPr>
+            <a:spLocks noGrp="1"/>
+          </p:cNvSpPr>
+          <p:nvPr>
+            <p:ph type="sldNum" sz="quarter" idx="5"/>
+          </p:nvPr>
+        </p:nvSpPr>
+        <p:spPr/>
+        <p:txBody>
+          <a:bodyPr/>
+          <a:lstStyle/>
+          <a:p>
+            <a:fld id="{4F9EB7BC-E3FE-644B-A8BB-DE59933EA7C3}" type="slidenum">
+              <a:rPr lang="en-CH" smtClean="0"/>
+              <a:t>1</a:t>
+            </a:fld>
+            <a:endParaRPr lang="en-CH"/>
+          </a:p>
+        </p:txBody>
+      </p:sp>
+    </p:spTree>
+    <p:extLst>
+      <p:ext uri="{BB962C8B-B14F-4D97-AF65-F5344CB8AC3E}">
+        <p14:creationId xmlns:p14="http://schemas.microsoft.com/office/powerpoint/2010/main" val="3478995010"/>
+      </p:ext>
+    </p:extLst>
+  </p:cSld>
+  <p:clrMapOvr>
+    <a:masterClrMapping/>
+  </p:clrMapOvr>
+</p:notes>
+</file>
+
+<file path=ppt/notesSlides/notesSlide2.xml><?xml version="1.0" encoding="utf-8"?>
+<p:notes xmlns:a="http://schemas.openxmlformats.org/drawingml/2006/main" xmlns:r="http://schemas.openxmlformats.org/officeDocument/2006/relationships" xmlns:p="http://schemas.openxmlformats.org/presentationml/2006/main">
+  <p:cSld>
+    <p:spTree>
+      <p:nvGrpSpPr>
+        <p:cNvPr id="1" name=""/>
+        <p:cNvGrpSpPr/>
+        <p:nvPr/>
+      </p:nvGrpSpPr>
+      <p:grpSpPr>
+        <a:xfrm>
+          <a:off x="0" y="0"/>
+          <a:ext cx="0" cy="0"/>
+          <a:chOff x="0" y="0"/>
+          <a:chExt cx="0" cy="0"/>
+        </a:xfrm>
+      </p:grpSpPr>
+      <p:sp>
+        <p:nvSpPr>
+          <p:cNvPr id="2" name="Slide Image Placeholder 1"/>
+          <p:cNvSpPr>
+            <a:spLocks noGrp="1" noRot="1" noChangeAspect="1"/>
+          </p:cNvSpPr>
+          <p:nvPr>
+            <p:ph type="sldImg"/>
+          </p:nvPr>
+        </p:nvSpPr>
+        <p:spPr/>
+      </p:sp>
+      <p:sp>
+        <p:nvSpPr>
+          <p:cNvPr id="3" name="Notes Placeholder 2"/>
+          <p:cNvSpPr>
+            <a:spLocks noGrp="1"/>
+          </p:cNvSpPr>
+          <p:nvPr>
+            <p:ph type="body" idx="1"/>
+          </p:nvPr>
+        </p:nvSpPr>
+        <p:spPr/>
+        <p:txBody>
+          <a:bodyPr/>
+          <a:lstStyle/>
+          <a:p>
+            <a:r>
+              <a:rPr lang="en-CH" dirty="0"/>
+              <a:t>Im happy to present you our Project “Dachfenster”. </a:t>
+            </a:r>
+          </a:p>
+          <a:p>
+            <a:endParaRPr lang="en-CH" dirty="0"/>
+          </a:p>
+          <a:p>
+            <a:r>
+              <a:rPr lang="en-CH" dirty="0"/>
+              <a:t>You might ask yourself why we gave our project this exotic name. </a:t>
+            </a:r>
+          </a:p>
+          <a:p>
+            <a:endParaRPr lang="en-CH" dirty="0"/>
+          </a:p>
+          <a:p>
+            <a:r>
+              <a:rPr lang="en-CH" dirty="0"/>
+              <a:t>It is simply beacause we intend to provide ridesharing for a broad target group, even as exotic as our heraldic animal, the girafe. </a:t>
+            </a:r>
+          </a:p>
+        </p:txBody>
+      </p:sp>
+      <p:sp>
+        <p:nvSpPr>
+          <p:cNvPr id="4" name="Slide Number Placeholder 3"/>
+          <p:cNvSpPr>
+            <a:spLocks noGrp="1"/>
+          </p:cNvSpPr>
+          <p:nvPr>
+            <p:ph type="sldNum" sz="quarter" idx="5"/>
+          </p:nvPr>
+        </p:nvSpPr>
+        <p:spPr/>
+        <p:txBody>
+          <a:bodyPr/>
+          <a:lstStyle/>
+          <a:p>
+            <a:fld id="{4F9EB7BC-E3FE-644B-A8BB-DE59933EA7C3}" type="slidenum">
+              <a:rPr lang="en-CH" smtClean="0"/>
+              <a:t>2</a:t>
+            </a:fld>
+            <a:endParaRPr lang="en-CH"/>
+          </a:p>
+        </p:txBody>
+      </p:sp>
+    </p:spTree>
+    <p:extLst>
+      <p:ext uri="{BB962C8B-B14F-4D97-AF65-F5344CB8AC3E}">
+        <p14:creationId xmlns:p14="http://schemas.microsoft.com/office/powerpoint/2010/main" val="767730293"/>
+      </p:ext>
+    </p:extLst>
+  </p:cSld>
+  <p:clrMapOvr>
+    <a:masterClrMapping/>
+  </p:clrMapOvr>
+</p:notes>
+</file>
+
+<file path=ppt/notesSlides/notesSlide3.xml><?xml version="1.0" encoding="utf-8"?>
+<p:notes xmlns:a="http://schemas.openxmlformats.org/drawingml/2006/main" xmlns:r="http://schemas.openxmlformats.org/officeDocument/2006/relationships" xmlns:p="http://schemas.openxmlformats.org/presentationml/2006/main">
+  <p:cSld>
+    <p:spTree>
+      <p:nvGrpSpPr>
+        <p:cNvPr id="1" name=""/>
+        <p:cNvGrpSpPr/>
+        <p:nvPr/>
+      </p:nvGrpSpPr>
+      <p:grpSpPr>
+        <a:xfrm>
+          <a:off x="0" y="0"/>
+          <a:ext cx="0" cy="0"/>
+          <a:chOff x="0" y="0"/>
+          <a:chExt cx="0" cy="0"/>
+        </a:xfrm>
+      </p:grpSpPr>
+      <p:sp>
+        <p:nvSpPr>
+          <p:cNvPr id="2" name="Slide Image Placeholder 1"/>
+          <p:cNvSpPr>
+            <a:spLocks noGrp="1" noRot="1" noChangeAspect="1"/>
+          </p:cNvSpPr>
+          <p:nvPr>
+            <p:ph type="sldImg"/>
+          </p:nvPr>
+        </p:nvSpPr>
+        <p:spPr/>
+      </p:sp>
+      <p:sp>
+        <p:nvSpPr>
+          <p:cNvPr id="3" name="Notes Placeholder 2"/>
+          <p:cNvSpPr>
+            <a:spLocks noGrp="1"/>
+          </p:cNvSpPr>
+          <p:nvPr>
+            <p:ph type="body" idx="1"/>
+          </p:nvPr>
+        </p:nvSpPr>
+        <p:spPr/>
+        <p:txBody>
+          <a:bodyPr/>
+          <a:lstStyle/>
+          <a:p>
+            <a:endParaRPr lang="en-CH"/>
+          </a:p>
+        </p:txBody>
+      </p:sp>
+      <p:sp>
+        <p:nvSpPr>
+          <p:cNvPr id="4" name="Slide Number Placeholder 3"/>
+          <p:cNvSpPr>
+            <a:spLocks noGrp="1"/>
+          </p:cNvSpPr>
+          <p:nvPr>
+            <p:ph type="sldNum" sz="quarter" idx="5"/>
+          </p:nvPr>
+        </p:nvSpPr>
+        <p:spPr/>
+        <p:txBody>
+          <a:bodyPr/>
+          <a:lstStyle/>
+          <a:p>
+            <a:fld id="{4F9EB7BC-E3FE-644B-A8BB-DE59933EA7C3}" type="slidenum">
+              <a:rPr lang="en-CH" smtClean="0"/>
+              <a:t>3</a:t>
+            </a:fld>
+            <a:endParaRPr lang="en-CH"/>
+          </a:p>
+        </p:txBody>
+      </p:sp>
+    </p:spTree>
+    <p:extLst>
+      <p:ext uri="{BB962C8B-B14F-4D97-AF65-F5344CB8AC3E}">
+        <p14:creationId xmlns:p14="http://schemas.microsoft.com/office/powerpoint/2010/main" val="603607324"/>
+      </p:ext>
+    </p:extLst>
+  </p:cSld>
+  <p:clrMapOvr>
+    <a:masterClrMapping/>
+  </p:clrMapOvr>
+</p:notes>
 </file>
 
 <file path=ppt/slideLayouts/slideLayout1.xml><?xml version="1.0" encoding="utf-8"?>
@@ -3338,9 +3982,321 @@
     <p:bg>
       <p:bgPr>
         <a:solidFill>
-          <a:schemeClr val="accent6">
-            <a:lumMod val="20000"/>
-            <a:lumOff val="80000"/>
+          <a:srgbClr val="9DC3E6"/>
+        </a:solidFill>
+        <a:effectLst/>
+      </p:bgPr>
+    </p:bg>
+    <p:spTree>
+      <p:nvGrpSpPr>
+        <p:cNvPr id="1" name=""/>
+        <p:cNvGrpSpPr/>
+        <p:nvPr/>
+      </p:nvGrpSpPr>
+      <p:grpSpPr>
+        <a:xfrm>
+          <a:off x="0" y="0"/>
+          <a:ext cx="0" cy="0"/>
+          <a:chOff x="0" y="0"/>
+          <a:chExt cx="0" cy="0"/>
+        </a:xfrm>
+      </p:grpSpPr>
+      <p:sp>
+        <p:nvSpPr>
+          <p:cNvPr id="2" name="Title 1">
+            <a:extLst>
+              <a:ext uri="{FF2B5EF4-FFF2-40B4-BE49-F238E27FC236}">
+                <a16:creationId xmlns:a16="http://schemas.microsoft.com/office/drawing/2014/main" id="{4B5D6A33-37F3-6747-B0B4-5B49D10CC0D9}"/>
+              </a:ext>
+            </a:extLst>
+          </p:cNvPr>
+          <p:cNvSpPr>
+            <a:spLocks noGrp="1"/>
+          </p:cNvSpPr>
+          <p:nvPr>
+            <p:ph type="ctrTitle"/>
+          </p:nvPr>
+        </p:nvSpPr>
+        <p:spPr>
+          <a:xfrm>
+            <a:off x="1524000" y="2834824"/>
+            <a:ext cx="9144000" cy="1188351"/>
+          </a:xfrm>
+        </p:spPr>
+        <p:txBody>
+          <a:bodyPr/>
+          <a:lstStyle/>
+          <a:p>
+            <a:r>
+              <a:rPr lang="en-CH" b="1" dirty="0">
+                <a:latin typeface="Trebuchet MS" panose="020B0703020202090204" pitchFamily="34" charset="0"/>
+              </a:rPr>
+              <a:t>Team La Girafe</a:t>
+            </a:r>
+          </a:p>
+        </p:txBody>
+      </p:sp>
+    </p:spTree>
+    <p:extLst>
+      <p:ext uri="{BB962C8B-B14F-4D97-AF65-F5344CB8AC3E}">
+        <p14:creationId xmlns:p14="http://schemas.microsoft.com/office/powerpoint/2010/main" val="221462074"/>
+      </p:ext>
+    </p:extLst>
+  </p:cSld>
+  <p:clrMapOvr>
+    <a:masterClrMapping/>
+  </p:clrMapOvr>
+</p:sld>
+</file>
+
+<file path=ppt/slides/slide2.xml><?xml version="1.0" encoding="utf-8"?>
+<p:sld xmlns:a="http://schemas.openxmlformats.org/drawingml/2006/main" xmlns:r="http://schemas.openxmlformats.org/officeDocument/2006/relationships" xmlns:p="http://schemas.openxmlformats.org/presentationml/2006/main">
+  <p:cSld>
+    <p:bg>
+      <p:bgPr>
+        <a:solidFill>
+          <a:srgbClr val="9DC3E6"/>
+        </a:solidFill>
+        <a:effectLst/>
+      </p:bgPr>
+    </p:bg>
+    <p:spTree>
+      <p:nvGrpSpPr>
+        <p:cNvPr id="1" name=""/>
+        <p:cNvGrpSpPr/>
+        <p:nvPr/>
+      </p:nvGrpSpPr>
+      <p:grpSpPr>
+        <a:xfrm>
+          <a:off x="0" y="0"/>
+          <a:ext cx="0" cy="0"/>
+          <a:chOff x="0" y="0"/>
+          <a:chExt cx="0" cy="0"/>
+        </a:xfrm>
+      </p:grpSpPr>
+      <p:sp>
+        <p:nvSpPr>
+          <p:cNvPr id="2" name="Title 1">
+            <a:extLst>
+              <a:ext uri="{FF2B5EF4-FFF2-40B4-BE49-F238E27FC236}">
+                <a16:creationId xmlns:a16="http://schemas.microsoft.com/office/drawing/2014/main" id="{4B5D6A33-37F3-6747-B0B4-5B49D10CC0D9}"/>
+              </a:ext>
+            </a:extLst>
+          </p:cNvPr>
+          <p:cNvSpPr>
+            <a:spLocks noGrp="1"/>
+          </p:cNvSpPr>
+          <p:nvPr>
+            <p:ph type="ctrTitle"/>
+          </p:nvPr>
+        </p:nvSpPr>
+        <p:spPr>
+          <a:xfrm>
+            <a:off x="388883" y="475692"/>
+            <a:ext cx="9144000" cy="1188351"/>
+          </a:xfrm>
+        </p:spPr>
+        <p:txBody>
+          <a:bodyPr/>
+          <a:lstStyle/>
+          <a:p>
+            <a:pPr algn="l"/>
+            <a:r>
+              <a:rPr lang="en-CH" b="1" dirty="0">
+                <a:latin typeface="Trebuchet MS" panose="020B0703020202090204" pitchFamily="34" charset="0"/>
+              </a:rPr>
+              <a:t>Dachfenster</a:t>
+            </a:r>
+          </a:p>
+        </p:txBody>
+      </p:sp>
+      <p:sp>
+        <p:nvSpPr>
+          <p:cNvPr id="3" name="Subtitle 2">
+            <a:extLst>
+              <a:ext uri="{FF2B5EF4-FFF2-40B4-BE49-F238E27FC236}">
+                <a16:creationId xmlns:a16="http://schemas.microsoft.com/office/drawing/2014/main" id="{1804744A-2C73-D747-A180-20CD5B552BEC}"/>
+              </a:ext>
+            </a:extLst>
+          </p:cNvPr>
+          <p:cNvSpPr>
+            <a:spLocks noGrp="1"/>
+          </p:cNvSpPr>
+          <p:nvPr>
+            <p:ph type="subTitle" idx="1"/>
+          </p:nvPr>
+        </p:nvSpPr>
+        <p:spPr>
+          <a:xfrm>
+            <a:off x="462456" y="1800195"/>
+            <a:ext cx="9144000" cy="475692"/>
+          </a:xfrm>
+        </p:spPr>
+        <p:txBody>
+          <a:bodyPr/>
+          <a:lstStyle/>
+          <a:p>
+            <a:pPr algn="l"/>
+            <a:r>
+              <a:rPr lang="de-CH" i="1" dirty="0" err="1">
+                <a:latin typeface="Trebuchet MS" panose="020B0703020202090204" pitchFamily="34" charset="0"/>
+              </a:rPr>
+              <a:t>the</a:t>
+            </a:r>
+            <a:r>
+              <a:rPr lang="de-CH" i="1" dirty="0">
+                <a:latin typeface="Trebuchet MS" panose="020B0703020202090204" pitchFamily="34" charset="0"/>
+              </a:rPr>
+              <a:t> </a:t>
+            </a:r>
+            <a:r>
+              <a:rPr lang="de-CH" i="1" dirty="0" err="1">
+                <a:latin typeface="Trebuchet MS" panose="020B0703020202090204" pitchFamily="34" charset="0"/>
+              </a:rPr>
+              <a:t>ridesharing</a:t>
+            </a:r>
+            <a:r>
+              <a:rPr lang="de-CH" i="1" dirty="0">
+                <a:latin typeface="Trebuchet MS" panose="020B0703020202090204" pitchFamily="34" charset="0"/>
+              </a:rPr>
+              <a:t> </a:t>
+            </a:r>
+            <a:r>
+              <a:rPr lang="de-CH" i="1" dirty="0" err="1">
+                <a:latin typeface="Trebuchet MS" panose="020B0703020202090204" pitchFamily="34" charset="0"/>
+              </a:rPr>
+              <a:t>platform</a:t>
+            </a:r>
+            <a:r>
+              <a:rPr lang="de-CH" i="1" dirty="0">
+                <a:latin typeface="Trebuchet MS" panose="020B0703020202090204" pitchFamily="34" charset="0"/>
+              </a:rPr>
+              <a:t> </a:t>
+            </a:r>
+            <a:r>
+              <a:rPr lang="de-CH" i="1" dirty="0" err="1">
+                <a:latin typeface="Trebuchet MS" panose="020B0703020202090204" pitchFamily="34" charset="0"/>
+              </a:rPr>
+              <a:t>with</a:t>
+            </a:r>
+            <a:r>
+              <a:rPr lang="de-CH" i="1" dirty="0">
+                <a:latin typeface="Trebuchet MS" panose="020B0703020202090204" pitchFamily="34" charset="0"/>
+              </a:rPr>
+              <a:t> a </a:t>
+            </a:r>
+            <a:r>
+              <a:rPr lang="de-CH" i="1" dirty="0" err="1">
+                <a:latin typeface="Trebuchet MS" panose="020B0703020202090204" pitchFamily="34" charset="0"/>
+              </a:rPr>
+              <a:t>match</a:t>
+            </a:r>
+            <a:r>
+              <a:rPr lang="de-CH" i="1" dirty="0">
+                <a:latin typeface="Trebuchet MS" panose="020B0703020202090204" pitchFamily="34" charset="0"/>
+              </a:rPr>
+              <a:t> </a:t>
+            </a:r>
+            <a:r>
+              <a:rPr lang="de-CH" i="1" dirty="0" err="1">
+                <a:latin typeface="Trebuchet MS" panose="020B0703020202090204" pitchFamily="34" charset="0"/>
+              </a:rPr>
+              <a:t>for</a:t>
+            </a:r>
+            <a:r>
+              <a:rPr lang="de-CH" i="1" dirty="0">
+                <a:latin typeface="Trebuchet MS" panose="020B0703020202090204" pitchFamily="34" charset="0"/>
+              </a:rPr>
+              <a:t> </a:t>
+            </a:r>
+            <a:r>
+              <a:rPr lang="de-CH" i="1" dirty="0" err="1">
+                <a:latin typeface="Trebuchet MS" panose="020B0703020202090204" pitchFamily="34" charset="0"/>
+              </a:rPr>
+              <a:t>every</a:t>
+            </a:r>
+            <a:r>
+              <a:rPr lang="de-CH" i="1" dirty="0">
+                <a:latin typeface="Trebuchet MS" panose="020B0703020202090204" pitchFamily="34" charset="0"/>
+              </a:rPr>
+              <a:t> </a:t>
+            </a:r>
+            <a:r>
+              <a:rPr lang="de-CH" i="1" dirty="0" err="1">
+                <a:latin typeface="Trebuchet MS" panose="020B0703020202090204" pitchFamily="34" charset="0"/>
+              </a:rPr>
+              <a:t>special</a:t>
+            </a:r>
+            <a:r>
+              <a:rPr lang="de-CH" i="1" dirty="0">
+                <a:latin typeface="Trebuchet MS" panose="020B0703020202090204" pitchFamily="34" charset="0"/>
+              </a:rPr>
+              <a:t> </a:t>
+            </a:r>
+            <a:r>
+              <a:rPr lang="de-CH" i="1" dirty="0" err="1">
+                <a:latin typeface="Trebuchet MS" panose="020B0703020202090204" pitchFamily="34" charset="0"/>
+              </a:rPr>
+              <a:t>need</a:t>
+            </a:r>
+            <a:endParaRPr lang="en-CH" i="1" dirty="0">
+              <a:latin typeface="Trebuchet MS" panose="020B0703020202090204" pitchFamily="34" charset="0"/>
+            </a:endParaRPr>
+          </a:p>
+        </p:txBody>
+      </p:sp>
+      <p:pic>
+        <p:nvPicPr>
+          <p:cNvPr id="5" name="Picture 4" descr="A picture containing logo&#10;&#10;Description automatically generated">
+            <a:extLst>
+              <a:ext uri="{FF2B5EF4-FFF2-40B4-BE49-F238E27FC236}">
+                <a16:creationId xmlns:a16="http://schemas.microsoft.com/office/drawing/2014/main" id="{8E935806-17DD-F24E-8488-753128BE5301}"/>
+              </a:ext>
+            </a:extLst>
+          </p:cNvPr>
+          <p:cNvPicPr>
+            <a:picLocks noChangeAspect="1"/>
+          </p:cNvPicPr>
+          <p:nvPr/>
+        </p:nvPicPr>
+        <p:blipFill>
+          <a:blip r:embed="rId3"/>
+          <a:stretch>
+            <a:fillRect/>
+          </a:stretch>
+        </p:blipFill>
+        <p:spPr>
+          <a:xfrm>
+            <a:off x="4025183" y="2607975"/>
+            <a:ext cx="4141634" cy="3774333"/>
+          </a:xfrm>
+          <a:prstGeom prst="rect">
+            <a:avLst/>
+          </a:prstGeom>
+        </p:spPr>
+      </p:pic>
+    </p:spTree>
+    <p:extLst>
+      <p:ext uri="{BB962C8B-B14F-4D97-AF65-F5344CB8AC3E}">
+        <p14:creationId xmlns:p14="http://schemas.microsoft.com/office/powerpoint/2010/main" val="1932637309"/>
+      </p:ext>
+    </p:extLst>
+  </p:cSld>
+  <p:clrMapOvr>
+    <a:masterClrMapping/>
+  </p:clrMapOvr>
+</p:sld>
+</file>
+
+<file path=ppt/slides/slide3.xml><?xml version="1.0" encoding="utf-8"?>
+<p:sld xmlns:a="http://schemas.openxmlformats.org/drawingml/2006/main" xmlns:r="http://schemas.openxmlformats.org/officeDocument/2006/relationships" xmlns:p="http://schemas.openxmlformats.org/presentationml/2006/main">
+  <p:cSld>
+    <p:bg>
+      <p:bgPr>
+        <a:solidFill>
+          <a:schemeClr val="accent5">
+            <a:lumMod val="60000"/>
+            <a:lumOff val="40000"/>
           </a:schemeClr>
         </a:solidFill>
         <a:effectLst/>
@@ -3365,248 +4321,6 @@
           <p:cNvPr id="2" name="Title 1">
             <a:extLst>
               <a:ext uri="{FF2B5EF4-FFF2-40B4-BE49-F238E27FC236}">
-                <a16:creationId xmlns:a16="http://schemas.microsoft.com/office/drawing/2014/main" id="{4B5D6A33-37F3-6747-B0B4-5B49D10CC0D9}"/>
-              </a:ext>
-            </a:extLst>
-          </p:cNvPr>
-          <p:cNvSpPr>
-            <a:spLocks noGrp="1"/>
-          </p:cNvSpPr>
-          <p:nvPr>
-            <p:ph type="ctrTitle"/>
-          </p:nvPr>
-        </p:nvSpPr>
-        <p:spPr>
-          <a:xfrm>
-            <a:off x="388883" y="475692"/>
-            <a:ext cx="9144000" cy="1188351"/>
-          </a:xfrm>
-        </p:spPr>
-        <p:txBody>
-          <a:bodyPr/>
-          <a:lstStyle/>
-          <a:p>
-            <a:pPr algn="l"/>
-            <a:r>
-              <a:rPr lang="en-CH" b="1" dirty="0">
-                <a:latin typeface="Trebuchet MS" panose="020B0703020202090204" pitchFamily="34" charset="0"/>
-              </a:rPr>
-              <a:t>Dachfenster</a:t>
-            </a:r>
-          </a:p>
-        </p:txBody>
-      </p:sp>
-      <p:sp>
-        <p:nvSpPr>
-          <p:cNvPr id="3" name="Subtitle 2">
-            <a:extLst>
-              <a:ext uri="{FF2B5EF4-FFF2-40B4-BE49-F238E27FC236}">
-                <a16:creationId xmlns:a16="http://schemas.microsoft.com/office/drawing/2014/main" id="{1804744A-2C73-D747-A180-20CD5B552BEC}"/>
-              </a:ext>
-            </a:extLst>
-          </p:cNvPr>
-          <p:cNvSpPr>
-            <a:spLocks noGrp="1"/>
-          </p:cNvSpPr>
-          <p:nvPr>
-            <p:ph type="subTitle" idx="1"/>
-          </p:nvPr>
-        </p:nvSpPr>
-        <p:spPr>
-          <a:xfrm>
-            <a:off x="462456" y="1800195"/>
-            <a:ext cx="9144000" cy="475692"/>
-          </a:xfrm>
-        </p:spPr>
-        <p:txBody>
-          <a:bodyPr/>
-          <a:lstStyle/>
-          <a:p>
-            <a:pPr algn="l"/>
-            <a:r>
-              <a:rPr lang="de-CH" i="1" dirty="0" err="1">
-                <a:latin typeface="Trebuchet MS" panose="020B0703020202090204" pitchFamily="34" charset="0"/>
-              </a:rPr>
-              <a:t>the</a:t>
-            </a:r>
-            <a:r>
-              <a:rPr lang="de-CH" i="1" dirty="0">
-                <a:latin typeface="Trebuchet MS" panose="020B0703020202090204" pitchFamily="34" charset="0"/>
-              </a:rPr>
-              <a:t> </a:t>
-            </a:r>
-            <a:r>
-              <a:rPr lang="de-CH" i="1" dirty="0" err="1">
-                <a:latin typeface="Trebuchet MS" panose="020B0703020202090204" pitchFamily="34" charset="0"/>
-              </a:rPr>
-              <a:t>ridesharing</a:t>
-            </a:r>
-            <a:r>
-              <a:rPr lang="de-CH" i="1" dirty="0">
-                <a:latin typeface="Trebuchet MS" panose="020B0703020202090204" pitchFamily="34" charset="0"/>
-              </a:rPr>
-              <a:t> </a:t>
-            </a:r>
-            <a:r>
-              <a:rPr lang="de-CH" i="1" dirty="0" err="1">
-                <a:latin typeface="Trebuchet MS" panose="020B0703020202090204" pitchFamily="34" charset="0"/>
-              </a:rPr>
-              <a:t>platform</a:t>
-            </a:r>
-            <a:r>
-              <a:rPr lang="de-CH" i="1" dirty="0">
-                <a:latin typeface="Trebuchet MS" panose="020B0703020202090204" pitchFamily="34" charset="0"/>
-              </a:rPr>
-              <a:t> </a:t>
-            </a:r>
-            <a:r>
-              <a:rPr lang="de-CH" i="1" dirty="0" err="1">
-                <a:latin typeface="Trebuchet MS" panose="020B0703020202090204" pitchFamily="34" charset="0"/>
-              </a:rPr>
-              <a:t>with</a:t>
-            </a:r>
-            <a:r>
-              <a:rPr lang="de-CH" i="1" dirty="0">
-                <a:latin typeface="Trebuchet MS" panose="020B0703020202090204" pitchFamily="34" charset="0"/>
-              </a:rPr>
-              <a:t> a </a:t>
-            </a:r>
-            <a:r>
-              <a:rPr lang="de-CH" i="1" dirty="0" err="1">
-                <a:latin typeface="Trebuchet MS" panose="020B0703020202090204" pitchFamily="34" charset="0"/>
-              </a:rPr>
-              <a:t>match</a:t>
-            </a:r>
-            <a:r>
-              <a:rPr lang="de-CH" i="1" dirty="0">
-                <a:latin typeface="Trebuchet MS" panose="020B0703020202090204" pitchFamily="34" charset="0"/>
-              </a:rPr>
-              <a:t> </a:t>
-            </a:r>
-            <a:r>
-              <a:rPr lang="de-CH" i="1" dirty="0" err="1">
-                <a:latin typeface="Trebuchet MS" panose="020B0703020202090204" pitchFamily="34" charset="0"/>
-              </a:rPr>
-              <a:t>for</a:t>
-            </a:r>
-            <a:r>
-              <a:rPr lang="de-CH" i="1" dirty="0">
-                <a:latin typeface="Trebuchet MS" panose="020B0703020202090204" pitchFamily="34" charset="0"/>
-              </a:rPr>
-              <a:t> </a:t>
-            </a:r>
-            <a:r>
-              <a:rPr lang="de-CH" i="1" dirty="0" err="1">
-                <a:latin typeface="Trebuchet MS" panose="020B0703020202090204" pitchFamily="34" charset="0"/>
-              </a:rPr>
-              <a:t>every</a:t>
-            </a:r>
-            <a:r>
-              <a:rPr lang="de-CH" i="1" dirty="0">
-                <a:latin typeface="Trebuchet MS" panose="020B0703020202090204" pitchFamily="34" charset="0"/>
-              </a:rPr>
-              <a:t> </a:t>
-            </a:r>
-            <a:r>
-              <a:rPr lang="de-CH" i="1" dirty="0" err="1">
-                <a:latin typeface="Trebuchet MS" panose="020B0703020202090204" pitchFamily="34" charset="0"/>
-              </a:rPr>
-              <a:t>special</a:t>
-            </a:r>
-            <a:r>
-              <a:rPr lang="de-CH" i="1" dirty="0">
-                <a:latin typeface="Trebuchet MS" panose="020B0703020202090204" pitchFamily="34" charset="0"/>
-              </a:rPr>
-              <a:t> </a:t>
-            </a:r>
-            <a:r>
-              <a:rPr lang="de-CH" i="1" dirty="0" err="1">
-                <a:latin typeface="Trebuchet MS" panose="020B0703020202090204" pitchFamily="34" charset="0"/>
-              </a:rPr>
-              <a:t>need</a:t>
-            </a:r>
-            <a:endParaRPr lang="en-CH" i="1" dirty="0">
-              <a:latin typeface="Trebuchet MS" panose="020B0703020202090204" pitchFamily="34" charset="0"/>
-            </a:endParaRPr>
-          </a:p>
-        </p:txBody>
-      </p:sp>
-      <p:pic>
-        <p:nvPicPr>
-          <p:cNvPr id="5" name="Picture 4" descr="A picture containing logo&#10;&#10;Description automatically generated">
-            <a:extLst>
-              <a:ext uri="{FF2B5EF4-FFF2-40B4-BE49-F238E27FC236}">
-                <a16:creationId xmlns:a16="http://schemas.microsoft.com/office/drawing/2014/main" id="{8E935806-17DD-F24E-8488-753128BE5301}"/>
-              </a:ext>
-            </a:extLst>
-          </p:cNvPr>
-          <p:cNvPicPr>
-            <a:picLocks noChangeAspect="1"/>
-          </p:cNvPicPr>
-          <p:nvPr/>
-        </p:nvPicPr>
-        <p:blipFill>
-          <a:blip r:embed="rId2"/>
-          <a:stretch>
-            <a:fillRect/>
-          </a:stretch>
-        </p:blipFill>
-        <p:spPr>
-          <a:xfrm>
-            <a:off x="4025183" y="2607975"/>
-            <a:ext cx="4141634" cy="3774333"/>
-          </a:xfrm>
-          <a:prstGeom prst="rect">
-            <a:avLst/>
-          </a:prstGeom>
-        </p:spPr>
-      </p:pic>
-    </p:spTree>
-    <p:extLst>
-      <p:ext uri="{BB962C8B-B14F-4D97-AF65-F5344CB8AC3E}">
-        <p14:creationId xmlns:p14="http://schemas.microsoft.com/office/powerpoint/2010/main" val="221462074"/>
-      </p:ext>
-    </p:extLst>
-  </p:cSld>
-  <p:clrMapOvr>
-    <a:masterClrMapping/>
-  </p:clrMapOvr>
-</p:sld>
-</file>
-
-<file path=ppt/slides/slide2.xml><?xml version="1.0" encoding="utf-8"?>
-<p:sld xmlns:a="http://schemas.openxmlformats.org/drawingml/2006/main" xmlns:r="http://schemas.openxmlformats.org/officeDocument/2006/relationships" xmlns:p="http://schemas.openxmlformats.org/presentationml/2006/main">
-  <p:cSld>
-    <p:bg>
-      <p:bgPr>
-        <a:solidFill>
-          <a:schemeClr val="accent6">
-            <a:lumMod val="20000"/>
-            <a:lumOff val="80000"/>
-          </a:schemeClr>
-        </a:solidFill>
-        <a:effectLst/>
-      </p:bgPr>
-    </p:bg>
-    <p:spTree>
-      <p:nvGrpSpPr>
-        <p:cNvPr id="1" name=""/>
-        <p:cNvGrpSpPr/>
-        <p:nvPr/>
-      </p:nvGrpSpPr>
-      <p:grpSpPr>
-        <a:xfrm>
-          <a:off x="0" y="0"/>
-          <a:ext cx="0" cy="0"/>
-          <a:chOff x="0" y="0"/>
-          <a:chExt cx="0" cy="0"/>
-        </a:xfrm>
-      </p:grpSpPr>
-      <p:sp>
-        <p:nvSpPr>
-          <p:cNvPr id="2" name="Title 1">
-            <a:extLst>
-              <a:ext uri="{FF2B5EF4-FFF2-40B4-BE49-F238E27FC236}">
                 <a16:creationId xmlns:a16="http://schemas.microsoft.com/office/drawing/2014/main" id="{A5186B16-9D62-5146-B2AA-4EEE35AFAD22}"/>
               </a:ext>
             </a:extLst>
@@ -3755,15 +4469,15 @@
 </p:sld>
 </file>
 
-<file path=ppt/slides/slide3.xml><?xml version="1.0" encoding="utf-8"?>
+<file path=ppt/slides/slide4.xml><?xml version="1.0" encoding="utf-8"?>
 <p:sld xmlns:a="http://schemas.openxmlformats.org/drawingml/2006/main" xmlns:r="http://schemas.openxmlformats.org/officeDocument/2006/relationships" xmlns:p="http://schemas.openxmlformats.org/presentationml/2006/main">
   <p:cSld>
     <p:bg>
       <p:bgPr>
         <a:solidFill>
-          <a:schemeClr val="accent6">
-            <a:lumMod val="20000"/>
-            <a:lumOff val="80000"/>
+          <a:schemeClr val="accent5">
+            <a:lumMod val="60000"/>
+            <a:lumOff val="40000"/>
           </a:schemeClr>
         </a:solidFill>
         <a:effectLst/>
@@ -3855,15 +4569,15 @@
 </p:sld>
 </file>
 
-<file path=ppt/slides/slide4.xml><?xml version="1.0" encoding="utf-8"?>
+<file path=ppt/slides/slide5.xml><?xml version="1.0" encoding="utf-8"?>
 <p:sld xmlns:a="http://schemas.openxmlformats.org/drawingml/2006/main" xmlns:r="http://schemas.openxmlformats.org/officeDocument/2006/relationships" xmlns:p="http://schemas.openxmlformats.org/presentationml/2006/main">
   <p:cSld>
     <p:bg>
       <p:bgPr>
         <a:solidFill>
-          <a:schemeClr val="accent6">
-            <a:lumMod val="20000"/>
-            <a:lumOff val="80000"/>
+          <a:schemeClr val="accent5">
+            <a:lumMod val="60000"/>
+            <a:lumOff val="40000"/>
           </a:schemeClr>
         </a:solidFill>
         <a:effectLst/>
@@ -4096,15 +4810,15 @@
 </p:sld>
 </file>
 
-<file path=ppt/slides/slide5.xml><?xml version="1.0" encoding="utf-8"?>
+<file path=ppt/slides/slide6.xml><?xml version="1.0" encoding="utf-8"?>
 <p:sld xmlns:a="http://schemas.openxmlformats.org/drawingml/2006/main" xmlns:r="http://schemas.openxmlformats.org/officeDocument/2006/relationships" xmlns:p="http://schemas.openxmlformats.org/presentationml/2006/main">
   <p:cSld>
     <p:bg>
       <p:bgPr>
         <a:solidFill>
-          <a:schemeClr val="accent6">
-            <a:lumMod val="20000"/>
-            <a:lumOff val="80000"/>
+          <a:schemeClr val="accent5">
+            <a:lumMod val="60000"/>
+            <a:lumOff val="40000"/>
           </a:schemeClr>
         </a:solidFill>
         <a:effectLst/>
@@ -4222,15 +4936,15 @@
 </p:sld>
 </file>
 
-<file path=ppt/slides/slide6.xml><?xml version="1.0" encoding="utf-8"?>
+<file path=ppt/slides/slide7.xml><?xml version="1.0" encoding="utf-8"?>
 <p:sld xmlns:a="http://schemas.openxmlformats.org/drawingml/2006/main" xmlns:r="http://schemas.openxmlformats.org/officeDocument/2006/relationships" xmlns:p="http://schemas.openxmlformats.org/presentationml/2006/main">
   <p:cSld>
     <p:bg>
       <p:bgPr>
         <a:solidFill>
-          <a:schemeClr val="accent6">
-            <a:lumMod val="20000"/>
-            <a:lumOff val="80000"/>
+          <a:schemeClr val="accent5">
+            <a:lumMod val="60000"/>
+            <a:lumOff val="40000"/>
           </a:schemeClr>
         </a:solidFill>
         <a:effectLst/>
@@ -4358,15 +5072,15 @@
 </p:sld>
 </file>
 
-<file path=ppt/slides/slide7.xml><?xml version="1.0" encoding="utf-8"?>
+<file path=ppt/slides/slide8.xml><?xml version="1.0" encoding="utf-8"?>
 <p:sld xmlns:a="http://schemas.openxmlformats.org/drawingml/2006/main" xmlns:r="http://schemas.openxmlformats.org/officeDocument/2006/relationships" xmlns:p="http://schemas.openxmlformats.org/presentationml/2006/main">
   <p:cSld>
     <p:bg>
       <p:bgPr>
         <a:solidFill>
-          <a:schemeClr val="accent6">
-            <a:lumMod val="20000"/>
-            <a:lumOff val="80000"/>
+          <a:schemeClr val="accent5">
+            <a:lumMod val="60000"/>
+            <a:lumOff val="40000"/>
           </a:schemeClr>
         </a:solidFill>
         <a:effectLst/>
@@ -4482,15 +5196,15 @@
 </p:sld>
 </file>
 
-<file path=ppt/slides/slide8.xml><?xml version="1.0" encoding="utf-8"?>
+<file path=ppt/slides/slide9.xml><?xml version="1.0" encoding="utf-8"?>
 <p:sld xmlns:a="http://schemas.openxmlformats.org/drawingml/2006/main" xmlns:r="http://schemas.openxmlformats.org/officeDocument/2006/relationships" xmlns:p="http://schemas.openxmlformats.org/presentationml/2006/main">
   <p:cSld>
     <p:bg>
       <p:bgPr>
         <a:solidFill>
-          <a:schemeClr val="accent6">
-            <a:lumMod val="20000"/>
-            <a:lumOff val="80000"/>
+          <a:schemeClr val="accent5">
+            <a:lumMod val="60000"/>
+            <a:lumOff val="40000"/>
           </a:schemeClr>
         </a:solidFill>
         <a:effectLst/>
@@ -4876,4 +5590,299 @@
     </a:ext>
   </a:extLst>
 </a:theme>
+</file>
+
+<file path=ppt/theme/theme2.xml><?xml version="1.0" encoding="utf-8"?>
+<a:theme xmlns:a="http://schemas.openxmlformats.org/drawingml/2006/main" name="Office Theme">
+  <a:themeElements>
+    <a:clrScheme name="Office">
+      <a:dk1>
+        <a:sysClr val="windowText" lastClr="000000"/>
+      </a:dk1>
+      <a:lt1>
+        <a:sysClr val="window" lastClr="FFFFFF"/>
+      </a:lt1>
+      <a:dk2>
+        <a:srgbClr val="44546A"/>
+      </a:dk2>
+      <a:lt2>
+        <a:srgbClr val="E7E6E6"/>
+      </a:lt2>
+      <a:accent1>
+        <a:srgbClr val="4472C4"/>
+      </a:accent1>
+      <a:accent2>
+        <a:srgbClr val="ED7D31"/>
+      </a:accent2>
+      <a:accent3>
+        <a:srgbClr val="A5A5A5"/>
+      </a:accent3>
+      <a:accent4>
+        <a:srgbClr val="FFC000"/>
+      </a:accent4>
+      <a:accent5>
+        <a:srgbClr val="5B9BD5"/>
+      </a:accent5>
+      <a:accent6>
+        <a:srgbClr val="70AD47"/>
+      </a:accent6>
+      <a:hlink>
+        <a:srgbClr val="0563C1"/>
+      </a:hlink>
+      <a:folHlink>
+        <a:srgbClr val="954F72"/>
+      </a:folHlink>
+    </a:clrScheme>
+    <a:fontScheme name="Office">
+      <a:majorFont>
+        <a:latin typeface="Calibri Light" panose="020F0302020204030204"/>
+        <a:ea typeface=""/>
+        <a:cs typeface=""/>
+        <a:font script="Jpan" typeface="游ゴシック Light"/>
+        <a:font script="Hang" typeface="맑은 고딕"/>
+        <a:font script="Hans" typeface="等线 Light"/>
+        <a:font script="Hant" typeface="新細明體"/>
+        <a:font script="Arab" typeface="Times New Roman"/>
+        <a:font script="Hebr" typeface="Times New Roman"/>
+        <a:font script="Thai" typeface="Angsana New"/>
+        <a:font script="Ethi" typeface="Nyala"/>
+        <a:font script="Beng" typeface="Vrinda"/>
+        <a:font script="Gujr" typeface="Shruti"/>
+        <a:font script="Khmr" typeface="MoolBoran"/>
+        <a:font script="Knda" typeface="Tunga"/>
+        <a:font script="Guru" typeface="Raavi"/>
+        <a:font script="Cans" typeface="Euphemia"/>
+        <a:font script="Cher" typeface="Plantagenet Cherokee"/>
+        <a:font script="Yiii" typeface="Microsoft Yi Baiti"/>
+        <a:font script="Tibt" typeface="Microsoft Himalaya"/>
+        <a:font script="Thaa" typeface="MV Boli"/>
+        <a:font script="Deva" typeface="Mangal"/>
+        <a:font script="Telu" typeface="Gautami"/>
+        <a:font script="Taml" typeface="Latha"/>
+        <a:font script="Syrc" typeface="Estrangelo Edessa"/>
+        <a:font script="Orya" typeface="Kalinga"/>
+        <a:font script="Mlym" typeface="Kartika"/>
+        <a:font script="Laoo" typeface="DokChampa"/>
+        <a:font script="Sinh" typeface="Iskoola Pota"/>
+        <a:font script="Mong" typeface="Mongolian Baiti"/>
+        <a:font script="Viet" typeface="Times New Roman"/>
+        <a:font script="Uigh" typeface="Microsoft Uighur"/>
+        <a:font script="Geor" typeface="Sylfaen"/>
+        <a:font script="Armn" typeface="Arial"/>
+        <a:font script="Bugi" typeface="Leelawadee UI"/>
+        <a:font script="Bopo" typeface="Microsoft JhengHei"/>
+        <a:font script="Java" typeface="Javanese Text"/>
+        <a:font script="Lisu" typeface="Segoe UI"/>
+        <a:font script="Mymr" typeface="Myanmar Text"/>
+        <a:font script="Nkoo" typeface="Ebrima"/>
+        <a:font script="Olck" typeface="Nirmala UI"/>
+        <a:font script="Osma" typeface="Ebrima"/>
+        <a:font script="Phag" typeface="Phagspa"/>
+        <a:font script="Syrn" typeface="Estrangelo Edessa"/>
+        <a:font script="Syrj" typeface="Estrangelo Edessa"/>
+        <a:font script="Syre" typeface="Estrangelo Edessa"/>
+        <a:font script="Sora" typeface="Nirmala UI"/>
+        <a:font script="Tale" typeface="Microsoft Tai Le"/>
+        <a:font script="Talu" typeface="Microsoft New Tai Lue"/>
+        <a:font script="Tfng" typeface="Ebrima"/>
+      </a:majorFont>
+      <a:minorFont>
+        <a:latin typeface="Calibri" panose="020F0502020204030204"/>
+        <a:ea typeface=""/>
+        <a:cs typeface=""/>
+        <a:font script="Jpan" typeface="游ゴシック"/>
+        <a:font script="Hang" typeface="맑은 고딕"/>
+        <a:font script="Hans" typeface="等线"/>
+        <a:font script="Hant" typeface="新細明體"/>
+        <a:font script="Arab" typeface="Arial"/>
+        <a:font script="Hebr" typeface="Arial"/>
+        <a:font script="Thai" typeface="Cordia New"/>
+        <a:font script="Ethi" typeface="Nyala"/>
+        <a:font script="Beng" typeface="Vrinda"/>
+        <a:font script="Gujr" typeface="Shruti"/>
+        <a:font script="Khmr" typeface="DaunPenh"/>
+        <a:font script="Knda" typeface="Tunga"/>
+        <a:font script="Guru" typeface="Raavi"/>
+        <a:font script="Cans" typeface="Euphemia"/>
+        <a:font script="Cher" typeface="Plantagenet Cherokee"/>
+        <a:font script="Yiii" typeface="Microsoft Yi Baiti"/>
+        <a:font script="Tibt" typeface="Microsoft Himalaya"/>
+        <a:font script="Thaa" typeface="MV Boli"/>
+        <a:font script="Deva" typeface="Mangal"/>
+        <a:font script="Telu" typeface="Gautami"/>
+        <a:font script="Taml" typeface="Latha"/>
+        <a:font script="Syrc" typeface="Estrangelo Edessa"/>
+        <a:font script="Orya" typeface="Kalinga"/>
+        <a:font script="Mlym" typeface="Kartika"/>
+        <a:font script="Laoo" typeface="DokChampa"/>
+        <a:font script="Sinh" typeface="Iskoola Pota"/>
+        <a:font script="Mong" typeface="Mongolian Baiti"/>
+        <a:font script="Viet" typeface="Arial"/>
+        <a:font script="Uigh" typeface="Microsoft Uighur"/>
+        <a:font script="Geor" typeface="Sylfaen"/>
+        <a:font script="Armn" typeface="Arial"/>
+        <a:font script="Bugi" typeface="Leelawadee UI"/>
+        <a:font script="Bopo" typeface="Microsoft JhengHei"/>
+        <a:font script="Java" typeface="Javanese Text"/>
+        <a:font script="Lisu" typeface="Segoe UI"/>
+        <a:font script="Mymr" typeface="Myanmar Text"/>
+        <a:font script="Nkoo" typeface="Ebrima"/>
+        <a:font script="Olck" typeface="Nirmala UI"/>
+        <a:font script="Osma" typeface="Ebrima"/>
+        <a:font script="Phag" typeface="Phagspa"/>
+        <a:font script="Syrn" typeface="Estrangelo Edessa"/>
+        <a:font script="Syrj" typeface="Estrangelo Edessa"/>
+        <a:font script="Syre" typeface="Estrangelo Edessa"/>
+        <a:font script="Sora" typeface="Nirmala UI"/>
+        <a:font script="Tale" typeface="Microsoft Tai Le"/>
+        <a:font script="Talu" typeface="Microsoft New Tai Lue"/>
+        <a:font script="Tfng" typeface="Ebrima"/>
+      </a:minorFont>
+    </a:fontScheme>
+    <a:fmtScheme name="Office">
+      <a:fillStyleLst>
+        <a:solidFill>
+          <a:schemeClr val="phClr"/>
+        </a:solidFill>
+        <a:gradFill rotWithShape="1">
+          <a:gsLst>
+            <a:gs pos="0">
+              <a:schemeClr val="phClr">
+                <a:lumMod val="110000"/>
+                <a:satMod val="105000"/>
+                <a:tint val="67000"/>
+              </a:schemeClr>
+            </a:gs>
+            <a:gs pos="50000">
+              <a:schemeClr val="phClr">
+                <a:lumMod val="105000"/>
+                <a:satMod val="103000"/>
+                <a:tint val="73000"/>
+              </a:schemeClr>
+            </a:gs>
+            <a:gs pos="100000">
+              <a:schemeClr val="phClr">
+                <a:lumMod val="105000"/>
+                <a:satMod val="109000"/>
+                <a:tint val="81000"/>
+              </a:schemeClr>
+            </a:gs>
+          </a:gsLst>
+          <a:lin ang="5400000" scaled="0"/>
+        </a:gradFill>
+        <a:gradFill rotWithShape="1">
+          <a:gsLst>
+            <a:gs pos="0">
+              <a:schemeClr val="phClr">
+                <a:satMod val="103000"/>
+                <a:lumMod val="102000"/>
+                <a:tint val="94000"/>
+              </a:schemeClr>
+            </a:gs>
+            <a:gs pos="50000">
+              <a:schemeClr val="phClr">
+                <a:satMod val="110000"/>
+                <a:lumMod val="100000"/>
+                <a:shade val="100000"/>
+              </a:schemeClr>
+            </a:gs>
+            <a:gs pos="100000">
+              <a:schemeClr val="phClr">
+                <a:lumMod val="99000"/>
+                <a:satMod val="120000"/>
+                <a:shade val="78000"/>
+              </a:schemeClr>
+            </a:gs>
+          </a:gsLst>
+          <a:lin ang="5400000" scaled="0"/>
+        </a:gradFill>
+      </a:fillStyleLst>
+      <a:lnStyleLst>
+        <a:ln w="6350" cap="flat" cmpd="sng" algn="ctr">
+          <a:solidFill>
+            <a:schemeClr val="phClr"/>
+          </a:solidFill>
+          <a:prstDash val="solid"/>
+          <a:miter lim="800000"/>
+        </a:ln>
+        <a:ln w="12700" cap="flat" cmpd="sng" algn="ctr">
+          <a:solidFill>
+            <a:schemeClr val="phClr"/>
+          </a:solidFill>
+          <a:prstDash val="solid"/>
+          <a:miter lim="800000"/>
+        </a:ln>
+        <a:ln w="19050" cap="flat" cmpd="sng" algn="ctr">
+          <a:solidFill>
+            <a:schemeClr val="phClr"/>
+          </a:solidFill>
+          <a:prstDash val="solid"/>
+          <a:miter lim="800000"/>
+        </a:ln>
+      </a:lnStyleLst>
+      <a:effectStyleLst>
+        <a:effectStyle>
+          <a:effectLst/>
+        </a:effectStyle>
+        <a:effectStyle>
+          <a:effectLst/>
+        </a:effectStyle>
+        <a:effectStyle>
+          <a:effectLst>
+            <a:outerShdw blurRad="57150" dist="19050" dir="5400000" algn="ctr" rotWithShape="0">
+              <a:srgbClr val="000000">
+                <a:alpha val="63000"/>
+              </a:srgbClr>
+            </a:outerShdw>
+          </a:effectLst>
+        </a:effectStyle>
+      </a:effectStyleLst>
+      <a:bgFillStyleLst>
+        <a:solidFill>
+          <a:schemeClr val="phClr"/>
+        </a:solidFill>
+        <a:solidFill>
+          <a:schemeClr val="phClr">
+            <a:tint val="95000"/>
+            <a:satMod val="170000"/>
+          </a:schemeClr>
+        </a:solidFill>
+        <a:gradFill rotWithShape="1">
+          <a:gsLst>
+            <a:gs pos="0">
+              <a:schemeClr val="phClr">
+                <a:tint val="93000"/>
+                <a:satMod val="150000"/>
+                <a:shade val="98000"/>
+                <a:lumMod val="102000"/>
+              </a:schemeClr>
+            </a:gs>
+            <a:gs pos="50000">
+              <a:schemeClr val="phClr">
+                <a:tint val="98000"/>
+                <a:satMod val="130000"/>
+                <a:shade val="90000"/>
+                <a:lumMod val="103000"/>
+              </a:schemeClr>
+            </a:gs>
+            <a:gs pos="100000">
+              <a:schemeClr val="phClr">
+                <a:shade val="63000"/>
+                <a:satMod val="120000"/>
+              </a:schemeClr>
+            </a:gs>
+          </a:gsLst>
+          <a:lin ang="5400000" scaled="0"/>
+        </a:gradFill>
+      </a:bgFillStyleLst>
+    </a:fmtScheme>
+  </a:themeElements>
+  <a:objectDefaults/>
+  <a:extraClrSchemeLst/>
+  <a:extLst>
+    <a:ext uri="{05A4C25C-085E-4340-85A3-A5531E510DB2}">
+      <thm15:themeFamily xmlns:thm15="http://schemas.microsoft.com/office/thememl/2012/main" name="Office Theme" id="{62F939B6-93AF-4DB8-9C6B-D6C7DFDC589F}" vid="{4A3C46E8-61CC-4603-A589-7422A47A8E4A}"/>
+    </a:ext>
+  </a:extLst>
+</a:theme>
 </file>
</xml_diff>

<commit_message>
drawio korrigiert und architektur projekt beschrieben
</commit_message>
<xml_diff>
--- a/static/dachfenster-pitch.pptx
+++ b/static/dachfenster-pitch.pptx
@@ -718,7 +718,89 @@
           <a:bodyPr/>
           <a:lstStyle/>
           <a:p>
-            <a:endParaRPr lang="en-CH"/>
+            <a:r>
+              <a:rPr lang="en-GB" sz="1200" b="0" i="0" kern="1200" dirty="0">
+                <a:solidFill>
+                  <a:schemeClr val="tx1"/>
+                </a:solidFill>
+                <a:effectLst/>
+                <a:latin typeface="+mn-lt"/>
+                <a:ea typeface="+mn-ea"/>
+                <a:cs typeface="+mn-cs"/>
+              </a:rPr>
+              <a:t>In order to reach climate goals, we have to take every possibility to cut down on emissions.</a:t>
+            </a:r>
+          </a:p>
+          <a:p>
+            <a:r>
+              <a:rPr lang="en-GB" sz="1200" b="0" i="0" kern="1200" dirty="0">
+                <a:solidFill>
+                  <a:schemeClr val="tx1"/>
+                </a:solidFill>
+                <a:effectLst/>
+                <a:latin typeface="+mn-lt"/>
+                <a:ea typeface="+mn-ea"/>
+                <a:cs typeface="+mn-cs"/>
+              </a:rPr>
+              <a:t>In Switzerland, around 1.9 million people commute by car between home and work every day. Many of them drive alone from A to B.</a:t>
+            </a:r>
+          </a:p>
+          <a:p>
+            <a:r>
+              <a:rPr lang="en-GB" sz="1200" b="0" i="0" kern="1200" dirty="0">
+                <a:solidFill>
+                  <a:schemeClr val="tx1"/>
+                </a:solidFill>
+                <a:effectLst/>
+                <a:latin typeface="+mn-lt"/>
+                <a:ea typeface="+mn-ea"/>
+                <a:cs typeface="+mn-cs"/>
+              </a:rPr>
+              <a:t>Now imagine if we could match some of those rides together, and thereby reduce the amount of cars on the street.</a:t>
+            </a:r>
+          </a:p>
+          <a:p>
+            <a:r>
+              <a:rPr lang="en-GB" sz="1200" b="0" i="0" kern="1200" dirty="0">
+                <a:solidFill>
+                  <a:schemeClr val="tx1"/>
+                </a:solidFill>
+                <a:effectLst/>
+                <a:latin typeface="+mn-lt"/>
+                <a:ea typeface="+mn-ea"/>
+                <a:cs typeface="+mn-cs"/>
+              </a:rPr>
+              <a:t>This is exactly what our Application is about. </a:t>
+            </a:r>
+          </a:p>
+          <a:p>
+            <a:endParaRPr lang="en-GB" sz="1200" b="0" i="0" kern="1200" dirty="0">
+              <a:solidFill>
+                <a:schemeClr val="tx1"/>
+              </a:solidFill>
+              <a:effectLst/>
+              <a:latin typeface="+mn-lt"/>
+              <a:ea typeface="+mn-ea"/>
+              <a:cs typeface="+mn-cs"/>
+            </a:endParaRPr>
+          </a:p>
+          <a:p>
+            <a:r>
+              <a:rPr lang="en-CH" dirty="0"/>
+              <a:t>At the same time we can make the experience of ridesharing more pleasant. </a:t>
+            </a:r>
+          </a:p>
+          <a:p>
+            <a:r>
+              <a:rPr lang="en-CH" dirty="0"/>
+              <a:t>For example by including the amount of baggage or even the music taste of the individuals in the matching process.</a:t>
+            </a:r>
+          </a:p>
+          <a:p>
+            <a:endParaRPr lang="en-CH" dirty="0"/>
+          </a:p>
+          <a:p>
+            <a:endParaRPr lang="en-CH" dirty="0"/>
           </a:p>
         </p:txBody>
       </p:sp>
@@ -749,6 +831,205 @@
     <p:extLst>
       <p:ext uri="{BB962C8B-B14F-4D97-AF65-F5344CB8AC3E}">
         <p14:creationId xmlns:p14="http://schemas.microsoft.com/office/powerpoint/2010/main" val="603607324"/>
+      </p:ext>
+    </p:extLst>
+  </p:cSld>
+  <p:clrMapOvr>
+    <a:masterClrMapping/>
+  </p:clrMapOvr>
+</p:notes>
+</file>
+
+<file path=ppt/notesSlides/notesSlide4.xml><?xml version="1.0" encoding="utf-8"?>
+<p:notes xmlns:a="http://schemas.openxmlformats.org/drawingml/2006/main" xmlns:r="http://schemas.openxmlformats.org/officeDocument/2006/relationships" xmlns:p="http://schemas.openxmlformats.org/presentationml/2006/main">
+  <p:cSld>
+    <p:spTree>
+      <p:nvGrpSpPr>
+        <p:cNvPr id="1" name=""/>
+        <p:cNvGrpSpPr/>
+        <p:nvPr/>
+      </p:nvGrpSpPr>
+      <p:grpSpPr>
+        <a:xfrm>
+          <a:off x="0" y="0"/>
+          <a:ext cx="0" cy="0"/>
+          <a:chOff x="0" y="0"/>
+          <a:chExt cx="0" cy="0"/>
+        </a:xfrm>
+      </p:grpSpPr>
+      <p:sp>
+        <p:nvSpPr>
+          <p:cNvPr id="2" name="Slide Image Placeholder 1"/>
+          <p:cNvSpPr>
+            <a:spLocks noGrp="1" noRot="1" noChangeAspect="1"/>
+          </p:cNvSpPr>
+          <p:nvPr>
+            <p:ph type="sldImg"/>
+          </p:nvPr>
+        </p:nvSpPr>
+        <p:spPr/>
+      </p:sp>
+      <p:sp>
+        <p:nvSpPr>
+          <p:cNvPr id="3" name="Notes Placeholder 2"/>
+          <p:cNvSpPr>
+            <a:spLocks noGrp="1"/>
+          </p:cNvSpPr>
+          <p:nvPr>
+            <p:ph type="body" idx="1"/>
+          </p:nvPr>
+        </p:nvSpPr>
+        <p:spPr/>
+        <p:txBody>
+          <a:bodyPr/>
+          <a:lstStyle/>
+          <a:p>
+            <a:r>
+              <a:rPr lang="en-CH" dirty="0"/>
+              <a:t>Our Project is completely based on Microsoft Services.</a:t>
+            </a:r>
+          </a:p>
+          <a:p>
+            <a:endParaRPr lang="en-CH" dirty="0"/>
+          </a:p>
+          <a:p>
+            <a:r>
+              <a:rPr lang="en-CH" dirty="0"/>
+              <a:t>We decided for this no-nonsense architecture because it is easy to setup but scalable at the same time.</a:t>
+            </a:r>
+          </a:p>
+          <a:p>
+            <a:endParaRPr lang="en-CH" dirty="0"/>
+          </a:p>
+          <a:p>
+            <a:r>
+              <a:rPr lang="en-GB" dirty="0"/>
+              <a:t>T</a:t>
+            </a:r>
+            <a:r>
+              <a:rPr lang="en-CH" dirty="0"/>
+              <a:t>he process of finding the optimal matches is very time consuming and would completely destroy the user experience. This is why we decided to precalculate potential matches as soon as the user enters his adress, and store them them in Azure Table Storage. </a:t>
+            </a:r>
+          </a:p>
+          <a:p>
+            <a:r>
+              <a:rPr lang="en-CH" dirty="0"/>
+              <a:t>As soon as the user actually starts looking for someone share a ride with, the results of our algorithm are already stored and can be provided instantly.</a:t>
+            </a:r>
+          </a:p>
+        </p:txBody>
+      </p:sp>
+      <p:sp>
+        <p:nvSpPr>
+          <p:cNvPr id="4" name="Slide Number Placeholder 3"/>
+          <p:cNvSpPr>
+            <a:spLocks noGrp="1"/>
+          </p:cNvSpPr>
+          <p:nvPr>
+            <p:ph type="sldNum" sz="quarter" idx="5"/>
+          </p:nvPr>
+        </p:nvSpPr>
+        <p:spPr/>
+        <p:txBody>
+          <a:bodyPr/>
+          <a:lstStyle/>
+          <a:p>
+            <a:fld id="{4F9EB7BC-E3FE-644B-A8BB-DE59933EA7C3}" type="slidenum">
+              <a:rPr lang="en-CH" smtClean="0"/>
+              <a:t>4</a:t>
+            </a:fld>
+            <a:endParaRPr lang="en-CH"/>
+          </a:p>
+        </p:txBody>
+      </p:sp>
+    </p:spTree>
+    <p:extLst>
+      <p:ext uri="{BB962C8B-B14F-4D97-AF65-F5344CB8AC3E}">
+        <p14:creationId xmlns:p14="http://schemas.microsoft.com/office/powerpoint/2010/main" val="2020451648"/>
+      </p:ext>
+    </p:extLst>
+  </p:cSld>
+  <p:clrMapOvr>
+    <a:masterClrMapping/>
+  </p:clrMapOvr>
+</p:notes>
+</file>
+
+<file path=ppt/notesSlides/notesSlide5.xml><?xml version="1.0" encoding="utf-8"?>
+<p:notes xmlns:a="http://schemas.openxmlformats.org/drawingml/2006/main" xmlns:r="http://schemas.openxmlformats.org/officeDocument/2006/relationships" xmlns:p="http://schemas.openxmlformats.org/presentationml/2006/main">
+  <p:cSld>
+    <p:spTree>
+      <p:nvGrpSpPr>
+        <p:cNvPr id="1" name=""/>
+        <p:cNvGrpSpPr/>
+        <p:nvPr/>
+      </p:nvGrpSpPr>
+      <p:grpSpPr>
+        <a:xfrm>
+          <a:off x="0" y="0"/>
+          <a:ext cx="0" cy="0"/>
+          <a:chOff x="0" y="0"/>
+          <a:chExt cx="0" cy="0"/>
+        </a:xfrm>
+      </p:grpSpPr>
+      <p:sp>
+        <p:nvSpPr>
+          <p:cNvPr id="2" name="Slide Image Placeholder 1"/>
+          <p:cNvSpPr>
+            <a:spLocks noGrp="1" noRot="1" noChangeAspect="1"/>
+          </p:cNvSpPr>
+          <p:nvPr>
+            <p:ph type="sldImg"/>
+          </p:nvPr>
+        </p:nvSpPr>
+        <p:spPr/>
+      </p:sp>
+      <p:sp>
+        <p:nvSpPr>
+          <p:cNvPr id="3" name="Notes Placeholder 2"/>
+          <p:cNvSpPr>
+            <a:spLocks noGrp="1"/>
+          </p:cNvSpPr>
+          <p:nvPr>
+            <p:ph type="body" idx="1"/>
+          </p:nvPr>
+        </p:nvSpPr>
+        <p:spPr/>
+        <p:txBody>
+          <a:bodyPr/>
+          <a:lstStyle/>
+          <a:p>
+            <a:endParaRPr lang="en-CH" dirty="0"/>
+          </a:p>
+        </p:txBody>
+      </p:sp>
+      <p:sp>
+        <p:nvSpPr>
+          <p:cNvPr id="4" name="Slide Number Placeholder 3"/>
+          <p:cNvSpPr>
+            <a:spLocks noGrp="1"/>
+          </p:cNvSpPr>
+          <p:nvPr>
+            <p:ph type="sldNum" sz="quarter" idx="5"/>
+          </p:nvPr>
+        </p:nvSpPr>
+        <p:spPr/>
+        <p:txBody>
+          <a:bodyPr/>
+          <a:lstStyle/>
+          <a:p>
+            <a:fld id="{4F9EB7BC-E3FE-644B-A8BB-DE59933EA7C3}" type="slidenum">
+              <a:rPr lang="en-CH" smtClean="0"/>
+              <a:t>5</a:t>
+            </a:fld>
+            <a:endParaRPr lang="en-CH"/>
+          </a:p>
+        </p:txBody>
+      </p:sp>
+    </p:spTree>
+    <p:extLst>
+      <p:ext uri="{BB962C8B-B14F-4D97-AF65-F5344CB8AC3E}">
+        <p14:creationId xmlns:p14="http://schemas.microsoft.com/office/powerpoint/2010/main" val="3372103576"/>
       </p:ext>
     </p:extLst>
   </p:cSld>
@@ -4294,10 +4575,7 @@
     <p:bg>
       <p:bgPr>
         <a:solidFill>
-          <a:schemeClr val="accent5">
-            <a:lumMod val="60000"/>
-            <a:lumOff val="40000"/>
-          </a:schemeClr>
+          <a:srgbClr val="9DC3E6"/>
         </a:solidFill>
         <a:effectLst/>
       </p:bgPr>
@@ -4386,14 +4664,6 @@
                 <a:latin typeface="Trebuchet MS" panose="020B0703020202090204" pitchFamily="34" charset="0"/>
               </a:rPr>
               <a:t>atching people with similar routes</a:t>
-            </a:r>
-          </a:p>
-          <a:p>
-            <a:r>
-              <a:rPr lang="en-GB" dirty="0">
-                <a:latin typeface="Trebuchet MS" panose="020B0703020202090204" pitchFamily="34" charset="0"/>
-              </a:rPr>
-              <a:t>easy choice between possible driver with reliability score</a:t>
             </a:r>
           </a:p>
           <a:p>
@@ -4475,10 +4745,7 @@
     <p:bg>
       <p:bgPr>
         <a:solidFill>
-          <a:schemeClr val="accent5">
-            <a:lumMod val="60000"/>
-            <a:lumOff val="40000"/>
-          </a:schemeClr>
+          <a:srgbClr val="9DC3E6"/>
         </a:solidFill>
         <a:effectLst/>
       </p:bgPr>
@@ -4544,15 +4811,14 @@
           </p:nvPr>
         </p:nvPicPr>
         <p:blipFill>
-          <a:blip r:embed="rId2"/>
-          <a:stretch>
-            <a:fillRect/>
-          </a:stretch>
+          <a:blip r:embed="rId3"/>
+          <a:srcRect/>
+          <a:stretch/>
         </p:blipFill>
         <p:spPr>
           <a:xfrm>
-            <a:off x="1890582" y="1513800"/>
-            <a:ext cx="8441628" cy="4993200"/>
+            <a:off x="1890582" y="1575315"/>
+            <a:ext cx="8441628" cy="4870170"/>
           </a:xfrm>
         </p:spPr>
       </p:pic>
@@ -4575,10 +4841,7 @@
     <p:bg>
       <p:bgPr>
         <a:solidFill>
-          <a:schemeClr val="accent5">
-            <a:lumMod val="60000"/>
-            <a:lumOff val="40000"/>
-          </a:schemeClr>
+          <a:srgbClr val="9DC3E6"/>
         </a:solidFill>
         <a:effectLst/>
       </p:bgPr>
@@ -4652,7 +4915,7 @@
               <a:rPr lang="de-CH" b="1" dirty="0" err="1">
                 <a:latin typeface="Trebuchet MS" panose="020B0703020202090204" pitchFamily="34" charset="0"/>
               </a:rPr>
-              <a:t>makes</a:t>
+              <a:t>distinguishes</a:t>
             </a:r>
             <a:r>
               <a:rPr lang="de-CH" b="1" dirty="0">
@@ -4677,12 +4940,6 @@
                 <a:latin typeface="Trebuchet MS" panose="020B0703020202090204" pitchFamily="34" charset="0"/>
               </a:rPr>
               <a:t>solution</a:t>
-            </a:r>
-            <a:r>
-              <a:rPr lang="de-CH" b="1" dirty="0">
-                <a:latin typeface="Trebuchet MS" panose="020B0703020202090204" pitchFamily="34" charset="0"/>
-              </a:rPr>
-              <a:t> stand out</a:t>
             </a:r>
             <a:endParaRPr lang="en-CH" b="1" dirty="0">
               <a:latin typeface="Trebuchet MS" panose="020B0703020202090204" pitchFamily="34" charset="0"/>
@@ -4816,10 +5073,7 @@
     <p:bg>
       <p:bgPr>
         <a:solidFill>
-          <a:schemeClr val="accent5">
-            <a:lumMod val="60000"/>
-            <a:lumOff val="40000"/>
-          </a:schemeClr>
+          <a:srgbClr val="9DC3E6"/>
         </a:solidFill>
         <a:effectLst/>
       </p:bgPr>
@@ -4942,10 +5196,7 @@
     <p:bg>
       <p:bgPr>
         <a:solidFill>
-          <a:schemeClr val="accent5">
-            <a:lumMod val="60000"/>
-            <a:lumOff val="40000"/>
-          </a:schemeClr>
+          <a:srgbClr val="9DC3E6"/>
         </a:solidFill>
         <a:effectLst/>
       </p:bgPr>
@@ -5078,10 +5329,7 @@
     <p:bg>
       <p:bgPr>
         <a:solidFill>
-          <a:schemeClr val="accent5">
-            <a:lumMod val="60000"/>
-            <a:lumOff val="40000"/>
-          </a:schemeClr>
+          <a:srgbClr val="9DC3E6"/>
         </a:solidFill>
         <a:effectLst/>
       </p:bgPr>
@@ -5202,10 +5450,7 @@
     <p:bg>
       <p:bgPr>
         <a:solidFill>
-          <a:schemeClr val="accent5">
-            <a:lumMod val="60000"/>
-            <a:lumOff val="40000"/>
-          </a:schemeClr>
+          <a:srgbClr val="9DC3E6"/>
         </a:solidFill>
         <a:effectLst/>
       </p:bgPr>

</xml_diff>

<commit_message>
ppp demo text done
</commit_message>
<xml_diff>
--- a/static/dachfenster-pitch.pptx
+++ b/static/dachfenster-pitch.pptx
@@ -5,18 +5,19 @@
     <p:sldMasterId id="2147483648" r:id="rId1"/>
   </p:sldMasterIdLst>
   <p:notesMasterIdLst>
-    <p:notesMasterId r:id="rId11"/>
+    <p:notesMasterId r:id="rId12"/>
   </p:notesMasterIdLst>
   <p:sldIdLst>
     <p:sldId id="256" r:id="rId2"/>
     <p:sldId id="264" r:id="rId3"/>
     <p:sldId id="259" r:id="rId4"/>
-    <p:sldId id="258" r:id="rId5"/>
-    <p:sldId id="260" r:id="rId6"/>
-    <p:sldId id="257" r:id="rId7"/>
-    <p:sldId id="261" r:id="rId8"/>
-    <p:sldId id="262" r:id="rId9"/>
-    <p:sldId id="263" r:id="rId10"/>
+    <p:sldId id="260" r:id="rId5"/>
+    <p:sldId id="257" r:id="rId6"/>
+    <p:sldId id="258" r:id="rId7"/>
+    <p:sldId id="265" r:id="rId8"/>
+    <p:sldId id="261" r:id="rId9"/>
+    <p:sldId id="262" r:id="rId10"/>
+    <p:sldId id="263" r:id="rId11"/>
   </p:sldIdLst>
   <p:sldSz cx="12192000" cy="6858000"/>
   <p:notesSz cx="6858000" cy="9144000"/>
@@ -886,36 +887,70 @@
           <a:p>
             <a:r>
               <a:rPr lang="en-CH" dirty="0"/>
-              <a:t>Our Project is completely based on Microsoft Services.</a:t>
+              <a:t>Our solution differs greatly from already existing ones. </a:t>
+            </a:r>
+          </a:p>
+          <a:p>
+            <a:r>
+              <a:rPr lang="en-CH" dirty="0"/>
+              <a:t>because we do not just minimize the disadvantages of ridesharing, </a:t>
+            </a:r>
+          </a:p>
+          <a:p>
+            <a:r>
+              <a:rPr lang="en-CH" dirty="0"/>
+              <a:t>like detour time for the driver and difference between ideal departure times, </a:t>
+            </a:r>
+          </a:p>
+          <a:p>
+            <a:r>
+              <a:rPr lang="en-CH" dirty="0"/>
+              <a:t>we also try to maximize the social aspect of ridesharing.</a:t>
             </a:r>
           </a:p>
           <a:p>
             <a:endParaRPr lang="en-CH" dirty="0"/>
           </a:p>
           <a:p>
+            <a:endParaRPr lang="en-CH" dirty="0"/>
+          </a:p>
+          <a:p>
             <a:r>
               <a:rPr lang="en-CH" dirty="0"/>
-              <a:t>We decided for this no-nonsense architecture because it is easy to setup but scalable at the same time.</a:t>
+              <a:t>Additionally we include the satefety of the user and the reliability factor, by providing a driver rating. </a:t>
+            </a:r>
+          </a:p>
+          <a:p>
+            <a:pPr marL="0" marR="0" lvl="0" indent="0" algn="l" defTabSz="914400" rtl="0" eaLnBrk="1" fontAlgn="auto" latinLnBrk="0" hangingPunct="1">
+              <a:lnSpc>
+                <a:spcPct val="100000"/>
+              </a:lnSpc>
+              <a:spcBef>
+                <a:spcPts val="0"/>
+              </a:spcBef>
+              <a:spcAft>
+                <a:spcPts val="0"/>
+              </a:spcAft>
+              <a:buClrTx/>
+              <a:buSzTx/>
+              <a:buFontTx/>
+              <a:buNone/>
+              <a:tabLst/>
+              <a:defRPr/>
+            </a:pPr>
+            <a:r>
+              <a:rPr lang="en-CH" dirty="0"/>
+              <a:t>Every passenger has the chance to rate his driver.</a:t>
             </a:r>
           </a:p>
           <a:p>
             <a:endParaRPr lang="en-CH" dirty="0"/>
           </a:p>
           <a:p>
-            <a:r>
-              <a:rPr lang="en-GB" dirty="0"/>
-              <a:t>T</a:t>
-            </a:r>
-            <a:r>
-              <a:rPr lang="en-CH" dirty="0"/>
-              <a:t>he process of finding the optimal matches is very time consuming and would completely destroy the user experience. This is why we decided to precalculate potential matches as soon as the user enters his adress, and store them them in Azure Table Storage. </a:t>
-            </a:r>
-          </a:p>
-          <a:p>
-            <a:r>
-              <a:rPr lang="en-CH" dirty="0"/>
-              <a:t>As soon as the user actually starts looking for someone share a ride with, the results of our algorithm are already stored and can be provided instantly.</a:t>
-            </a:r>
+            <a:endParaRPr lang="en-CH" dirty="0"/>
+          </a:p>
+          <a:p>
+            <a:endParaRPr lang="en-CH" dirty="0"/>
           </a:p>
         </p:txBody>
       </p:sp>
@@ -945,7 +980,7 @@
     </p:spTree>
     <p:extLst>
       <p:ext uri="{BB962C8B-B14F-4D97-AF65-F5344CB8AC3E}">
-        <p14:creationId xmlns:p14="http://schemas.microsoft.com/office/powerpoint/2010/main" val="2020451648"/>
+        <p14:creationId xmlns:p14="http://schemas.microsoft.com/office/powerpoint/2010/main" val="3372103576"/>
       </p:ext>
     </p:extLst>
   </p:cSld>
@@ -999,7 +1034,213 @@
           <a:bodyPr/>
           <a:lstStyle/>
           <a:p>
+            <a:r>
+              <a:rPr lang="en-GB" dirty="0"/>
+              <a:t>The main principle of our matching is to provide a selection of matching rides, </a:t>
+            </a:r>
+            <a:r>
+              <a:rPr lang="de-CH" dirty="0" err="1"/>
+              <a:t>ranked</a:t>
+            </a:r>
+            <a:r>
+              <a:rPr lang="de-CH" dirty="0"/>
+              <a:t> </a:t>
+            </a:r>
+            <a:r>
+              <a:rPr lang="de-CH" dirty="0" err="1"/>
+              <a:t>by</a:t>
+            </a:r>
+            <a:r>
+              <a:rPr lang="de-CH" dirty="0"/>
+              <a:t> </a:t>
+            </a:r>
+            <a:r>
+              <a:rPr lang="de-CH" dirty="0" err="1"/>
+              <a:t>geogrphaical</a:t>
+            </a:r>
+            <a:r>
+              <a:rPr lang="de-CH" dirty="0"/>
+              <a:t> </a:t>
+            </a:r>
+            <a:r>
+              <a:rPr lang="de-CH" dirty="0" err="1"/>
+              <a:t>suitability</a:t>
+            </a:r>
+            <a:r>
+              <a:rPr lang="de-CH" dirty="0"/>
+              <a:t>. </a:t>
+            </a:r>
+          </a:p>
+          <a:p>
+            <a:endParaRPr lang="de-CH" dirty="0"/>
+          </a:p>
+          <a:p>
+            <a:r>
+              <a:rPr lang="de-CH" dirty="0"/>
+              <a:t>The </a:t>
+            </a:r>
+            <a:r>
+              <a:rPr lang="de-CH" dirty="0" err="1"/>
+              <a:t>user</a:t>
+            </a:r>
+            <a:r>
+              <a:rPr lang="de-CH" dirty="0"/>
+              <a:t> </a:t>
+            </a:r>
+            <a:r>
+              <a:rPr lang="de-CH" dirty="0" err="1"/>
+              <a:t>then</a:t>
+            </a:r>
+            <a:r>
+              <a:rPr lang="de-CH" dirty="0"/>
+              <a:t> </a:t>
+            </a:r>
+            <a:r>
+              <a:rPr lang="de-CH" dirty="0" err="1"/>
+              <a:t>can</a:t>
+            </a:r>
+            <a:r>
+              <a:rPr lang="de-CH" dirty="0"/>
+              <a:t> </a:t>
+            </a:r>
+            <a:r>
+              <a:rPr lang="de-CH" dirty="0" err="1"/>
+              <a:t>slect</a:t>
+            </a:r>
+            <a:r>
+              <a:rPr lang="de-CH" dirty="0"/>
+              <a:t> </a:t>
+            </a:r>
+            <a:r>
+              <a:rPr lang="de-CH" dirty="0" err="1"/>
+              <a:t>the</a:t>
+            </a:r>
+            <a:r>
+              <a:rPr lang="de-CH" dirty="0"/>
+              <a:t> </a:t>
+            </a:r>
+            <a:r>
+              <a:rPr lang="de-CH" dirty="0" err="1"/>
+              <a:t>driver</a:t>
+            </a:r>
+            <a:r>
+              <a:rPr lang="de-CH" dirty="0"/>
+              <a:t> </a:t>
+            </a:r>
+            <a:r>
+              <a:rPr lang="de-CH" dirty="0" err="1"/>
+              <a:t>suited</a:t>
+            </a:r>
+            <a:r>
+              <a:rPr lang="de-CH" dirty="0"/>
+              <a:t> </a:t>
+            </a:r>
+            <a:r>
+              <a:rPr lang="de-CH" dirty="0" err="1"/>
+              <a:t>best</a:t>
+            </a:r>
+            <a:r>
+              <a:rPr lang="de-CH" dirty="0"/>
+              <a:t> </a:t>
+            </a:r>
+            <a:r>
+              <a:rPr lang="de-CH" dirty="0" err="1"/>
+              <a:t>for</a:t>
+            </a:r>
+            <a:r>
+              <a:rPr lang="de-CH" dirty="0"/>
+              <a:t> </a:t>
+            </a:r>
+            <a:r>
+              <a:rPr lang="de-CH" dirty="0" err="1"/>
+              <a:t>his</a:t>
+            </a:r>
+            <a:r>
+              <a:rPr lang="de-CH" dirty="0"/>
+              <a:t> </a:t>
+            </a:r>
+            <a:r>
+              <a:rPr lang="de-CH" dirty="0" err="1"/>
+              <a:t>needs</a:t>
+            </a:r>
+            <a:r>
+              <a:rPr lang="de-CH" dirty="0"/>
+              <a:t>, </a:t>
+            </a:r>
+            <a:r>
+              <a:rPr lang="de-CH" dirty="0" err="1"/>
+              <a:t>based</a:t>
+            </a:r>
+            <a:r>
+              <a:rPr lang="de-CH" dirty="0"/>
+              <a:t> on </a:t>
+            </a:r>
+            <a:r>
+              <a:rPr lang="de-CH" dirty="0" err="1"/>
+              <a:t>the</a:t>
+            </a:r>
+            <a:r>
+              <a:rPr lang="de-CH" dirty="0"/>
+              <a:t> tags </a:t>
+            </a:r>
+            <a:r>
+              <a:rPr lang="de-CH" dirty="0" err="1"/>
+              <a:t>provided</a:t>
+            </a:r>
+            <a:r>
+              <a:rPr lang="de-CH" dirty="0"/>
+              <a:t> </a:t>
+            </a:r>
+            <a:r>
+              <a:rPr lang="de-CH" dirty="0" err="1"/>
+              <a:t>by</a:t>
+            </a:r>
+            <a:r>
+              <a:rPr lang="de-CH" dirty="0"/>
+              <a:t> </a:t>
+            </a:r>
+            <a:r>
+              <a:rPr lang="de-CH" dirty="0" err="1"/>
+              <a:t>the</a:t>
+            </a:r>
+            <a:r>
+              <a:rPr lang="de-CH" dirty="0"/>
+              <a:t> </a:t>
+            </a:r>
+            <a:r>
+              <a:rPr lang="de-CH" dirty="0" err="1"/>
+              <a:t>other</a:t>
+            </a:r>
+            <a:r>
+              <a:rPr lang="de-CH" dirty="0"/>
+              <a:t> </a:t>
+            </a:r>
+            <a:r>
+              <a:rPr lang="de-CH" dirty="0" err="1"/>
+              <a:t>matching</a:t>
+            </a:r>
+            <a:r>
+              <a:rPr lang="de-CH" dirty="0"/>
+              <a:t> </a:t>
+            </a:r>
+            <a:r>
+              <a:rPr lang="de-CH" dirty="0" err="1"/>
+              <a:t>partner</a:t>
+            </a:r>
+            <a:r>
+              <a:rPr lang="de-CH"/>
+              <a:t>.</a:t>
+            </a:r>
             <a:endParaRPr lang="en-CH" dirty="0"/>
+          </a:p>
+          <a:p>
+            <a:endParaRPr lang="en-CH" dirty="0"/>
+          </a:p>
+          <a:p>
+            <a:r>
+              <a:rPr lang="en-CH" dirty="0"/>
+              <a:t>At last we try to maximize the safety of the user by only providing non identifiable personal data before a match is accepted by bot, the driver and the passenger.</a:t>
+            </a:r>
           </a:p>
         </p:txBody>
       </p:sp>
@@ -1029,7 +1270,206 @@
     </p:spTree>
     <p:extLst>
       <p:ext uri="{BB962C8B-B14F-4D97-AF65-F5344CB8AC3E}">
-        <p14:creationId xmlns:p14="http://schemas.microsoft.com/office/powerpoint/2010/main" val="3372103576"/>
+        <p14:creationId xmlns:p14="http://schemas.microsoft.com/office/powerpoint/2010/main" val="2052190226"/>
+      </p:ext>
+    </p:extLst>
+  </p:cSld>
+  <p:clrMapOvr>
+    <a:masterClrMapping/>
+  </p:clrMapOvr>
+</p:notes>
+</file>
+
+<file path=ppt/notesSlides/notesSlide6.xml><?xml version="1.0" encoding="utf-8"?>
+<p:notes xmlns:a="http://schemas.openxmlformats.org/drawingml/2006/main" xmlns:r="http://schemas.openxmlformats.org/officeDocument/2006/relationships" xmlns:p="http://schemas.openxmlformats.org/presentationml/2006/main">
+  <p:cSld>
+    <p:spTree>
+      <p:nvGrpSpPr>
+        <p:cNvPr id="1" name=""/>
+        <p:cNvGrpSpPr/>
+        <p:nvPr/>
+      </p:nvGrpSpPr>
+      <p:grpSpPr>
+        <a:xfrm>
+          <a:off x="0" y="0"/>
+          <a:ext cx="0" cy="0"/>
+          <a:chOff x="0" y="0"/>
+          <a:chExt cx="0" cy="0"/>
+        </a:xfrm>
+      </p:grpSpPr>
+      <p:sp>
+        <p:nvSpPr>
+          <p:cNvPr id="2" name="Slide Image Placeholder 1"/>
+          <p:cNvSpPr>
+            <a:spLocks noGrp="1" noRot="1" noChangeAspect="1"/>
+          </p:cNvSpPr>
+          <p:nvPr>
+            <p:ph type="sldImg"/>
+          </p:nvPr>
+        </p:nvSpPr>
+        <p:spPr/>
+      </p:sp>
+      <p:sp>
+        <p:nvSpPr>
+          <p:cNvPr id="3" name="Notes Placeholder 2"/>
+          <p:cNvSpPr>
+            <a:spLocks noGrp="1"/>
+          </p:cNvSpPr>
+          <p:nvPr>
+            <p:ph type="body" idx="1"/>
+          </p:nvPr>
+        </p:nvSpPr>
+        <p:spPr/>
+        <p:txBody>
+          <a:bodyPr/>
+          <a:lstStyle/>
+          <a:p>
+            <a:r>
+              <a:rPr lang="en-CH" dirty="0"/>
+              <a:t>Our Project is completely based on Microsoft Services.</a:t>
+            </a:r>
+          </a:p>
+          <a:p>
+            <a:endParaRPr lang="en-CH" dirty="0"/>
+          </a:p>
+          <a:p>
+            <a:r>
+              <a:rPr lang="en-CH" dirty="0"/>
+              <a:t>We decided for this no-nonsense architecture because it is easy to setup but scalable at the same time.</a:t>
+            </a:r>
+          </a:p>
+          <a:p>
+            <a:endParaRPr lang="en-CH" dirty="0"/>
+          </a:p>
+          <a:p>
+            <a:r>
+              <a:rPr lang="en-GB" dirty="0"/>
+              <a:t>T</a:t>
+            </a:r>
+            <a:r>
+              <a:rPr lang="en-CH" dirty="0"/>
+              <a:t>he process of finding the optimal matches is very time consuming and would completely destroy the user experience. This is why we decided to precalculate potential matches as soon as the user enters his adress, and store them them in Azure Table Storage. </a:t>
+            </a:r>
+          </a:p>
+          <a:p>
+            <a:r>
+              <a:rPr lang="en-CH" dirty="0"/>
+              <a:t>As soon as the user actually starts looking for someone share a ride with, the results of our algorithm are already stored and can be provided instantly.</a:t>
+            </a:r>
+          </a:p>
+        </p:txBody>
+      </p:sp>
+      <p:sp>
+        <p:nvSpPr>
+          <p:cNvPr id="4" name="Slide Number Placeholder 3"/>
+          <p:cNvSpPr>
+            <a:spLocks noGrp="1"/>
+          </p:cNvSpPr>
+          <p:nvPr>
+            <p:ph type="sldNum" sz="quarter" idx="5"/>
+          </p:nvPr>
+        </p:nvSpPr>
+        <p:spPr/>
+        <p:txBody>
+          <a:bodyPr/>
+          <a:lstStyle/>
+          <a:p>
+            <a:fld id="{4F9EB7BC-E3FE-644B-A8BB-DE59933EA7C3}" type="slidenum">
+              <a:rPr lang="en-CH" smtClean="0"/>
+              <a:t>6</a:t>
+            </a:fld>
+            <a:endParaRPr lang="en-CH"/>
+          </a:p>
+        </p:txBody>
+      </p:sp>
+    </p:spTree>
+    <p:extLst>
+      <p:ext uri="{BB962C8B-B14F-4D97-AF65-F5344CB8AC3E}">
+        <p14:creationId xmlns:p14="http://schemas.microsoft.com/office/powerpoint/2010/main" val="2020451648"/>
+      </p:ext>
+    </p:extLst>
+  </p:cSld>
+  <p:clrMapOvr>
+    <a:masterClrMapping/>
+  </p:clrMapOvr>
+</p:notes>
+</file>
+
+<file path=ppt/notesSlides/notesSlide7.xml><?xml version="1.0" encoding="utf-8"?>
+<p:notes xmlns:a="http://schemas.openxmlformats.org/drawingml/2006/main" xmlns:r="http://schemas.openxmlformats.org/officeDocument/2006/relationships" xmlns:p="http://schemas.openxmlformats.org/presentationml/2006/main">
+  <p:cSld>
+    <p:spTree>
+      <p:nvGrpSpPr>
+        <p:cNvPr id="1" name=""/>
+        <p:cNvGrpSpPr/>
+        <p:nvPr/>
+      </p:nvGrpSpPr>
+      <p:grpSpPr>
+        <a:xfrm>
+          <a:off x="0" y="0"/>
+          <a:ext cx="0" cy="0"/>
+          <a:chOff x="0" y="0"/>
+          <a:chExt cx="0" cy="0"/>
+        </a:xfrm>
+      </p:grpSpPr>
+      <p:sp>
+        <p:nvSpPr>
+          <p:cNvPr id="2" name="Slide Image Placeholder 1"/>
+          <p:cNvSpPr>
+            <a:spLocks noGrp="1" noRot="1" noChangeAspect="1"/>
+          </p:cNvSpPr>
+          <p:nvPr>
+            <p:ph type="sldImg"/>
+          </p:nvPr>
+        </p:nvSpPr>
+        <p:spPr/>
+      </p:sp>
+      <p:sp>
+        <p:nvSpPr>
+          <p:cNvPr id="3" name="Notes Placeholder 2"/>
+          <p:cNvSpPr>
+            <a:spLocks noGrp="1"/>
+          </p:cNvSpPr>
+          <p:nvPr>
+            <p:ph type="body" idx="1"/>
+          </p:nvPr>
+        </p:nvSpPr>
+        <p:spPr/>
+        <p:txBody>
+          <a:bodyPr/>
+          <a:lstStyle/>
+          <a:p>
+            <a:endParaRPr lang="en-CH" dirty="0"/>
+          </a:p>
+        </p:txBody>
+      </p:sp>
+      <p:sp>
+        <p:nvSpPr>
+          <p:cNvPr id="4" name="Slide Number Placeholder 3"/>
+          <p:cNvSpPr>
+            <a:spLocks noGrp="1"/>
+          </p:cNvSpPr>
+          <p:nvPr>
+            <p:ph type="sldNum" sz="quarter" idx="5"/>
+          </p:nvPr>
+        </p:nvSpPr>
+        <p:spPr/>
+        <p:txBody>
+          <a:bodyPr/>
+          <a:lstStyle/>
+          <a:p>
+            <a:fld id="{4F9EB7BC-E3FE-644B-A8BB-DE59933EA7C3}" type="slidenum">
+              <a:rPr lang="en-CH" smtClean="0"/>
+              <a:t>7</a:t>
+            </a:fld>
+            <a:endParaRPr lang="en-CH"/>
+          </a:p>
+        </p:txBody>
+      </p:sp>
+    </p:spTree>
+    <p:extLst>
+      <p:ext uri="{BB962C8B-B14F-4D97-AF65-F5344CB8AC3E}">
+        <p14:creationId xmlns:p14="http://schemas.microsoft.com/office/powerpoint/2010/main" val="657786521"/>
       </p:ext>
     </p:extLst>
   </p:cSld>
@@ -4330,6 +4770,104 @@
 </p:sld>
 </file>
 
+<file path=ppt/slides/slide10.xml><?xml version="1.0" encoding="utf-8"?>
+<p:sld xmlns:a="http://schemas.openxmlformats.org/drawingml/2006/main" xmlns:r="http://schemas.openxmlformats.org/officeDocument/2006/relationships" xmlns:p="http://schemas.openxmlformats.org/presentationml/2006/main">
+  <p:cSld>
+    <p:bg>
+      <p:bgPr>
+        <a:solidFill>
+          <a:srgbClr val="9DC3E6"/>
+        </a:solidFill>
+        <a:effectLst/>
+      </p:bgPr>
+    </p:bg>
+    <p:spTree>
+      <p:nvGrpSpPr>
+        <p:cNvPr id="1" name=""/>
+        <p:cNvGrpSpPr/>
+        <p:nvPr/>
+      </p:nvGrpSpPr>
+      <p:grpSpPr>
+        <a:xfrm>
+          <a:off x="0" y="0"/>
+          <a:ext cx="0" cy="0"/>
+          <a:chOff x="0" y="0"/>
+          <a:chExt cx="0" cy="0"/>
+        </a:xfrm>
+      </p:grpSpPr>
+      <p:sp>
+        <p:nvSpPr>
+          <p:cNvPr id="2" name="Title 1">
+            <a:extLst>
+              <a:ext uri="{FF2B5EF4-FFF2-40B4-BE49-F238E27FC236}">
+                <a16:creationId xmlns:a16="http://schemas.microsoft.com/office/drawing/2014/main" id="{A5186B16-9D62-5146-B2AA-4EEE35AFAD22}"/>
+              </a:ext>
+            </a:extLst>
+          </p:cNvPr>
+          <p:cNvSpPr>
+            <a:spLocks noGrp="1"/>
+          </p:cNvSpPr>
+          <p:nvPr>
+            <p:ph type="title"/>
+          </p:nvPr>
+        </p:nvSpPr>
+        <p:spPr/>
+        <p:txBody>
+          <a:bodyPr/>
+          <a:lstStyle/>
+          <a:p>
+            <a:r>
+              <a:rPr lang="en-CH" b="1" dirty="0">
+                <a:latin typeface="Trebuchet MS" panose="020B0703020202090204" pitchFamily="34" charset="0"/>
+              </a:rPr>
+              <a:t>Template</a:t>
+            </a:r>
+          </a:p>
+        </p:txBody>
+      </p:sp>
+      <p:sp>
+        <p:nvSpPr>
+          <p:cNvPr id="3" name="Content Placeholder 2">
+            <a:extLst>
+              <a:ext uri="{FF2B5EF4-FFF2-40B4-BE49-F238E27FC236}">
+                <a16:creationId xmlns:a16="http://schemas.microsoft.com/office/drawing/2014/main" id="{4C6BE1A8-DF59-264C-802F-A0231680D18B}"/>
+              </a:ext>
+            </a:extLst>
+          </p:cNvPr>
+          <p:cNvSpPr>
+            <a:spLocks noGrp="1"/>
+          </p:cNvSpPr>
+          <p:nvPr>
+            <p:ph idx="1"/>
+          </p:nvPr>
+        </p:nvSpPr>
+        <p:spPr/>
+        <p:txBody>
+          <a:bodyPr/>
+          <a:lstStyle/>
+          <a:p>
+            <a:r>
+              <a:rPr lang="en-CH" dirty="0">
+                <a:latin typeface="Trebuchet MS" panose="020B0703020202090204" pitchFamily="34" charset="0"/>
+              </a:rPr>
+              <a:t>template</a:t>
+            </a:r>
+          </a:p>
+        </p:txBody>
+      </p:sp>
+    </p:spTree>
+    <p:extLst>
+      <p:ext uri="{BB962C8B-B14F-4D97-AF65-F5344CB8AC3E}">
+        <p14:creationId xmlns:p14="http://schemas.microsoft.com/office/powerpoint/2010/main" val="2054443711"/>
+      </p:ext>
+    </p:extLst>
+  </p:cSld>
+  <p:clrMapOvr>
+    <a:masterClrMapping/>
+  </p:clrMapOvr>
+</p:sld>
+</file>
+
 <file path=ppt/slides/slide2.xml><?xml version="1.0" encoding="utf-8"?>
 <p:sld xmlns:a="http://schemas.openxmlformats.org/drawingml/2006/main" xmlns:r="http://schemas.openxmlformats.org/officeDocument/2006/relationships" xmlns:p="http://schemas.openxmlformats.org/presentationml/2006/main">
   <p:cSld>
@@ -4786,46 +5324,182 @@
           <a:lstStyle/>
           <a:p>
             <a:r>
-              <a:rPr lang="en-CH" b="1" dirty="0">
+              <a:rPr lang="de-CH" b="1" dirty="0">
                 <a:latin typeface="Trebuchet MS" panose="020B0703020202090204" pitchFamily="34" charset="0"/>
               </a:rPr>
-              <a:t>Project Architecture</a:t>
-            </a:r>
-          </a:p>
-        </p:txBody>
-      </p:sp>
-      <p:pic>
-        <p:nvPicPr>
-          <p:cNvPr id="5" name="Content Placeholder 4">
-            <a:extLst>
-              <a:ext uri="{FF2B5EF4-FFF2-40B4-BE49-F238E27FC236}">
-                <a16:creationId xmlns:a16="http://schemas.microsoft.com/office/drawing/2014/main" id="{5AD53865-210C-0D4B-B610-8033B7BBF09F}"/>
-              </a:ext>
-            </a:extLst>
-          </p:cNvPr>
-          <p:cNvPicPr>
-            <a:picLocks noGrp="1" noChangeAspect="1"/>
-          </p:cNvPicPr>
+              <a:t>This </a:t>
+            </a:r>
+            <a:r>
+              <a:rPr lang="de-CH" b="1" dirty="0" err="1">
+                <a:latin typeface="Trebuchet MS" panose="020B0703020202090204" pitchFamily="34" charset="0"/>
+              </a:rPr>
+              <a:t>is</a:t>
+            </a:r>
+            <a:r>
+              <a:rPr lang="de-CH" b="1" dirty="0">
+                <a:latin typeface="Trebuchet MS" panose="020B0703020202090204" pitchFamily="34" charset="0"/>
+              </a:rPr>
+              <a:t> </a:t>
+            </a:r>
+            <a:r>
+              <a:rPr lang="de-CH" b="1" dirty="0" err="1">
+                <a:latin typeface="Trebuchet MS" panose="020B0703020202090204" pitchFamily="34" charset="0"/>
+              </a:rPr>
+              <a:t>what</a:t>
+            </a:r>
+            <a:r>
+              <a:rPr lang="de-CH" b="1" dirty="0">
+                <a:latin typeface="Trebuchet MS" panose="020B0703020202090204" pitchFamily="34" charset="0"/>
+              </a:rPr>
+              <a:t> </a:t>
+            </a:r>
+            <a:r>
+              <a:rPr lang="de-CH" b="1" dirty="0" err="1">
+                <a:latin typeface="Trebuchet MS" panose="020B0703020202090204" pitchFamily="34" charset="0"/>
+              </a:rPr>
+              <a:t>distinguishes</a:t>
+            </a:r>
+            <a:r>
+              <a:rPr lang="de-CH" b="1" dirty="0">
+                <a:latin typeface="Trebuchet MS" panose="020B0703020202090204" pitchFamily="34" charset="0"/>
+              </a:rPr>
+              <a:t> </a:t>
+            </a:r>
+            <a:r>
+              <a:rPr lang="de-CH" b="1" dirty="0" err="1">
+                <a:latin typeface="Trebuchet MS" panose="020B0703020202090204" pitchFamily="34" charset="0"/>
+              </a:rPr>
+              <a:t>our</a:t>
+            </a:r>
+            <a:r>
+              <a:rPr lang="de-CH" b="1" dirty="0">
+                <a:latin typeface="Trebuchet MS" panose="020B0703020202090204" pitchFamily="34" charset="0"/>
+              </a:rPr>
+              <a:t> </a:t>
+            </a:r>
+            <a:r>
+              <a:rPr lang="de-CH" b="1" dirty="0" err="1">
+                <a:latin typeface="Trebuchet MS" panose="020B0703020202090204" pitchFamily="34" charset="0"/>
+              </a:rPr>
+              <a:t>solution</a:t>
+            </a:r>
+            <a:endParaRPr lang="en-CH" b="1" dirty="0">
+              <a:latin typeface="Trebuchet MS" panose="020B0703020202090204" pitchFamily="34" charset="0"/>
+            </a:endParaRPr>
+          </a:p>
+        </p:txBody>
+      </p:sp>
+      <p:sp>
+        <p:nvSpPr>
+          <p:cNvPr id="3" name="Content Placeholder 2">
+            <a:extLst>
+              <a:ext uri="{FF2B5EF4-FFF2-40B4-BE49-F238E27FC236}">
+                <a16:creationId xmlns:a16="http://schemas.microsoft.com/office/drawing/2014/main" id="{4C6BE1A8-DF59-264C-802F-A0231680D18B}"/>
+              </a:ext>
+            </a:extLst>
+          </p:cNvPr>
+          <p:cNvSpPr>
+            <a:spLocks noGrp="1"/>
+          </p:cNvSpPr>
           <p:nvPr>
             <p:ph idx="1"/>
           </p:nvPr>
-        </p:nvPicPr>
-        <p:blipFill>
-          <a:blip r:embed="rId3"/>
-          <a:srcRect/>
-          <a:stretch/>
-        </p:blipFill>
-        <p:spPr>
-          <a:xfrm>
-            <a:off x="1890582" y="1575315"/>
-            <a:ext cx="8441628" cy="4870170"/>
-          </a:xfrm>
-        </p:spPr>
-      </p:pic>
+        </p:nvSpPr>
+        <p:spPr/>
+        <p:txBody>
+          <a:bodyPr/>
+          <a:lstStyle/>
+          <a:p>
+            <a:r>
+              <a:rPr lang="en-GB" dirty="0">
+                <a:latin typeface="Trebuchet MS" panose="020B0703020202090204" pitchFamily="34" charset="0"/>
+              </a:rPr>
+              <a:t>m</a:t>
+            </a:r>
+            <a:r>
+              <a:rPr lang="en-CH" dirty="0">
+                <a:latin typeface="Trebuchet MS" panose="020B0703020202090204" pitchFamily="34" charset="0"/>
+              </a:rPr>
+              <a:t>inimize</a:t>
+            </a:r>
+          </a:p>
+          <a:p>
+            <a:pPr lvl="1"/>
+            <a:r>
+              <a:rPr lang="en-GB" dirty="0">
+                <a:latin typeface="Trebuchet MS" panose="020B0703020202090204" pitchFamily="34" charset="0"/>
+              </a:rPr>
+              <a:t>detour time for driver</a:t>
+            </a:r>
+          </a:p>
+          <a:p>
+            <a:pPr lvl="1"/>
+            <a:r>
+              <a:rPr lang="en-GB" dirty="0">
+                <a:latin typeface="Trebuchet MS" panose="020B0703020202090204" pitchFamily="34" charset="0"/>
+              </a:rPr>
+              <a:t>difference between ideal departure times</a:t>
+            </a:r>
+          </a:p>
+          <a:p>
+            <a:r>
+              <a:rPr lang="en-GB" dirty="0">
+                <a:latin typeface="Trebuchet MS" panose="020B0703020202090204" pitchFamily="34" charset="0"/>
+              </a:rPr>
+              <a:t>maximize</a:t>
+            </a:r>
+          </a:p>
+          <a:p>
+            <a:pPr lvl="1"/>
+            <a:r>
+              <a:rPr lang="en-GB" dirty="0">
+                <a:latin typeface="Trebuchet MS" panose="020B0703020202090204" pitchFamily="34" charset="0"/>
+              </a:rPr>
+              <a:t>the social aspect of ridesharing</a:t>
+            </a:r>
+          </a:p>
+          <a:p>
+            <a:pPr lvl="1"/>
+            <a:r>
+              <a:rPr lang="en-GB" dirty="0">
+                <a:latin typeface="Trebuchet MS" panose="020B0703020202090204" pitchFamily="34" charset="0"/>
+              </a:rPr>
+              <a:t>comfort</a:t>
+            </a:r>
+          </a:p>
+          <a:p>
+            <a:pPr lvl="1"/>
+            <a:r>
+              <a:rPr lang="en-GB" dirty="0">
+                <a:latin typeface="Trebuchet MS" panose="020B0703020202090204" pitchFamily="34" charset="0"/>
+              </a:rPr>
+              <a:t>freedom of choice for driver/passenger</a:t>
+            </a:r>
+          </a:p>
+          <a:p>
+            <a:pPr lvl="1"/>
+            <a:r>
+              <a:rPr lang="en-GB" dirty="0">
+                <a:latin typeface="Trebuchet MS" panose="020B0703020202090204" pitchFamily="34" charset="0"/>
+              </a:rPr>
+              <a:t>reliability</a:t>
+            </a:r>
+          </a:p>
+          <a:p>
+            <a:pPr lvl="1"/>
+            <a:r>
+              <a:rPr lang="en-GB" dirty="0">
+                <a:latin typeface="Trebuchet MS" panose="020B0703020202090204" pitchFamily="34" charset="0"/>
+              </a:rPr>
+              <a:t>safety of the user</a:t>
+            </a:r>
+          </a:p>
+        </p:txBody>
+      </p:sp>
     </p:spTree>
     <p:extLst>
       <p:ext uri="{BB962C8B-B14F-4D97-AF65-F5344CB8AC3E}">
-        <p14:creationId xmlns:p14="http://schemas.microsoft.com/office/powerpoint/2010/main" val="1183501346"/>
+        <p14:creationId xmlns:p14="http://schemas.microsoft.com/office/powerpoint/2010/main" val="3069095141"/>
       </p:ext>
     </p:extLst>
   </p:cSld>
@@ -4882,174 +5556,65 @@
           <a:lstStyle/>
           <a:p>
             <a:r>
-              <a:rPr lang="de-CH" b="1" dirty="0">
+              <a:rPr lang="en-CH" b="1" dirty="0">
                 <a:latin typeface="Trebuchet MS" panose="020B0703020202090204" pitchFamily="34" charset="0"/>
               </a:rPr>
-              <a:t>This </a:t>
-            </a:r>
-            <a:r>
-              <a:rPr lang="de-CH" b="1" dirty="0" err="1">
+              <a:t>And how we achieve this / Demo</a:t>
+            </a:r>
+          </a:p>
+        </p:txBody>
+      </p:sp>
+      <p:sp>
+        <p:nvSpPr>
+          <p:cNvPr id="3" name="Content Placeholder 2">
+            <a:extLst>
+              <a:ext uri="{FF2B5EF4-FFF2-40B4-BE49-F238E27FC236}">
+                <a16:creationId xmlns:a16="http://schemas.microsoft.com/office/drawing/2014/main" id="{4C6BE1A8-DF59-264C-802F-A0231680D18B}"/>
+              </a:ext>
+            </a:extLst>
+          </p:cNvPr>
+          <p:cNvSpPr>
+            <a:spLocks noGrp="1"/>
+          </p:cNvSpPr>
+          <p:nvPr>
+            <p:ph idx="1"/>
+          </p:nvPr>
+        </p:nvSpPr>
+        <p:spPr/>
+        <p:txBody>
+          <a:bodyPr/>
+          <a:lstStyle/>
+          <a:p>
+            <a:r>
+              <a:rPr lang="en-GB" dirty="0">
                 <a:latin typeface="Trebuchet MS" panose="020B0703020202090204" pitchFamily="34" charset="0"/>
               </a:rPr>
-              <a:t>is</a:t>
-            </a:r>
-            <a:r>
-              <a:rPr lang="de-CH" b="1" dirty="0">
+              <a:t>t</a:t>
+            </a:r>
+            <a:r>
+              <a:rPr lang="en-CH" dirty="0">
                 <a:latin typeface="Trebuchet MS" panose="020B0703020202090204" pitchFamily="34" charset="0"/>
               </a:rPr>
-              <a:t> </a:t>
-            </a:r>
-            <a:r>
-              <a:rPr lang="de-CH" b="1" dirty="0" err="1">
+              <a:t>he final decision lies in the hand of the driver</a:t>
+            </a:r>
+          </a:p>
+          <a:p>
+            <a:r>
+              <a:rPr lang="en-GB" dirty="0">
                 <a:latin typeface="Trebuchet MS" panose="020B0703020202090204" pitchFamily="34" charset="0"/>
               </a:rPr>
-              <a:t>what</a:t>
-            </a:r>
-            <a:r>
-              <a:rPr lang="de-CH" b="1" dirty="0">
-                <a:latin typeface="Trebuchet MS" panose="020B0703020202090204" pitchFamily="34" charset="0"/>
-              </a:rPr>
-              <a:t> </a:t>
-            </a:r>
-            <a:r>
-              <a:rPr lang="de-CH" b="1" dirty="0" err="1">
-                <a:latin typeface="Trebuchet MS" panose="020B0703020202090204" pitchFamily="34" charset="0"/>
-              </a:rPr>
-              <a:t>distinguishes</a:t>
-            </a:r>
-            <a:r>
-              <a:rPr lang="de-CH" b="1" dirty="0">
-                <a:latin typeface="Trebuchet MS" panose="020B0703020202090204" pitchFamily="34" charset="0"/>
-              </a:rPr>
-              <a:t> </a:t>
-            </a:r>
-            <a:r>
-              <a:rPr lang="de-CH" b="1" dirty="0" err="1">
-                <a:latin typeface="Trebuchet MS" panose="020B0703020202090204" pitchFamily="34" charset="0"/>
-              </a:rPr>
-              <a:t>our</a:t>
-            </a:r>
-            <a:r>
-              <a:rPr lang="de-CH" b="1" dirty="0">
-                <a:latin typeface="Trebuchet MS" panose="020B0703020202090204" pitchFamily="34" charset="0"/>
-              </a:rPr>
-              <a:t> </a:t>
-            </a:r>
-            <a:r>
-              <a:rPr lang="de-CH" b="1" dirty="0" err="1">
-                <a:latin typeface="Trebuchet MS" panose="020B0703020202090204" pitchFamily="34" charset="0"/>
-              </a:rPr>
-              <a:t>solution</a:t>
-            </a:r>
-            <a:endParaRPr lang="en-CH" b="1" dirty="0">
+              <a:t>every user on this platform can describe himself with a few tags</a:t>
+            </a:r>
+            <a:endParaRPr lang="en-CH" dirty="0">
               <a:latin typeface="Trebuchet MS" panose="020B0703020202090204" pitchFamily="34" charset="0"/>
             </a:endParaRPr>
           </a:p>
-        </p:txBody>
-      </p:sp>
-      <p:sp>
-        <p:nvSpPr>
-          <p:cNvPr id="3" name="Content Placeholder 2">
-            <a:extLst>
-              <a:ext uri="{FF2B5EF4-FFF2-40B4-BE49-F238E27FC236}">
-                <a16:creationId xmlns:a16="http://schemas.microsoft.com/office/drawing/2014/main" id="{4C6BE1A8-DF59-264C-802F-A0231680D18B}"/>
-              </a:ext>
-            </a:extLst>
-          </p:cNvPr>
-          <p:cNvSpPr>
-            <a:spLocks noGrp="1"/>
-          </p:cNvSpPr>
-          <p:nvPr>
-            <p:ph idx="1"/>
-          </p:nvPr>
-        </p:nvSpPr>
-        <p:spPr/>
-        <p:txBody>
-          <a:bodyPr/>
-          <a:lstStyle/>
           <a:p>
             <a:r>
               <a:rPr lang="en-GB" dirty="0">
                 <a:latin typeface="Trebuchet MS" panose="020B0703020202090204" pitchFamily="34" charset="0"/>
               </a:rPr>
-              <a:t>m</a:t>
-            </a:r>
-            <a:r>
-              <a:rPr lang="en-CH" dirty="0">
-                <a:latin typeface="Trebuchet MS" panose="020B0703020202090204" pitchFamily="34" charset="0"/>
-              </a:rPr>
-              <a:t>inimize</a:t>
-            </a:r>
-          </a:p>
-          <a:p>
-            <a:pPr lvl="1"/>
-            <a:r>
-              <a:rPr lang="en-GB" dirty="0">
-                <a:latin typeface="Trebuchet MS" panose="020B0703020202090204" pitchFamily="34" charset="0"/>
-              </a:rPr>
-              <a:t>detour time for driver</a:t>
-            </a:r>
-          </a:p>
-          <a:p>
-            <a:pPr lvl="1"/>
-            <a:r>
-              <a:rPr lang="en-GB" dirty="0">
-                <a:latin typeface="Trebuchet MS" panose="020B0703020202090204" pitchFamily="34" charset="0"/>
-              </a:rPr>
-              <a:t>difference between ideal departure times</a:t>
-            </a:r>
-          </a:p>
-          <a:p>
-            <a:r>
-              <a:rPr lang="en-GB" dirty="0">
-                <a:latin typeface="Trebuchet MS" panose="020B0703020202090204" pitchFamily="34" charset="0"/>
-              </a:rPr>
-              <a:t>maximize</a:t>
-            </a:r>
-          </a:p>
-          <a:p>
-            <a:pPr lvl="1"/>
-            <a:r>
-              <a:rPr lang="en-GB" dirty="0">
-                <a:latin typeface="Trebuchet MS" panose="020B0703020202090204" pitchFamily="34" charset="0"/>
-              </a:rPr>
-              <a:t>the social aspect of ridesharing</a:t>
-            </a:r>
-          </a:p>
-          <a:p>
-            <a:pPr lvl="1"/>
-            <a:r>
-              <a:rPr lang="en-GB" dirty="0">
-                <a:latin typeface="Trebuchet MS" panose="020B0703020202090204" pitchFamily="34" charset="0"/>
-              </a:rPr>
-              <a:t>comfort</a:t>
-            </a:r>
-          </a:p>
-          <a:p>
-            <a:pPr lvl="1"/>
-            <a:r>
-              <a:rPr lang="en-GB" dirty="0">
-                <a:latin typeface="Trebuchet MS" panose="020B0703020202090204" pitchFamily="34" charset="0"/>
-              </a:rPr>
-              <a:t>freedom of choice for driver/passenger</a:t>
-            </a:r>
-          </a:p>
-          <a:p>
-            <a:pPr lvl="1"/>
-            <a:r>
-              <a:rPr lang="en-GB" dirty="0">
-                <a:latin typeface="Trebuchet MS" panose="020B0703020202090204" pitchFamily="34" charset="0"/>
-              </a:rPr>
-              <a:t>reliability</a:t>
-            </a:r>
-          </a:p>
-          <a:p>
-            <a:pPr lvl="1"/>
-            <a:r>
-              <a:rPr lang="en-GB" dirty="0">
-                <a:latin typeface="Trebuchet MS" panose="020B0703020202090204" pitchFamily="34" charset="0"/>
-              </a:rPr>
-              <a:t>safety of the user</a:t>
+              <a:t>no sensitive data is shared before both parties agreed</a:t>
             </a:r>
           </a:p>
         </p:txBody>
@@ -5057,7 +5622,7 @@
     </p:spTree>
     <p:extLst>
       <p:ext uri="{BB962C8B-B14F-4D97-AF65-F5344CB8AC3E}">
-        <p14:creationId xmlns:p14="http://schemas.microsoft.com/office/powerpoint/2010/main" val="3069095141"/>
+        <p14:creationId xmlns:p14="http://schemas.microsoft.com/office/powerpoint/2010/main" val="1787380573"/>
       </p:ext>
     </p:extLst>
   </p:cSld>
@@ -5117,70 +5682,43 @@
               <a:rPr lang="en-CH" b="1" dirty="0">
                 <a:latin typeface="Trebuchet MS" panose="020B0703020202090204" pitchFamily="34" charset="0"/>
               </a:rPr>
-              <a:t>And how we achieve this</a:t>
-            </a:r>
-          </a:p>
-        </p:txBody>
-      </p:sp>
-      <p:sp>
-        <p:nvSpPr>
-          <p:cNvPr id="3" name="Content Placeholder 2">
-            <a:extLst>
-              <a:ext uri="{FF2B5EF4-FFF2-40B4-BE49-F238E27FC236}">
-                <a16:creationId xmlns:a16="http://schemas.microsoft.com/office/drawing/2014/main" id="{4C6BE1A8-DF59-264C-802F-A0231680D18B}"/>
-              </a:ext>
-            </a:extLst>
-          </p:cNvPr>
-          <p:cNvSpPr>
-            <a:spLocks noGrp="1"/>
-          </p:cNvSpPr>
+              <a:t>Project Architecture</a:t>
+            </a:r>
+          </a:p>
+        </p:txBody>
+      </p:sp>
+      <p:pic>
+        <p:nvPicPr>
+          <p:cNvPr id="5" name="Content Placeholder 4">
+            <a:extLst>
+              <a:ext uri="{FF2B5EF4-FFF2-40B4-BE49-F238E27FC236}">
+                <a16:creationId xmlns:a16="http://schemas.microsoft.com/office/drawing/2014/main" id="{5AD53865-210C-0D4B-B610-8033B7BBF09F}"/>
+              </a:ext>
+            </a:extLst>
+          </p:cNvPr>
+          <p:cNvPicPr>
+            <a:picLocks noGrp="1" noChangeAspect="1"/>
+          </p:cNvPicPr>
           <p:nvPr>
             <p:ph idx="1"/>
           </p:nvPr>
-        </p:nvSpPr>
-        <p:spPr/>
-        <p:txBody>
-          <a:bodyPr/>
-          <a:lstStyle/>
-          <a:p>
-            <a:r>
-              <a:rPr lang="en-GB" dirty="0">
-                <a:latin typeface="Trebuchet MS" panose="020B0703020202090204" pitchFamily="34" charset="0"/>
-              </a:rPr>
-              <a:t>t</a:t>
-            </a:r>
-            <a:r>
-              <a:rPr lang="en-CH" dirty="0">
-                <a:latin typeface="Trebuchet MS" panose="020B0703020202090204" pitchFamily="34" charset="0"/>
-              </a:rPr>
-              <a:t>he final decision lies in the hand of the driver</a:t>
-            </a:r>
-          </a:p>
-          <a:p>
-            <a:r>
-              <a:rPr lang="en-GB" dirty="0">
-                <a:latin typeface="Trebuchet MS" panose="020B0703020202090204" pitchFamily="34" charset="0"/>
-              </a:rPr>
-              <a:t>no sensitive data is shared before the both parties agreed</a:t>
-            </a:r>
-          </a:p>
-          <a:p>
-            <a:r>
-              <a:rPr lang="en-GB" dirty="0">
-                <a:latin typeface="Trebuchet MS" panose="020B0703020202090204" pitchFamily="34" charset="0"/>
-              </a:rPr>
-              <a:t>we provide the option to search for drivers with individual requirements</a:t>
-            </a:r>
-            <a:endParaRPr lang="en-CH" dirty="0">
-              <a:latin typeface="Trebuchet MS" panose="020B0703020202090204" pitchFamily="34" charset="0"/>
-            </a:endParaRPr>
-          </a:p>
-        </p:txBody>
-      </p:sp>
+        </p:nvPicPr>
+        <p:blipFill>
+          <a:blip r:embed="rId3"/>
+          <a:srcRect/>
+          <a:stretch/>
+        </p:blipFill>
+        <p:spPr>
+          <a:xfrm>
+            <a:off x="1890582" y="1575315"/>
+            <a:ext cx="8441628" cy="4870170"/>
+          </a:xfrm>
+        </p:spPr>
+      </p:pic>
     </p:spTree>
     <p:extLst>
       <p:ext uri="{BB962C8B-B14F-4D97-AF65-F5344CB8AC3E}">
-        <p14:creationId xmlns:p14="http://schemas.microsoft.com/office/powerpoint/2010/main" val="1787380573"/>
+        <p14:creationId xmlns:p14="http://schemas.microsoft.com/office/powerpoint/2010/main" val="1183501346"/>
       </p:ext>
     </p:extLst>
   </p:cSld>
@@ -5237,26 +5775,20 @@
           <a:lstStyle/>
           <a:p>
             <a:r>
-              <a:rPr lang="en-GB" b="1" dirty="0">
-                <a:latin typeface="Trebuchet MS" panose="020B0703020202090204" pitchFamily="34" charset="0"/>
-              </a:rPr>
-              <a:t>S</a:t>
-            </a:r>
-            <a:r>
               <a:rPr lang="en-CH" b="1" dirty="0">
                 <a:latin typeface="Trebuchet MS" panose="020B0703020202090204" pitchFamily="34" charset="0"/>
               </a:rPr>
-              <a:t>hort Demo</a:t>
-            </a:r>
-          </a:p>
-        </p:txBody>
-      </p:sp>
-      <p:sp>
-        <p:nvSpPr>
-          <p:cNvPr id="3" name="Content Placeholder 2">
-            <a:extLst>
-              <a:ext uri="{FF2B5EF4-FFF2-40B4-BE49-F238E27FC236}">
-                <a16:creationId xmlns:a16="http://schemas.microsoft.com/office/drawing/2014/main" id="{4C6BE1A8-DF59-264C-802F-A0231680D18B}"/>
+              <a:t>Tech Stack</a:t>
+            </a:r>
+          </a:p>
+        </p:txBody>
+      </p:sp>
+      <p:sp>
+        <p:nvSpPr>
+          <p:cNvPr id="4" name="Content Placeholder 3">
+            <a:extLst>
+              <a:ext uri="{FF2B5EF4-FFF2-40B4-BE49-F238E27FC236}">
+                <a16:creationId xmlns:a16="http://schemas.microsoft.com/office/drawing/2014/main" id="{C9253F40-5BC5-4A45-934E-EB79DC6FFA50}"/>
               </a:ext>
             </a:extLst>
           </p:cNvPr>
@@ -5273,47 +5805,40 @@
           <a:lstStyle/>
           <a:p>
             <a:r>
-              <a:rPr lang="en-GB" dirty="0">
-                <a:latin typeface="Trebuchet MS" panose="020B0703020202090204" pitchFamily="34" charset="0"/>
-              </a:rPr>
-              <a:t>both perspectives</a:t>
-            </a:r>
-          </a:p>
-          <a:p>
-            <a:pPr lvl="1"/>
-            <a:r>
-              <a:rPr lang="en-GB" dirty="0">
-                <a:latin typeface="Trebuchet MS" panose="020B0703020202090204" pitchFamily="34" charset="0"/>
-              </a:rPr>
-              <a:t>driver</a:t>
-            </a:r>
-          </a:p>
-          <a:p>
-            <a:pPr lvl="1"/>
-            <a:r>
-              <a:rPr lang="en-GB" dirty="0">
-                <a:latin typeface="Trebuchet MS" panose="020B0703020202090204" pitchFamily="34" charset="0"/>
-              </a:rPr>
-              <a:t>passenger</a:t>
-            </a:r>
-          </a:p>
-          <a:p>
-            <a:endParaRPr lang="en-GB" dirty="0">
-              <a:latin typeface="Trebuchet MS" panose="020B0703020202090204" pitchFamily="34" charset="0"/>
-            </a:endParaRPr>
-          </a:p>
-          <a:p>
-            <a:pPr lvl="1"/>
-            <a:endParaRPr lang="en-CH" dirty="0">
-              <a:latin typeface="Trebuchet MS" panose="020B0703020202090204" pitchFamily="34" charset="0"/>
-            </a:endParaRPr>
+              <a:rPr lang="en-CH" dirty="0"/>
+              <a:t>Vuetify</a:t>
+            </a:r>
+          </a:p>
+          <a:p>
+            <a:r>
+              <a:rPr lang="en-CH" dirty="0"/>
+              <a:t>NuxtJS</a:t>
+            </a:r>
+          </a:p>
+          <a:p>
+            <a:r>
+              <a:rPr lang="en-CH" dirty="0"/>
+              <a:t>Python</a:t>
+            </a:r>
+          </a:p>
+          <a:p>
+            <a:r>
+              <a:rPr lang="en-CH" dirty="0"/>
+              <a:t>JavaScript</a:t>
+            </a:r>
+          </a:p>
+          <a:p>
+            <a:r>
+              <a:rPr lang="en-CH" dirty="0"/>
+              <a:t>HTML5</a:t>
+            </a:r>
           </a:p>
         </p:txBody>
       </p:sp>
     </p:spTree>
     <p:extLst>
       <p:ext uri="{BB962C8B-B14F-4D97-AF65-F5344CB8AC3E}">
-        <p14:creationId xmlns:p14="http://schemas.microsoft.com/office/powerpoint/2010/main" val="765622729"/>
+        <p14:creationId xmlns:p14="http://schemas.microsoft.com/office/powerpoint/2010/main" val="2587451752"/>
       </p:ext>
     </p:extLst>
   </p:cSld>
@@ -5364,77 +5889,89 @@
             <p:ph type="title"/>
           </p:nvPr>
         </p:nvSpPr>
-        <p:spPr>
-          <a:xfrm>
-            <a:off x="838200" y="1558307"/>
-            <a:ext cx="10515600" cy="1325563"/>
-          </a:xfrm>
-        </p:spPr>
-        <p:txBody>
-          <a:bodyPr/>
-          <a:lstStyle/>
-          <a:p>
-            <a:pPr algn="ctr"/>
+        <p:spPr/>
+        <p:txBody>
+          <a:bodyPr/>
+          <a:lstStyle/>
+          <a:p>
+            <a:r>
+              <a:rPr lang="en-GB" b="1" dirty="0">
+                <a:latin typeface="Trebuchet MS" panose="020B0703020202090204" pitchFamily="34" charset="0"/>
+              </a:rPr>
+              <a:t>S</a:t>
+            </a:r>
             <a:r>
               <a:rPr lang="en-CH" b="1" dirty="0">
                 <a:latin typeface="Trebuchet MS" panose="020B0703020202090204" pitchFamily="34" charset="0"/>
               </a:rPr>
-              <a:t>Thank you all for these great 24h!!</a:t>
-            </a:r>
-          </a:p>
-        </p:txBody>
-      </p:sp>
-      <p:pic>
-        <p:nvPicPr>
-          <p:cNvPr id="1026" name="Picture 2">
-            <a:extLst>
-              <a:ext uri="{FF2B5EF4-FFF2-40B4-BE49-F238E27FC236}">
-                <a16:creationId xmlns:a16="http://schemas.microsoft.com/office/drawing/2014/main" id="{4FFBB905-2827-0445-AECA-D03989983137}"/>
-              </a:ext>
-            </a:extLst>
-          </p:cNvPr>
-          <p:cNvPicPr>
-            <a:picLocks noChangeAspect="1" noChangeArrowheads="1"/>
-          </p:cNvPicPr>
-          <p:nvPr/>
-        </p:nvPicPr>
-        <p:blipFill>
-          <a:blip r:embed="rId2">
-            <a:extLst>
-              <a:ext uri="{28A0092B-C50C-407E-A947-70E740481C1C}">
-                <a14:useLocalDpi xmlns:a14="http://schemas.microsoft.com/office/drawing/2010/main" val="0"/>
-              </a:ext>
-            </a:extLst>
-          </a:blip>
-          <a:srcRect/>
-          <a:stretch>
-            <a:fillRect/>
-          </a:stretch>
-        </p:blipFill>
-        <p:spPr bwMode="auto">
-          <a:xfrm>
-            <a:off x="2115255" y="2587299"/>
-            <a:ext cx="7961489" cy="3503055"/>
-          </a:xfrm>
-          <a:prstGeom prst="rect">
-            <a:avLst/>
-          </a:prstGeom>
-          <a:noFill/>
-          <a:extLst>
-            <a:ext uri="{909E8E84-426E-40DD-AFC4-6F175D3DCCD1}">
-              <a14:hiddenFill xmlns:a14="http://schemas.microsoft.com/office/drawing/2010/main">
-                <a:solidFill>
-                  <a:srgbClr val="FFFFFF"/>
-                </a:solidFill>
-              </a14:hiddenFill>
-            </a:ext>
-          </a:extLst>
-        </p:spPr>
-      </p:pic>
+              <a:t>hort Demo</a:t>
+            </a:r>
+          </a:p>
+        </p:txBody>
+      </p:sp>
+      <p:sp>
+        <p:nvSpPr>
+          <p:cNvPr id="3" name="Content Placeholder 2">
+            <a:extLst>
+              <a:ext uri="{FF2B5EF4-FFF2-40B4-BE49-F238E27FC236}">
+                <a16:creationId xmlns:a16="http://schemas.microsoft.com/office/drawing/2014/main" id="{4C6BE1A8-DF59-264C-802F-A0231680D18B}"/>
+              </a:ext>
+            </a:extLst>
+          </p:cNvPr>
+          <p:cNvSpPr>
+            <a:spLocks noGrp="1"/>
+          </p:cNvSpPr>
+          <p:nvPr>
+            <p:ph idx="1"/>
+          </p:nvPr>
+        </p:nvSpPr>
+        <p:spPr/>
+        <p:txBody>
+          <a:bodyPr/>
+          <a:lstStyle/>
+          <a:p>
+            <a:r>
+              <a:rPr lang="en-GB" dirty="0">
+                <a:latin typeface="Trebuchet MS" panose="020B0703020202090204" pitchFamily="34" charset="0"/>
+              </a:rPr>
+              <a:t>both perspectives</a:t>
+            </a:r>
+          </a:p>
+          <a:p>
+            <a:pPr lvl="1"/>
+            <a:r>
+              <a:rPr lang="en-GB" dirty="0">
+                <a:latin typeface="Trebuchet MS" panose="020B0703020202090204" pitchFamily="34" charset="0"/>
+              </a:rPr>
+              <a:t>driver</a:t>
+            </a:r>
+          </a:p>
+          <a:p>
+            <a:pPr lvl="1"/>
+            <a:r>
+              <a:rPr lang="en-GB" dirty="0">
+                <a:latin typeface="Trebuchet MS" panose="020B0703020202090204" pitchFamily="34" charset="0"/>
+              </a:rPr>
+              <a:t>passenger</a:t>
+            </a:r>
+          </a:p>
+          <a:p>
+            <a:endParaRPr lang="en-GB" dirty="0">
+              <a:latin typeface="Trebuchet MS" panose="020B0703020202090204" pitchFamily="34" charset="0"/>
+            </a:endParaRPr>
+          </a:p>
+          <a:p>
+            <a:pPr lvl="1"/>
+            <a:endParaRPr lang="en-CH" dirty="0">
+              <a:latin typeface="Trebuchet MS" panose="020B0703020202090204" pitchFamily="34" charset="0"/>
+            </a:endParaRPr>
+          </a:p>
+        </p:txBody>
+      </p:sp>
     </p:spTree>
     <p:extLst>
       <p:ext uri="{BB962C8B-B14F-4D97-AF65-F5344CB8AC3E}">
-        <p14:creationId xmlns:p14="http://schemas.microsoft.com/office/powerpoint/2010/main" val="2175441236"/>
+        <p14:creationId xmlns:p14="http://schemas.microsoft.com/office/powerpoint/2010/main" val="765622729"/>
       </p:ext>
     </p:extLst>
   </p:cSld>
@@ -5485,54 +6022,77 @@
             <p:ph type="title"/>
           </p:nvPr>
         </p:nvSpPr>
-        <p:spPr/>
-        <p:txBody>
-          <a:bodyPr/>
-          <a:lstStyle/>
-          <a:p>
+        <p:spPr>
+          <a:xfrm>
+            <a:off x="838200" y="1558307"/>
+            <a:ext cx="10515600" cy="1325563"/>
+          </a:xfrm>
+        </p:spPr>
+        <p:txBody>
+          <a:bodyPr/>
+          <a:lstStyle/>
+          <a:p>
+            <a:pPr algn="ctr"/>
             <a:r>
               <a:rPr lang="en-CH" b="1" dirty="0">
                 <a:latin typeface="Trebuchet MS" panose="020B0703020202090204" pitchFamily="34" charset="0"/>
               </a:rPr>
-              <a:t>Template</a:t>
-            </a:r>
-          </a:p>
-        </p:txBody>
-      </p:sp>
-      <p:sp>
-        <p:nvSpPr>
-          <p:cNvPr id="3" name="Content Placeholder 2">
-            <a:extLst>
-              <a:ext uri="{FF2B5EF4-FFF2-40B4-BE49-F238E27FC236}">
-                <a16:creationId xmlns:a16="http://schemas.microsoft.com/office/drawing/2014/main" id="{4C6BE1A8-DF59-264C-802F-A0231680D18B}"/>
-              </a:ext>
-            </a:extLst>
-          </p:cNvPr>
-          <p:cNvSpPr>
-            <a:spLocks noGrp="1"/>
-          </p:cNvSpPr>
-          <p:nvPr>
-            <p:ph idx="1"/>
-          </p:nvPr>
-        </p:nvSpPr>
-        <p:spPr/>
-        <p:txBody>
-          <a:bodyPr/>
-          <a:lstStyle/>
-          <a:p>
-            <a:r>
-              <a:rPr lang="en-CH" dirty="0">
-                <a:latin typeface="Trebuchet MS" panose="020B0703020202090204" pitchFamily="34" charset="0"/>
-              </a:rPr>
-              <a:t>template</a:t>
-            </a:r>
-          </a:p>
-        </p:txBody>
-      </p:sp>
+              <a:t>Thank you all for these great 24h!!</a:t>
+            </a:r>
+          </a:p>
+        </p:txBody>
+      </p:sp>
+      <p:pic>
+        <p:nvPicPr>
+          <p:cNvPr id="1026" name="Picture 2">
+            <a:extLst>
+              <a:ext uri="{FF2B5EF4-FFF2-40B4-BE49-F238E27FC236}">
+                <a16:creationId xmlns:a16="http://schemas.microsoft.com/office/drawing/2014/main" id="{4FFBB905-2827-0445-AECA-D03989983137}"/>
+              </a:ext>
+            </a:extLst>
+          </p:cNvPr>
+          <p:cNvPicPr>
+            <a:picLocks noChangeAspect="1" noChangeArrowheads="1"/>
+          </p:cNvPicPr>
+          <p:nvPr/>
+        </p:nvPicPr>
+        <p:blipFill>
+          <a:blip r:embed="rId2">
+            <a:extLst>
+              <a:ext uri="{28A0092B-C50C-407E-A947-70E740481C1C}">
+                <a14:useLocalDpi xmlns:a14="http://schemas.microsoft.com/office/drawing/2010/main" val="0"/>
+              </a:ext>
+            </a:extLst>
+          </a:blip>
+          <a:srcRect/>
+          <a:stretch>
+            <a:fillRect/>
+          </a:stretch>
+        </p:blipFill>
+        <p:spPr bwMode="auto">
+          <a:xfrm>
+            <a:off x="2115255" y="2587299"/>
+            <a:ext cx="7961489" cy="3503055"/>
+          </a:xfrm>
+          <a:prstGeom prst="rect">
+            <a:avLst/>
+          </a:prstGeom>
+          <a:noFill/>
+          <a:extLst>
+            <a:ext uri="{909E8E84-426E-40DD-AFC4-6F175D3DCCD1}">
+              <a14:hiddenFill xmlns:a14="http://schemas.microsoft.com/office/drawing/2010/main">
+                <a:solidFill>
+                  <a:srgbClr val="FFFFFF"/>
+                </a:solidFill>
+              </a14:hiddenFill>
+            </a:ext>
+          </a:extLst>
+        </p:spPr>
+      </p:pic>
     </p:spTree>
     <p:extLst>
       <p:ext uri="{BB962C8B-B14F-4D97-AF65-F5344CB8AC3E}">
-        <p14:creationId xmlns:p14="http://schemas.microsoft.com/office/powerpoint/2010/main" val="2054443711"/>
+        <p14:creationId xmlns:p14="http://schemas.microsoft.com/office/powerpoint/2010/main" val="2175441236"/>
       </p:ext>
     </p:extLst>
   </p:cSld>

</xml_diff>

<commit_message>
added lagirafe to final slide
</commit_message>
<xml_diff>
--- a/static/dachfenster-pitch.pptx
+++ b/static/dachfenster-pitch.pptx
@@ -5,7 +5,7 @@
     <p:sldMasterId id="2147483648" r:id="rId1"/>
   </p:sldMasterIdLst>
   <p:notesMasterIdLst>
-    <p:notesMasterId r:id="rId12"/>
+    <p:notesMasterId r:id="rId10"/>
   </p:notesMasterIdLst>
   <p:sldIdLst>
     <p:sldId id="256" r:id="rId2"/>
@@ -15,9 +15,7 @@
     <p:sldId id="257" r:id="rId6"/>
     <p:sldId id="258" r:id="rId7"/>
     <p:sldId id="265" r:id="rId8"/>
-    <p:sldId id="261" r:id="rId9"/>
-    <p:sldId id="262" r:id="rId10"/>
-    <p:sldId id="263" r:id="rId11"/>
+    <p:sldId id="262" r:id="rId9"/>
   </p:sldIdLst>
   <p:sldSz cx="12192000" cy="6858000"/>
   <p:notesSz cx="6858000" cy="9144000"/>
@@ -1228,7 +1226,7 @@
               <a:t>partner</a:t>
             </a:r>
             <a:r>
-              <a:rPr lang="de-CH"/>
+              <a:rPr lang="de-CH" dirty="0"/>
               <a:t>.</a:t>
             </a:r>
             <a:endParaRPr lang="en-CH" dirty="0"/>
@@ -1470,6 +1468,90 @@
     <p:extLst>
       <p:ext uri="{BB962C8B-B14F-4D97-AF65-F5344CB8AC3E}">
         <p14:creationId xmlns:p14="http://schemas.microsoft.com/office/powerpoint/2010/main" val="657786521"/>
+      </p:ext>
+    </p:extLst>
+  </p:cSld>
+  <p:clrMapOvr>
+    <a:masterClrMapping/>
+  </p:clrMapOvr>
+</p:notes>
+</file>
+
+<file path=ppt/notesSlides/notesSlide8.xml><?xml version="1.0" encoding="utf-8"?>
+<p:notes xmlns:a="http://schemas.openxmlformats.org/drawingml/2006/main" xmlns:r="http://schemas.openxmlformats.org/officeDocument/2006/relationships" xmlns:p="http://schemas.openxmlformats.org/presentationml/2006/main">
+  <p:cSld>
+    <p:spTree>
+      <p:nvGrpSpPr>
+        <p:cNvPr id="1" name=""/>
+        <p:cNvGrpSpPr/>
+        <p:nvPr/>
+      </p:nvGrpSpPr>
+      <p:grpSpPr>
+        <a:xfrm>
+          <a:off x="0" y="0"/>
+          <a:ext cx="0" cy="0"/>
+          <a:chOff x="0" y="0"/>
+          <a:chExt cx="0" cy="0"/>
+        </a:xfrm>
+      </p:grpSpPr>
+      <p:sp>
+        <p:nvSpPr>
+          <p:cNvPr id="2" name="Slide Image Placeholder 1"/>
+          <p:cNvSpPr>
+            <a:spLocks noGrp="1" noRot="1" noChangeAspect="1"/>
+          </p:cNvSpPr>
+          <p:nvPr>
+            <p:ph type="sldImg"/>
+          </p:nvPr>
+        </p:nvSpPr>
+        <p:spPr/>
+      </p:sp>
+      <p:sp>
+        <p:nvSpPr>
+          <p:cNvPr id="3" name="Notes Placeholder 2"/>
+          <p:cNvSpPr>
+            <a:spLocks noGrp="1"/>
+          </p:cNvSpPr>
+          <p:nvPr>
+            <p:ph type="body" idx="1"/>
+          </p:nvPr>
+        </p:nvSpPr>
+        <p:spPr/>
+        <p:txBody>
+          <a:bodyPr/>
+          <a:lstStyle/>
+          <a:p>
+            <a:endParaRPr lang="en-CH" dirty="0"/>
+          </a:p>
+        </p:txBody>
+      </p:sp>
+      <p:sp>
+        <p:nvSpPr>
+          <p:cNvPr id="4" name="Slide Number Placeholder 3"/>
+          <p:cNvSpPr>
+            <a:spLocks noGrp="1"/>
+          </p:cNvSpPr>
+          <p:nvPr>
+            <p:ph type="sldNum" sz="quarter" idx="5"/>
+          </p:nvPr>
+        </p:nvSpPr>
+        <p:spPr/>
+        <p:txBody>
+          <a:bodyPr/>
+          <a:lstStyle/>
+          <a:p>
+            <a:fld id="{4F9EB7BC-E3FE-644B-A8BB-DE59933EA7C3}" type="slidenum">
+              <a:rPr lang="en-CH" smtClean="0"/>
+              <a:t>8</a:t>
+            </a:fld>
+            <a:endParaRPr lang="en-CH"/>
+          </a:p>
+        </p:txBody>
+      </p:sp>
+    </p:spTree>
+    <p:extLst>
+      <p:ext uri="{BB962C8B-B14F-4D97-AF65-F5344CB8AC3E}">
+        <p14:creationId xmlns:p14="http://schemas.microsoft.com/office/powerpoint/2010/main" val="529171615"/>
       </p:ext>
     </p:extLst>
   </p:cSld>
@@ -4770,104 +4852,6 @@
 </p:sld>
 </file>
 
-<file path=ppt/slides/slide10.xml><?xml version="1.0" encoding="utf-8"?>
-<p:sld xmlns:a="http://schemas.openxmlformats.org/drawingml/2006/main" xmlns:r="http://schemas.openxmlformats.org/officeDocument/2006/relationships" xmlns:p="http://schemas.openxmlformats.org/presentationml/2006/main">
-  <p:cSld>
-    <p:bg>
-      <p:bgPr>
-        <a:solidFill>
-          <a:srgbClr val="9DC3E6"/>
-        </a:solidFill>
-        <a:effectLst/>
-      </p:bgPr>
-    </p:bg>
-    <p:spTree>
-      <p:nvGrpSpPr>
-        <p:cNvPr id="1" name=""/>
-        <p:cNvGrpSpPr/>
-        <p:nvPr/>
-      </p:nvGrpSpPr>
-      <p:grpSpPr>
-        <a:xfrm>
-          <a:off x="0" y="0"/>
-          <a:ext cx="0" cy="0"/>
-          <a:chOff x="0" y="0"/>
-          <a:chExt cx="0" cy="0"/>
-        </a:xfrm>
-      </p:grpSpPr>
-      <p:sp>
-        <p:nvSpPr>
-          <p:cNvPr id="2" name="Title 1">
-            <a:extLst>
-              <a:ext uri="{FF2B5EF4-FFF2-40B4-BE49-F238E27FC236}">
-                <a16:creationId xmlns:a16="http://schemas.microsoft.com/office/drawing/2014/main" id="{A5186B16-9D62-5146-B2AA-4EEE35AFAD22}"/>
-              </a:ext>
-            </a:extLst>
-          </p:cNvPr>
-          <p:cNvSpPr>
-            <a:spLocks noGrp="1"/>
-          </p:cNvSpPr>
-          <p:nvPr>
-            <p:ph type="title"/>
-          </p:nvPr>
-        </p:nvSpPr>
-        <p:spPr/>
-        <p:txBody>
-          <a:bodyPr/>
-          <a:lstStyle/>
-          <a:p>
-            <a:r>
-              <a:rPr lang="en-CH" b="1" dirty="0">
-                <a:latin typeface="Trebuchet MS" panose="020B0703020202090204" pitchFamily="34" charset="0"/>
-              </a:rPr>
-              <a:t>Template</a:t>
-            </a:r>
-          </a:p>
-        </p:txBody>
-      </p:sp>
-      <p:sp>
-        <p:nvSpPr>
-          <p:cNvPr id="3" name="Content Placeholder 2">
-            <a:extLst>
-              <a:ext uri="{FF2B5EF4-FFF2-40B4-BE49-F238E27FC236}">
-                <a16:creationId xmlns:a16="http://schemas.microsoft.com/office/drawing/2014/main" id="{4C6BE1A8-DF59-264C-802F-A0231680D18B}"/>
-              </a:ext>
-            </a:extLst>
-          </p:cNvPr>
-          <p:cNvSpPr>
-            <a:spLocks noGrp="1"/>
-          </p:cNvSpPr>
-          <p:nvPr>
-            <p:ph idx="1"/>
-          </p:nvPr>
-        </p:nvSpPr>
-        <p:spPr/>
-        <p:txBody>
-          <a:bodyPr/>
-          <a:lstStyle/>
-          <a:p>
-            <a:r>
-              <a:rPr lang="en-CH" dirty="0">
-                <a:latin typeface="Trebuchet MS" panose="020B0703020202090204" pitchFamily="34" charset="0"/>
-              </a:rPr>
-              <a:t>template</a:t>
-            </a:r>
-          </a:p>
-        </p:txBody>
-      </p:sp>
-    </p:spTree>
-    <p:extLst>
-      <p:ext uri="{BB962C8B-B14F-4D97-AF65-F5344CB8AC3E}">
-        <p14:creationId xmlns:p14="http://schemas.microsoft.com/office/powerpoint/2010/main" val="2054443711"/>
-      </p:ext>
-    </p:extLst>
-  </p:cSld>
-  <p:clrMapOvr>
-    <a:masterClrMapping/>
-  </p:clrMapOvr>
-</p:sld>
-</file>
-
 <file path=ppt/slides/slide2.xml><?xml version="1.0" encoding="utf-8"?>
 <p:sld xmlns:a="http://schemas.openxmlformats.org/drawingml/2006/main" xmlns:r="http://schemas.openxmlformats.org/officeDocument/2006/relationships" xmlns:p="http://schemas.openxmlformats.org/presentationml/2006/main">
   <p:cSld>
@@ -5889,139 +5873,6 @@
             <p:ph type="title"/>
           </p:nvPr>
         </p:nvSpPr>
-        <p:spPr/>
-        <p:txBody>
-          <a:bodyPr/>
-          <a:lstStyle/>
-          <a:p>
-            <a:r>
-              <a:rPr lang="en-GB" b="1" dirty="0">
-                <a:latin typeface="Trebuchet MS" panose="020B0703020202090204" pitchFamily="34" charset="0"/>
-              </a:rPr>
-              <a:t>S</a:t>
-            </a:r>
-            <a:r>
-              <a:rPr lang="en-CH" b="1" dirty="0">
-                <a:latin typeface="Trebuchet MS" panose="020B0703020202090204" pitchFamily="34" charset="0"/>
-              </a:rPr>
-              <a:t>hort Demo</a:t>
-            </a:r>
-          </a:p>
-        </p:txBody>
-      </p:sp>
-      <p:sp>
-        <p:nvSpPr>
-          <p:cNvPr id="3" name="Content Placeholder 2">
-            <a:extLst>
-              <a:ext uri="{FF2B5EF4-FFF2-40B4-BE49-F238E27FC236}">
-                <a16:creationId xmlns:a16="http://schemas.microsoft.com/office/drawing/2014/main" id="{4C6BE1A8-DF59-264C-802F-A0231680D18B}"/>
-              </a:ext>
-            </a:extLst>
-          </p:cNvPr>
-          <p:cNvSpPr>
-            <a:spLocks noGrp="1"/>
-          </p:cNvSpPr>
-          <p:nvPr>
-            <p:ph idx="1"/>
-          </p:nvPr>
-        </p:nvSpPr>
-        <p:spPr/>
-        <p:txBody>
-          <a:bodyPr/>
-          <a:lstStyle/>
-          <a:p>
-            <a:r>
-              <a:rPr lang="en-GB" dirty="0">
-                <a:latin typeface="Trebuchet MS" panose="020B0703020202090204" pitchFamily="34" charset="0"/>
-              </a:rPr>
-              <a:t>both perspectives</a:t>
-            </a:r>
-          </a:p>
-          <a:p>
-            <a:pPr lvl="1"/>
-            <a:r>
-              <a:rPr lang="en-GB" dirty="0">
-                <a:latin typeface="Trebuchet MS" panose="020B0703020202090204" pitchFamily="34" charset="0"/>
-              </a:rPr>
-              <a:t>driver</a:t>
-            </a:r>
-          </a:p>
-          <a:p>
-            <a:pPr lvl="1"/>
-            <a:r>
-              <a:rPr lang="en-GB" dirty="0">
-                <a:latin typeface="Trebuchet MS" panose="020B0703020202090204" pitchFamily="34" charset="0"/>
-              </a:rPr>
-              <a:t>passenger</a:t>
-            </a:r>
-          </a:p>
-          <a:p>
-            <a:endParaRPr lang="en-GB" dirty="0">
-              <a:latin typeface="Trebuchet MS" panose="020B0703020202090204" pitchFamily="34" charset="0"/>
-            </a:endParaRPr>
-          </a:p>
-          <a:p>
-            <a:pPr lvl="1"/>
-            <a:endParaRPr lang="en-CH" dirty="0">
-              <a:latin typeface="Trebuchet MS" panose="020B0703020202090204" pitchFamily="34" charset="0"/>
-            </a:endParaRPr>
-          </a:p>
-        </p:txBody>
-      </p:sp>
-    </p:spTree>
-    <p:extLst>
-      <p:ext uri="{BB962C8B-B14F-4D97-AF65-F5344CB8AC3E}">
-        <p14:creationId xmlns:p14="http://schemas.microsoft.com/office/powerpoint/2010/main" val="765622729"/>
-      </p:ext>
-    </p:extLst>
-  </p:cSld>
-  <p:clrMapOvr>
-    <a:masterClrMapping/>
-  </p:clrMapOvr>
-</p:sld>
-</file>
-
-<file path=ppt/slides/slide9.xml><?xml version="1.0" encoding="utf-8"?>
-<p:sld xmlns:a="http://schemas.openxmlformats.org/drawingml/2006/main" xmlns:r="http://schemas.openxmlformats.org/officeDocument/2006/relationships" xmlns:p="http://schemas.openxmlformats.org/presentationml/2006/main">
-  <p:cSld>
-    <p:bg>
-      <p:bgPr>
-        <a:solidFill>
-          <a:srgbClr val="9DC3E6"/>
-        </a:solidFill>
-        <a:effectLst/>
-      </p:bgPr>
-    </p:bg>
-    <p:spTree>
-      <p:nvGrpSpPr>
-        <p:cNvPr id="1" name=""/>
-        <p:cNvGrpSpPr/>
-        <p:nvPr/>
-      </p:nvGrpSpPr>
-      <p:grpSpPr>
-        <a:xfrm>
-          <a:off x="0" y="0"/>
-          <a:ext cx="0" cy="0"/>
-          <a:chOff x="0" y="0"/>
-          <a:chExt cx="0" cy="0"/>
-        </a:xfrm>
-      </p:grpSpPr>
-      <p:sp>
-        <p:nvSpPr>
-          <p:cNvPr id="2" name="Title 1">
-            <a:extLst>
-              <a:ext uri="{FF2B5EF4-FFF2-40B4-BE49-F238E27FC236}">
-                <a16:creationId xmlns:a16="http://schemas.microsoft.com/office/drawing/2014/main" id="{A5186B16-9D62-5146-B2AA-4EEE35AFAD22}"/>
-              </a:ext>
-            </a:extLst>
-          </p:cNvPr>
-          <p:cNvSpPr>
-            <a:spLocks noGrp="1"/>
-          </p:cNvSpPr>
-          <p:nvPr>
-            <p:ph type="title"/>
-          </p:nvPr>
-        </p:nvSpPr>
         <p:spPr>
           <a:xfrm>
             <a:off x="838200" y="1558307"/>
@@ -6057,7 +5908,7 @@
           <p:nvPr/>
         </p:nvPicPr>
         <p:blipFill>
-          <a:blip r:embed="rId2">
+          <a:blip r:embed="rId3">
             <a:extLst>
               <a:ext uri="{28A0092B-C50C-407E-A947-70E740481C1C}">
                 <a14:useLocalDpi xmlns:a14="http://schemas.microsoft.com/office/drawing/2010/main" val="0"/>
@@ -6071,7 +5922,7 @@
         </p:blipFill>
         <p:spPr bwMode="auto">
           <a:xfrm>
-            <a:off x="2115255" y="2587299"/>
+            <a:off x="4212287" y="2883870"/>
             <a:ext cx="7961489" cy="3503055"/>
           </a:xfrm>
           <a:prstGeom prst="rect">
@@ -6087,6 +5938,36 @@
               </a14:hiddenFill>
             </a:ext>
           </a:extLst>
+        </p:spPr>
+      </p:pic>
+      <p:pic>
+        <p:nvPicPr>
+          <p:cNvPr id="4" name="Picture 3" descr="A picture containing logo&#10;&#10;Description automatically generated">
+            <a:extLst>
+              <a:ext uri="{FF2B5EF4-FFF2-40B4-BE49-F238E27FC236}">
+                <a16:creationId xmlns:a16="http://schemas.microsoft.com/office/drawing/2014/main" id="{DABCDBB2-A41A-F04D-A080-AA90FFE00040}"/>
+              </a:ext>
+            </a:extLst>
+          </p:cNvPr>
+          <p:cNvPicPr>
+            <a:picLocks noChangeAspect="1"/>
+          </p:cNvPicPr>
+          <p:nvPr/>
+        </p:nvPicPr>
+        <p:blipFill>
+          <a:blip r:embed="rId4"/>
+          <a:stretch>
+            <a:fillRect/>
+          </a:stretch>
+        </p:blipFill>
+        <p:spPr>
+          <a:xfrm>
+            <a:off x="971279" y="2883870"/>
+            <a:ext cx="3107929" cy="2832302"/>
+          </a:xfrm>
+          <a:prstGeom prst="rect">
+            <a:avLst/>
+          </a:prstGeom>
         </p:spPr>
       </p:pic>
     </p:spTree>

</xml_diff>

<commit_message>
nochmal eine folie weniger
</commit_message>
<xml_diff>
--- a/static/dachfenster-pitch.pptx
+++ b/static/dachfenster-pitch.pptx
@@ -5,7 +5,7 @@
     <p:sldMasterId id="2147483648" r:id="rId1"/>
   </p:sldMasterIdLst>
   <p:notesMasterIdLst>
-    <p:notesMasterId r:id="rId10"/>
+    <p:notesMasterId r:id="rId9"/>
   </p:notesMasterIdLst>
   <p:sldIdLst>
     <p:sldId id="256" r:id="rId2"/>
@@ -13,9 +13,8 @@
     <p:sldId id="259" r:id="rId4"/>
     <p:sldId id="260" r:id="rId5"/>
     <p:sldId id="257" r:id="rId6"/>
-    <p:sldId id="258" r:id="rId7"/>
-    <p:sldId id="265" r:id="rId8"/>
-    <p:sldId id="262" r:id="rId9"/>
+    <p:sldId id="265" r:id="rId7"/>
+    <p:sldId id="262" r:id="rId8"/>
   </p:sldIdLst>
   <p:sldSz cx="12192000" cy="6858000"/>
   <p:notesSz cx="6858000" cy="9144000"/>
@@ -527,7 +526,7 @@
           <a:p>
             <a:r>
               <a:rPr lang="en-CH" dirty="0"/>
-              <a:t>The Team “La Girafe” welcomes you at the our pitch.</a:t>
+              <a:t>The Team “La Girafe” and especially I welcomes you at the our pitch.</a:t>
             </a:r>
           </a:p>
         </p:txBody>
@@ -1322,38 +1321,7 @@
           <a:bodyPr/>
           <a:lstStyle/>
           <a:p>
-            <a:r>
-              <a:rPr lang="en-CH" dirty="0"/>
-              <a:t>Our Project is completely based on Microsoft Services.</a:t>
-            </a:r>
-          </a:p>
-          <a:p>
             <a:endParaRPr lang="en-CH" dirty="0"/>
-          </a:p>
-          <a:p>
-            <a:r>
-              <a:rPr lang="en-CH" dirty="0"/>
-              <a:t>We decided for this no-nonsense architecture because it is easy to setup but scalable at the same time.</a:t>
-            </a:r>
-          </a:p>
-          <a:p>
-            <a:endParaRPr lang="en-CH" dirty="0"/>
-          </a:p>
-          <a:p>
-            <a:r>
-              <a:rPr lang="en-GB" dirty="0"/>
-              <a:t>T</a:t>
-            </a:r>
-            <a:r>
-              <a:rPr lang="en-CH" dirty="0"/>
-              <a:t>he process of finding the optimal matches is very time consuming and would completely destroy the user experience. This is why we decided to precalculate potential matches as soon as the user enters his adress, and store them them in Azure Table Storage. </a:t>
-            </a:r>
-          </a:p>
-          <a:p>
-            <a:r>
-              <a:rPr lang="en-CH" dirty="0"/>
-              <a:t>As soon as the user actually starts looking for someone share a ride with, the results of our algorithm are already stored and can be provided instantly.</a:t>
-            </a:r>
           </a:p>
         </p:txBody>
       </p:sp>
@@ -1383,7 +1351,7 @@
     </p:spTree>
     <p:extLst>
       <p:ext uri="{BB962C8B-B14F-4D97-AF65-F5344CB8AC3E}">
-        <p14:creationId xmlns:p14="http://schemas.microsoft.com/office/powerpoint/2010/main" val="2020451648"/>
+        <p14:creationId xmlns:p14="http://schemas.microsoft.com/office/powerpoint/2010/main" val="657786521"/>
       </p:ext>
     </p:extLst>
   </p:cSld>
@@ -1459,90 +1427,6 @@
             <a:fld id="{4F9EB7BC-E3FE-644B-A8BB-DE59933EA7C3}" type="slidenum">
               <a:rPr lang="en-CH" smtClean="0"/>
               <a:t>7</a:t>
-            </a:fld>
-            <a:endParaRPr lang="en-CH"/>
-          </a:p>
-        </p:txBody>
-      </p:sp>
-    </p:spTree>
-    <p:extLst>
-      <p:ext uri="{BB962C8B-B14F-4D97-AF65-F5344CB8AC3E}">
-        <p14:creationId xmlns:p14="http://schemas.microsoft.com/office/powerpoint/2010/main" val="657786521"/>
-      </p:ext>
-    </p:extLst>
-  </p:cSld>
-  <p:clrMapOvr>
-    <a:masterClrMapping/>
-  </p:clrMapOvr>
-</p:notes>
-</file>
-
-<file path=ppt/notesSlides/notesSlide8.xml><?xml version="1.0" encoding="utf-8"?>
-<p:notes xmlns:a="http://schemas.openxmlformats.org/drawingml/2006/main" xmlns:r="http://schemas.openxmlformats.org/officeDocument/2006/relationships" xmlns:p="http://schemas.openxmlformats.org/presentationml/2006/main">
-  <p:cSld>
-    <p:spTree>
-      <p:nvGrpSpPr>
-        <p:cNvPr id="1" name=""/>
-        <p:cNvGrpSpPr/>
-        <p:nvPr/>
-      </p:nvGrpSpPr>
-      <p:grpSpPr>
-        <a:xfrm>
-          <a:off x="0" y="0"/>
-          <a:ext cx="0" cy="0"/>
-          <a:chOff x="0" y="0"/>
-          <a:chExt cx="0" cy="0"/>
-        </a:xfrm>
-      </p:grpSpPr>
-      <p:sp>
-        <p:nvSpPr>
-          <p:cNvPr id="2" name="Slide Image Placeholder 1"/>
-          <p:cNvSpPr>
-            <a:spLocks noGrp="1" noRot="1" noChangeAspect="1"/>
-          </p:cNvSpPr>
-          <p:nvPr>
-            <p:ph type="sldImg"/>
-          </p:nvPr>
-        </p:nvSpPr>
-        <p:spPr/>
-      </p:sp>
-      <p:sp>
-        <p:nvSpPr>
-          <p:cNvPr id="3" name="Notes Placeholder 2"/>
-          <p:cNvSpPr>
-            <a:spLocks noGrp="1"/>
-          </p:cNvSpPr>
-          <p:nvPr>
-            <p:ph type="body" idx="1"/>
-          </p:nvPr>
-        </p:nvSpPr>
-        <p:spPr/>
-        <p:txBody>
-          <a:bodyPr/>
-          <a:lstStyle/>
-          <a:p>
-            <a:endParaRPr lang="en-CH" dirty="0"/>
-          </a:p>
-        </p:txBody>
-      </p:sp>
-      <p:sp>
-        <p:nvSpPr>
-          <p:cNvPr id="4" name="Slide Number Placeholder 3"/>
-          <p:cNvSpPr>
-            <a:spLocks noGrp="1"/>
-          </p:cNvSpPr>
-          <p:nvPr>
-            <p:ph type="sldNum" sz="quarter" idx="5"/>
-          </p:nvPr>
-        </p:nvSpPr>
-        <p:spPr/>
-        <p:txBody>
-          <a:bodyPr/>
-          <a:lstStyle/>
-          <a:p>
-            <a:fld id="{4F9EB7BC-E3FE-644B-A8BB-DE59933EA7C3}" type="slidenum">
-              <a:rPr lang="en-CH" smtClean="0"/>
-              <a:t>8</a:t>
             </a:fld>
             <a:endParaRPr lang="en-CH"/>
           </a:p>
@@ -5078,6 +4962,41 @@
           </a:prstGeom>
         </p:spPr>
       </p:pic>
+      <p:sp>
+        <p:nvSpPr>
+          <p:cNvPr id="4" name="TextBox 3">
+            <a:extLst>
+              <a:ext uri="{FF2B5EF4-FFF2-40B4-BE49-F238E27FC236}">
+                <a16:creationId xmlns:a16="http://schemas.microsoft.com/office/drawing/2014/main" id="{250096D7-838C-614B-AD36-498AA8D944C1}"/>
+              </a:ext>
+            </a:extLst>
+          </p:cNvPr>
+          <p:cNvSpPr txBox="1"/>
+          <p:nvPr/>
+        </p:nvSpPr>
+        <p:spPr>
+          <a:xfrm>
+            <a:off x="462456" y="6197642"/>
+            <a:ext cx="1564531" cy="369332"/>
+          </a:xfrm>
+          <a:prstGeom prst="rect">
+            <a:avLst/>
+          </a:prstGeom>
+          <a:noFill/>
+        </p:spPr>
+        <p:txBody>
+          <a:bodyPr wrap="none" rtlCol="0">
+            <a:spAutoFit/>
+          </a:bodyPr>
+          <a:lstStyle/>
+          <a:p>
+            <a:r>
+              <a:rPr lang="en-CH" dirty="0"/>
+              <a:t>Team La Girafe</a:t>
+            </a:r>
+          </a:p>
+        </p:txBody>
+      </p:sp>
     </p:spTree>
     <p:extLst>
       <p:ext uri="{BB962C8B-B14F-4D97-AF65-F5344CB8AC3E}">
@@ -5248,6 +5167,41 @@
           </a:p>
         </p:txBody>
       </p:sp>
+      <p:sp>
+        <p:nvSpPr>
+          <p:cNvPr id="6" name="TextBox 5">
+            <a:extLst>
+              <a:ext uri="{FF2B5EF4-FFF2-40B4-BE49-F238E27FC236}">
+                <a16:creationId xmlns:a16="http://schemas.microsoft.com/office/drawing/2014/main" id="{68BDD7FC-94D2-9A48-A9AC-352EF8F3F508}"/>
+              </a:ext>
+            </a:extLst>
+          </p:cNvPr>
+          <p:cNvSpPr txBox="1"/>
+          <p:nvPr/>
+        </p:nvSpPr>
+        <p:spPr>
+          <a:xfrm>
+            <a:off x="462456" y="6197642"/>
+            <a:ext cx="1564531" cy="369332"/>
+          </a:xfrm>
+          <a:prstGeom prst="rect">
+            <a:avLst/>
+          </a:prstGeom>
+          <a:noFill/>
+        </p:spPr>
+        <p:txBody>
+          <a:bodyPr wrap="none" rtlCol="0">
+            <a:spAutoFit/>
+          </a:bodyPr>
+          <a:lstStyle/>
+          <a:p>
+            <a:r>
+              <a:rPr lang="en-CH" dirty="0"/>
+              <a:t>Team La Girafe</a:t>
+            </a:r>
+          </a:p>
+        </p:txBody>
+      </p:sp>
     </p:spTree>
     <p:extLst>
       <p:ext uri="{BB962C8B-B14F-4D97-AF65-F5344CB8AC3E}">
@@ -5480,6 +5434,41 @@
           </a:p>
         </p:txBody>
       </p:sp>
+      <p:sp>
+        <p:nvSpPr>
+          <p:cNvPr id="5" name="TextBox 4">
+            <a:extLst>
+              <a:ext uri="{FF2B5EF4-FFF2-40B4-BE49-F238E27FC236}">
+                <a16:creationId xmlns:a16="http://schemas.microsoft.com/office/drawing/2014/main" id="{B821016B-186A-8F47-B2E8-37FCC72D5C50}"/>
+              </a:ext>
+            </a:extLst>
+          </p:cNvPr>
+          <p:cNvSpPr txBox="1"/>
+          <p:nvPr/>
+        </p:nvSpPr>
+        <p:spPr>
+          <a:xfrm>
+            <a:off x="462456" y="6197642"/>
+            <a:ext cx="1564531" cy="369332"/>
+          </a:xfrm>
+          <a:prstGeom prst="rect">
+            <a:avLst/>
+          </a:prstGeom>
+          <a:noFill/>
+        </p:spPr>
+        <p:txBody>
+          <a:bodyPr wrap="none" rtlCol="0">
+            <a:spAutoFit/>
+          </a:bodyPr>
+          <a:lstStyle/>
+          <a:p>
+            <a:r>
+              <a:rPr lang="en-CH" dirty="0"/>
+              <a:t>Team La Girafe</a:t>
+            </a:r>
+          </a:p>
+        </p:txBody>
+      </p:sp>
     </p:spTree>
     <p:extLst>
       <p:ext uri="{BB962C8B-B14F-4D97-AF65-F5344CB8AC3E}">
@@ -5598,7 +5587,42 @@
               <a:rPr lang="en-GB" dirty="0">
                 <a:latin typeface="Trebuchet MS" panose="020B0703020202090204" pitchFamily="34" charset="0"/>
               </a:rPr>
-              <a:t>no sensitive data is shared before both parties agreed</a:t>
+              <a:t>no sensitive data is shared before both parties agree the match</a:t>
+            </a:r>
+          </a:p>
+        </p:txBody>
+      </p:sp>
+      <p:sp>
+        <p:nvSpPr>
+          <p:cNvPr id="5" name="TextBox 4">
+            <a:extLst>
+              <a:ext uri="{FF2B5EF4-FFF2-40B4-BE49-F238E27FC236}">
+                <a16:creationId xmlns:a16="http://schemas.microsoft.com/office/drawing/2014/main" id="{94681456-56B2-6B46-86E3-72525C40C1EB}"/>
+              </a:ext>
+            </a:extLst>
+          </p:cNvPr>
+          <p:cNvSpPr txBox="1"/>
+          <p:nvPr/>
+        </p:nvSpPr>
+        <p:spPr>
+          <a:xfrm>
+            <a:off x="462456" y="6197642"/>
+            <a:ext cx="1564531" cy="369332"/>
+          </a:xfrm>
+          <a:prstGeom prst="rect">
+            <a:avLst/>
+          </a:prstGeom>
+          <a:noFill/>
+        </p:spPr>
+        <p:txBody>
+          <a:bodyPr wrap="none" rtlCol="0">
+            <a:spAutoFit/>
+          </a:bodyPr>
+          <a:lstStyle/>
+          <a:p>
+            <a:r>
+              <a:rPr lang="en-CH" dirty="0"/>
+              <a:t>Team La Girafe</a:t>
             </a:r>
           </a:p>
         </p:txBody>
@@ -5666,26 +5690,76 @@
               <a:rPr lang="en-CH" b="1" dirty="0">
                 <a:latin typeface="Trebuchet MS" panose="020B0703020202090204" pitchFamily="34" charset="0"/>
               </a:rPr>
-              <a:t>Project Architecture</a:t>
+              <a:t>Tech Stack</a:t>
+            </a:r>
+          </a:p>
+        </p:txBody>
+      </p:sp>
+      <p:sp>
+        <p:nvSpPr>
+          <p:cNvPr id="4" name="Content Placeholder 3">
+            <a:extLst>
+              <a:ext uri="{FF2B5EF4-FFF2-40B4-BE49-F238E27FC236}">
+                <a16:creationId xmlns:a16="http://schemas.microsoft.com/office/drawing/2014/main" id="{C9253F40-5BC5-4A45-934E-EB79DC6FFA50}"/>
+              </a:ext>
+            </a:extLst>
+          </p:cNvPr>
+          <p:cNvSpPr>
+            <a:spLocks noGrp="1"/>
+          </p:cNvSpPr>
+          <p:nvPr>
+            <p:ph idx="1"/>
+          </p:nvPr>
+        </p:nvSpPr>
+        <p:spPr/>
+        <p:txBody>
+          <a:bodyPr/>
+          <a:lstStyle/>
+          <a:p>
+            <a:r>
+              <a:rPr lang="en-CH" dirty="0"/>
+              <a:t>Vuetify</a:t>
+            </a:r>
+          </a:p>
+          <a:p>
+            <a:r>
+              <a:rPr lang="en-CH" dirty="0"/>
+              <a:t>NuxtJS</a:t>
+            </a:r>
+          </a:p>
+          <a:p>
+            <a:r>
+              <a:rPr lang="en-CH" dirty="0"/>
+              <a:t>Python</a:t>
+            </a:r>
+          </a:p>
+          <a:p>
+            <a:r>
+              <a:rPr lang="en-CH" dirty="0"/>
+              <a:t>JavaScript</a:t>
+            </a:r>
+          </a:p>
+          <a:p>
+            <a:r>
+              <a:rPr lang="en-CH" dirty="0"/>
+              <a:t>HTML5</a:t>
             </a:r>
           </a:p>
         </p:txBody>
       </p:sp>
       <p:pic>
         <p:nvPicPr>
-          <p:cNvPr id="5" name="Content Placeholder 4">
-            <a:extLst>
-              <a:ext uri="{FF2B5EF4-FFF2-40B4-BE49-F238E27FC236}">
-                <a16:creationId xmlns:a16="http://schemas.microsoft.com/office/drawing/2014/main" id="{5AD53865-210C-0D4B-B610-8033B7BBF09F}"/>
+          <p:cNvPr id="6" name="Content Placeholder 4">
+            <a:extLst>
+              <a:ext uri="{FF2B5EF4-FFF2-40B4-BE49-F238E27FC236}">
+                <a16:creationId xmlns:a16="http://schemas.microsoft.com/office/drawing/2014/main" id="{38E9A841-92FC-FB41-AAD8-ADC9C18D2A5E}"/>
               </a:ext>
             </a:extLst>
           </p:cNvPr>
           <p:cNvPicPr>
-            <a:picLocks noGrp="1" noChangeAspect="1"/>
+            <a:picLocks noChangeAspect="1"/>
           </p:cNvPicPr>
-          <p:nvPr>
-            <p:ph idx="1"/>
-          </p:nvPr>
+          <p:nvPr/>
         </p:nvPicPr>
         <p:blipFill>
           <a:blip r:embed="rId3"/>
@@ -5694,15 +5768,53 @@
         </p:blipFill>
         <p:spPr>
           <a:xfrm>
-            <a:off x="1890582" y="1575315"/>
-            <a:ext cx="8441628" cy="4870170"/>
+            <a:off x="4119927" y="1360415"/>
+            <a:ext cx="7542320" cy="4351338"/>
           </a:xfrm>
+          <a:prstGeom prst="rect">
+            <a:avLst/>
+          </a:prstGeom>
         </p:spPr>
       </p:pic>
+      <p:sp>
+        <p:nvSpPr>
+          <p:cNvPr id="8" name="TextBox 7">
+            <a:extLst>
+              <a:ext uri="{FF2B5EF4-FFF2-40B4-BE49-F238E27FC236}">
+                <a16:creationId xmlns:a16="http://schemas.microsoft.com/office/drawing/2014/main" id="{4D1AC25B-D701-364D-AE6F-5F912AABDAF0}"/>
+              </a:ext>
+            </a:extLst>
+          </p:cNvPr>
+          <p:cNvSpPr txBox="1"/>
+          <p:nvPr/>
+        </p:nvSpPr>
+        <p:spPr>
+          <a:xfrm>
+            <a:off x="462456" y="6197642"/>
+            <a:ext cx="1564531" cy="369332"/>
+          </a:xfrm>
+          <a:prstGeom prst="rect">
+            <a:avLst/>
+          </a:prstGeom>
+          <a:noFill/>
+        </p:spPr>
+        <p:txBody>
+          <a:bodyPr wrap="none" rtlCol="0">
+            <a:spAutoFit/>
+          </a:bodyPr>
+          <a:lstStyle/>
+          <a:p>
+            <a:r>
+              <a:rPr lang="en-CH" dirty="0"/>
+              <a:t>Team La Girafe</a:t>
+            </a:r>
+          </a:p>
+        </p:txBody>
+      </p:sp>
     </p:spTree>
     <p:extLst>
       <p:ext uri="{BB962C8B-B14F-4D97-AF65-F5344CB8AC3E}">
-        <p14:creationId xmlns:p14="http://schemas.microsoft.com/office/powerpoint/2010/main" val="1183501346"/>
+        <p14:creationId xmlns:p14="http://schemas.microsoft.com/office/powerpoint/2010/main" val="2587451752"/>
       </p:ext>
     </p:extLst>
   </p:cSld>
@@ -5753,129 +5865,9 @@
             <p:ph type="title"/>
           </p:nvPr>
         </p:nvSpPr>
-        <p:spPr/>
-        <p:txBody>
-          <a:bodyPr/>
-          <a:lstStyle/>
-          <a:p>
-            <a:r>
-              <a:rPr lang="en-CH" b="1" dirty="0">
-                <a:latin typeface="Trebuchet MS" panose="020B0703020202090204" pitchFamily="34" charset="0"/>
-              </a:rPr>
-              <a:t>Tech Stack</a:t>
-            </a:r>
-          </a:p>
-        </p:txBody>
-      </p:sp>
-      <p:sp>
-        <p:nvSpPr>
-          <p:cNvPr id="4" name="Content Placeholder 3">
-            <a:extLst>
-              <a:ext uri="{FF2B5EF4-FFF2-40B4-BE49-F238E27FC236}">
-                <a16:creationId xmlns:a16="http://schemas.microsoft.com/office/drawing/2014/main" id="{C9253F40-5BC5-4A45-934E-EB79DC6FFA50}"/>
-              </a:ext>
-            </a:extLst>
-          </p:cNvPr>
-          <p:cNvSpPr>
-            <a:spLocks noGrp="1"/>
-          </p:cNvSpPr>
-          <p:nvPr>
-            <p:ph idx="1"/>
-          </p:nvPr>
-        </p:nvSpPr>
-        <p:spPr/>
-        <p:txBody>
-          <a:bodyPr/>
-          <a:lstStyle/>
-          <a:p>
-            <a:r>
-              <a:rPr lang="en-CH" dirty="0"/>
-              <a:t>Vuetify</a:t>
-            </a:r>
-          </a:p>
-          <a:p>
-            <a:r>
-              <a:rPr lang="en-CH" dirty="0"/>
-              <a:t>NuxtJS</a:t>
-            </a:r>
-          </a:p>
-          <a:p>
-            <a:r>
-              <a:rPr lang="en-CH" dirty="0"/>
-              <a:t>Python</a:t>
-            </a:r>
-          </a:p>
-          <a:p>
-            <a:r>
-              <a:rPr lang="en-CH" dirty="0"/>
-              <a:t>JavaScript</a:t>
-            </a:r>
-          </a:p>
-          <a:p>
-            <a:r>
-              <a:rPr lang="en-CH" dirty="0"/>
-              <a:t>HTML5</a:t>
-            </a:r>
-          </a:p>
-        </p:txBody>
-      </p:sp>
-    </p:spTree>
-    <p:extLst>
-      <p:ext uri="{BB962C8B-B14F-4D97-AF65-F5344CB8AC3E}">
-        <p14:creationId xmlns:p14="http://schemas.microsoft.com/office/powerpoint/2010/main" val="2587451752"/>
-      </p:ext>
-    </p:extLst>
-  </p:cSld>
-  <p:clrMapOvr>
-    <a:masterClrMapping/>
-  </p:clrMapOvr>
-</p:sld>
-</file>
-
-<file path=ppt/slides/slide8.xml><?xml version="1.0" encoding="utf-8"?>
-<p:sld xmlns:a="http://schemas.openxmlformats.org/drawingml/2006/main" xmlns:r="http://schemas.openxmlformats.org/officeDocument/2006/relationships" xmlns:p="http://schemas.openxmlformats.org/presentationml/2006/main">
-  <p:cSld>
-    <p:bg>
-      <p:bgPr>
-        <a:solidFill>
-          <a:srgbClr val="9DC3E6"/>
-        </a:solidFill>
-        <a:effectLst/>
-      </p:bgPr>
-    </p:bg>
-    <p:spTree>
-      <p:nvGrpSpPr>
-        <p:cNvPr id="1" name=""/>
-        <p:cNvGrpSpPr/>
-        <p:nvPr/>
-      </p:nvGrpSpPr>
-      <p:grpSpPr>
-        <a:xfrm>
-          <a:off x="0" y="0"/>
-          <a:ext cx="0" cy="0"/>
-          <a:chOff x="0" y="0"/>
-          <a:chExt cx="0" cy="0"/>
-        </a:xfrm>
-      </p:grpSpPr>
-      <p:sp>
-        <p:nvSpPr>
-          <p:cNvPr id="2" name="Title 1">
-            <a:extLst>
-              <a:ext uri="{FF2B5EF4-FFF2-40B4-BE49-F238E27FC236}">
-                <a16:creationId xmlns:a16="http://schemas.microsoft.com/office/drawing/2014/main" id="{A5186B16-9D62-5146-B2AA-4EEE35AFAD22}"/>
-              </a:ext>
-            </a:extLst>
-          </p:cNvPr>
-          <p:cNvSpPr>
-            <a:spLocks noGrp="1"/>
-          </p:cNvSpPr>
-          <p:nvPr>
-            <p:ph type="title"/>
-          </p:nvPr>
-        </p:nvSpPr>
         <p:spPr>
           <a:xfrm>
-            <a:off x="838200" y="1558307"/>
+            <a:off x="838200" y="1261423"/>
             <a:ext cx="10515600" cy="1325563"/>
           </a:xfrm>
         </p:spPr>

</xml_diff>